<commit_message>
Diapositiva 2da actualizada con taller
</commit_message>
<xml_diff>
--- a/Angular.pptx
+++ b/Angular.pptx
@@ -3412,7 +3412,7 @@
             <a:pPr algn="r" rtl="0"/>
             <a:fld id="{C8F1D84B-F747-4821-8617-FBD61E8F4308}" type="datetime1">
               <a:rPr lang="es-ES" smtClean="0"/>
-              <a:t>17/12/2018</a:t>
+              <a:t>18/12/2018</a:t>
             </a:fld>
             <a:endParaRPr lang="es-ES" dirty="0"/>
           </a:p>
@@ -3481,7 +3481,7 @@
             <a:fld id="{79429053-DC2A-4342-ADD4-2FD729D91E2C}" type="slidenum">
               <a:rPr lang="es-ES" smtClean="0"/>
               <a:pPr algn="r" rtl="0"/>
-              <a:t>‹Nº›</a:t>
+              <a:t>‹#›</a:t>
             </a:fld>
             <a:endParaRPr lang="es-ES" dirty="0"/>
           </a:p>
@@ -3582,7 +3582,7 @@
             <a:fld id="{DA87C823-BB9F-45DA-99AB-416A32E1B948}" type="datetime1">
               <a:rPr lang="es-ES" noProof="0" smtClean="0"/>
               <a:pPr/>
-              <a:t>17/12/2018</a:t>
+              <a:t>18/12/2018</a:t>
             </a:fld>
             <a:endParaRPr lang="es-ES" noProof="0" dirty="0"/>
           </a:p>
@@ -3743,7 +3743,7 @@
             <a:fld id="{3EBA5BD7-F043-4D1B-AA17-CD412FC534DE}" type="slidenum">
               <a:rPr lang="es-ES" noProof="0" smtClean="0"/>
               <a:pPr/>
-              <a:t>‹Nº›</a:t>
+              <a:t>‹#›</a:t>
             </a:fld>
             <a:endParaRPr lang="es-ES" noProof="0" dirty="0"/>
           </a:p>
@@ -5210,7 +5210,7 @@
             <a:fld id="{A042E67D-14C0-4ED9-A218-9C14494A6A84}" type="datetime1">
               <a:rPr lang="es-ES" noProof="0" smtClean="0"/>
               <a:pPr/>
-              <a:t>17/12/2018</a:t>
+              <a:t>18/12/2018</a:t>
             </a:fld>
             <a:endParaRPr lang="es-ES" noProof="0" dirty="0"/>
           </a:p>
@@ -5254,7 +5254,7 @@
             <a:pPr rtl="0"/>
             <a:fld id="{C014DD1E-5D91-48A3-AD6D-45FBA980D106}" type="slidenum">
               <a:rPr lang="es-ES" noProof="0" smtClean="0"/>
-              <a:t>‹Nº›</a:t>
+              <a:t>‹#›</a:t>
             </a:fld>
             <a:endParaRPr lang="es-ES" noProof="0" dirty="0"/>
           </a:p>
@@ -5420,7 +5420,7 @@
             <a:fld id="{40A1DB83-C382-4684-8887-65A03EA4FFF0}" type="datetime1">
               <a:rPr lang="es-ES" noProof="0" smtClean="0"/>
               <a:pPr/>
-              <a:t>17/12/2018</a:t>
+              <a:t>18/12/2018</a:t>
             </a:fld>
             <a:endParaRPr lang="es-ES" noProof="0" dirty="0"/>
           </a:p>
@@ -5464,7 +5464,7 @@
             <a:pPr rtl="0"/>
             <a:fld id="{C014DD1E-5D91-48A3-AD6D-45FBA980D106}" type="slidenum">
               <a:rPr lang="es-ES" noProof="0" smtClean="0"/>
-              <a:t>‹Nº›</a:t>
+              <a:t>‹#›</a:t>
             </a:fld>
             <a:endParaRPr lang="es-ES" noProof="0" dirty="0"/>
           </a:p>
@@ -5636,7 +5636,7 @@
             <a:fld id="{C60E81D3-9B82-44CA-B1F9-FCEFDC87935B}" type="datetime1">
               <a:rPr lang="es-ES" noProof="0" smtClean="0"/>
               <a:pPr/>
-              <a:t>17/12/2018</a:t>
+              <a:t>18/12/2018</a:t>
             </a:fld>
             <a:endParaRPr lang="es-ES" noProof="0" dirty="0"/>
           </a:p>
@@ -5680,7 +5680,7 @@
             <a:pPr rtl="0"/>
             <a:fld id="{C014DD1E-5D91-48A3-AD6D-45FBA980D106}" type="slidenum">
               <a:rPr lang="es-ES" noProof="0" smtClean="0"/>
-              <a:t>‹Nº›</a:t>
+              <a:t>‹#›</a:t>
             </a:fld>
             <a:endParaRPr lang="es-ES" noProof="0" dirty="0"/>
           </a:p>
@@ -5842,7 +5842,7 @@
             <a:fld id="{82E48AAE-5AE8-418A-A225-B506C222F2F9}" type="datetime1">
               <a:rPr lang="es-ES" noProof="0" smtClean="0"/>
               <a:pPr/>
-              <a:t>17/12/2018</a:t>
+              <a:t>18/12/2018</a:t>
             </a:fld>
             <a:endParaRPr lang="es-ES" noProof="0" dirty="0"/>
           </a:p>
@@ -5886,7 +5886,7 @@
             <a:pPr rtl="0"/>
             <a:fld id="{C014DD1E-5D91-48A3-AD6D-45FBA980D106}" type="slidenum">
               <a:rPr lang="es-ES" noProof="0" smtClean="0"/>
-              <a:t>‹Nº›</a:t>
+              <a:t>‹#›</a:t>
             </a:fld>
             <a:endParaRPr lang="es-ES" noProof="0" dirty="0"/>
           </a:p>
@@ -6282,7 +6282,7 @@
             <a:fld id="{AA1D35CA-82F5-4AD4-B9EC-66E805B73542}" type="datetime1">
               <a:rPr lang="es-ES" noProof="0" smtClean="0"/>
               <a:pPr/>
-              <a:t>17/12/2018</a:t>
+              <a:t>18/12/2018</a:t>
             </a:fld>
             <a:endParaRPr lang="es-ES" noProof="0" dirty="0"/>
           </a:p>
@@ -6326,7 +6326,7 @@
             <a:pPr rtl="0"/>
             <a:fld id="{C014DD1E-5D91-48A3-AD6D-45FBA980D106}" type="slidenum">
               <a:rPr lang="es-ES" noProof="0" smtClean="0"/>
-              <a:t>‹Nº›</a:t>
+              <a:t>‹#›</a:t>
             </a:fld>
             <a:endParaRPr lang="es-ES" noProof="0" dirty="0"/>
           </a:p>
@@ -6594,7 +6594,7 @@
             <a:fld id="{834CCE92-710B-4678-B1B1-EFCAA5CDF075}" type="datetime1">
               <a:rPr lang="es-ES" noProof="0" smtClean="0"/>
               <a:pPr/>
-              <a:t>17/12/2018</a:t>
+              <a:t>18/12/2018</a:t>
             </a:fld>
             <a:endParaRPr lang="es-ES" noProof="0" dirty="0"/>
           </a:p>
@@ -6638,7 +6638,7 @@
             <a:pPr rtl="0"/>
             <a:fld id="{C014DD1E-5D91-48A3-AD6D-45FBA980D106}" type="slidenum">
               <a:rPr lang="es-ES" noProof="0" smtClean="0"/>
-              <a:t>‹Nº›</a:t>
+              <a:t>‹#›</a:t>
             </a:fld>
             <a:endParaRPr lang="es-ES" noProof="0" dirty="0"/>
           </a:p>
@@ -7058,7 +7058,7 @@
             <a:fld id="{83FB0F2C-25D9-4D7E-B43A-29A2E16C960D}" type="datetime1">
               <a:rPr lang="es-ES" noProof="0" smtClean="0"/>
               <a:pPr/>
-              <a:t>17/12/2018</a:t>
+              <a:t>18/12/2018</a:t>
             </a:fld>
             <a:endParaRPr lang="es-ES" noProof="0" dirty="0"/>
           </a:p>
@@ -7102,7 +7102,7 @@
             <a:pPr rtl="0"/>
             <a:fld id="{C014DD1E-5D91-48A3-AD6D-45FBA980D106}" type="slidenum">
               <a:rPr lang="es-ES" noProof="0" smtClean="0"/>
-              <a:t>‹Nº›</a:t>
+              <a:t>‹#›</a:t>
             </a:fld>
             <a:endParaRPr lang="es-ES" noProof="0" dirty="0"/>
           </a:p>
@@ -7196,7 +7196,7 @@
             <a:fld id="{FD34687D-B11B-47A5-95F6-B79DA932A6DF}" type="datetime1">
               <a:rPr lang="es-ES" noProof="0" smtClean="0"/>
               <a:pPr/>
-              <a:t>17/12/2018</a:t>
+              <a:t>18/12/2018</a:t>
             </a:fld>
             <a:endParaRPr lang="es-ES" noProof="0" dirty="0"/>
           </a:p>
@@ -7240,7 +7240,7 @@
             <a:pPr rtl="0"/>
             <a:fld id="{C014DD1E-5D91-48A3-AD6D-45FBA980D106}" type="slidenum">
               <a:rPr lang="es-ES" noProof="0" smtClean="0"/>
-              <a:t>‹Nº›</a:t>
+              <a:t>‹#›</a:t>
             </a:fld>
             <a:endParaRPr lang="es-ES" noProof="0" dirty="0"/>
           </a:p>
@@ -7310,7 +7310,7 @@
             <a:fld id="{93C656DE-1E46-4450-9484-A739B4FADFBC}" type="datetime1">
               <a:rPr lang="es-ES" noProof="0" smtClean="0"/>
               <a:pPr/>
-              <a:t>17/12/2018</a:t>
+              <a:t>18/12/2018</a:t>
             </a:fld>
             <a:endParaRPr lang="es-ES" noProof="0" dirty="0"/>
           </a:p>
@@ -7354,7 +7354,7 @@
             <a:pPr rtl="0"/>
             <a:fld id="{C014DD1E-5D91-48A3-AD6D-45FBA980D106}" type="slidenum">
               <a:rPr lang="es-ES" noProof="0" smtClean="0"/>
-              <a:t>‹Nº›</a:t>
+              <a:t>‹#›</a:t>
             </a:fld>
             <a:endParaRPr lang="es-ES" noProof="0" dirty="0"/>
           </a:p>
@@ -7617,7 +7617,7 @@
             <a:fld id="{EEA77F8B-D469-4ECD-B91E-3B01AD692331}" type="datetime1">
               <a:rPr lang="es-ES" noProof="0" smtClean="0"/>
               <a:pPr/>
-              <a:t>17/12/2018</a:t>
+              <a:t>18/12/2018</a:t>
             </a:fld>
             <a:endParaRPr lang="es-ES" noProof="0" dirty="0"/>
           </a:p>
@@ -7661,7 +7661,7 @@
             <a:pPr rtl="0"/>
             <a:fld id="{C014DD1E-5D91-48A3-AD6D-45FBA980D106}" type="slidenum">
               <a:rPr lang="es-ES" noProof="0" smtClean="0"/>
-              <a:t>‹Nº›</a:t>
+              <a:t>‹#›</a:t>
             </a:fld>
             <a:endParaRPr lang="es-ES" noProof="0" dirty="0"/>
           </a:p>
@@ -7914,7 +7914,7 @@
             <a:fld id="{49BA7B1C-709E-4257-93A5-EC2F0807D42F}" type="datetime1">
               <a:rPr lang="es-ES" noProof="0" smtClean="0"/>
               <a:pPr/>
-              <a:t>17/12/2018</a:t>
+              <a:t>18/12/2018</a:t>
             </a:fld>
             <a:endParaRPr lang="es-ES" noProof="0" dirty="0"/>
           </a:p>
@@ -7958,7 +7958,7 @@
             <a:pPr rtl="0"/>
             <a:fld id="{C014DD1E-5D91-48A3-AD6D-45FBA980D106}" type="slidenum">
               <a:rPr lang="es-ES" noProof="0" smtClean="0"/>
-              <a:t>‹Nº›</a:t>
+              <a:t>‹#›</a:t>
             </a:fld>
             <a:endParaRPr lang="es-ES" noProof="0" dirty="0"/>
           </a:p>
@@ -8538,7 +8538,7 @@
             <a:fld id="{35C83AD5-F5AF-4BDC-901E-85A05CCFFAAA}" type="datetime1">
               <a:rPr lang="es-ES" noProof="0" smtClean="0"/>
               <a:pPr/>
-              <a:t>17/12/2018</a:t>
+              <a:t>18/12/2018</a:t>
             </a:fld>
             <a:endParaRPr lang="es-ES" noProof="0" dirty="0"/>
           </a:p>
@@ -8618,7 +8618,7 @@
             <a:fld id="{C014DD1E-5D91-48A3-AD6D-45FBA980D106}" type="slidenum">
               <a:rPr lang="es-ES" smtClean="0"/>
               <a:pPr/>
-              <a:t>‹Nº›</a:t>
+              <a:t>‹#›</a:t>
             </a:fld>
             <a:endParaRPr lang="es-ES" dirty="0"/>
           </a:p>
@@ -12850,7 +12850,9 @@
         </p:nvSpPr>
         <p:spPr/>
         <p:txBody>
-          <a:bodyPr/>
+          <a:bodyPr>
+            <a:normAutofit fontScale="85000" lnSpcReduction="20000"/>
+          </a:bodyPr>
           <a:lstStyle/>
           <a:p>
             <a:pPr marL="0" indent="0">
@@ -12858,15 +12860,7 @@
             </a:pPr>
             <a:r>
               <a:rPr lang="es-ES" dirty="0"/>
-              <a:t>Crear una aplicación angular que sirva como un contador de </a:t>
-            </a:r>
-            <a:r>
-              <a:rPr lang="es-ES" dirty="0" err="1"/>
-              <a:t>numeros</a:t>
-            </a:r>
-            <a:r>
-              <a:rPr lang="es-ES" dirty="0"/>
-              <a:t>.</a:t>
+              <a:t>Crear una aplicación angular que sirva como un contador de números.</a:t>
             </a:r>
           </a:p>
           <a:p>
@@ -12897,6 +12891,31 @@
               <a:rPr lang="es-ES" dirty="0"/>
               <a:t>El componente hijo mostrara el contador y tendrán los respectivos métodos para incrementar, decrementar y reiniciar el contador.</a:t>
             </a:r>
+          </a:p>
+          <a:p>
+            <a:pPr>
+              <a:buFontTx/>
+              <a:buChar char="-"/>
+            </a:pPr>
+            <a:r>
+              <a:rPr lang="es-ES" dirty="0"/>
+              <a:t>El componente padre le podrá pasar un valor inicial desde donde se iniciara el contador, así como el componente hijo le podrá avisar al componente padre que el contador se ha reiniciado, para que el componente padre pueda mostrar un mensaje de alerta indicando que se reinicio el contador.</a:t>
+            </a:r>
+          </a:p>
+          <a:p>
+            <a:pPr>
+              <a:buFontTx/>
+              <a:buChar char="-"/>
+            </a:pPr>
+            <a:r>
+              <a:rPr lang="es-ES" dirty="0"/>
+              <a:t>Utilizar @Input, @Output  y @</a:t>
+            </a:r>
+            <a:r>
+              <a:rPr lang="es-ES" dirty="0" err="1"/>
+              <a:t>ViewChild</a:t>
+            </a:r>
+            <a:endParaRPr lang="es-ES" dirty="0"/>
           </a:p>
         </p:txBody>
       </p:sp>
@@ -15078,6 +15097,142 @@
 </file>
 
 <file path=customXml/item1.xml><?xml version="1.0" encoding="utf-8"?>
+<p:properties xmlns:p="http://schemas.microsoft.com/office/2006/metadata/properties" xmlns:xsi="http://www.w3.org/2001/XMLSchema-instance" xmlns:pc="http://schemas.microsoft.com/office/infopath/2007/PartnerControls">
+  <documentManagement>
+    <LocPublishedLinkedAssetsLookup xmlns="4873beb7-5857-4685-be1f-d57550cc96cc" xsi:nil="true"/>
+    <ApprovalStatus xmlns="4873beb7-5857-4685-be1f-d57550cc96cc">InProgress</ApprovalStatus>
+    <MarketSpecific xmlns="4873beb7-5857-4685-be1f-d57550cc96cc">false</MarketSpecific>
+    <LocComments xmlns="4873beb7-5857-4685-be1f-d57550cc96cc" xsi:nil="true"/>
+    <LocLastLocAttemptVersionTypeLookup xmlns="4873beb7-5857-4685-be1f-d57550cc96cc" xsi:nil="true"/>
+    <DirectSourceMarket xmlns="4873beb7-5857-4685-be1f-d57550cc96cc" xsi:nil="true"/>
+    <ThumbnailAssetId xmlns="4873beb7-5857-4685-be1f-d57550cc96cc" xsi:nil="true"/>
+    <PrimaryImageGen xmlns="4873beb7-5857-4685-be1f-d57550cc96cc">false</PrimaryImageGen>
+    <LocNewPublishedVersionLookup xmlns="4873beb7-5857-4685-be1f-d57550cc96cc" xsi:nil="true"/>
+    <LegacyData xmlns="4873beb7-5857-4685-be1f-d57550cc96cc" xsi:nil="true"/>
+    <LocRecommendedHandoff xmlns="4873beb7-5857-4685-be1f-d57550cc96cc" xsi:nil="true"/>
+    <BusinessGroup xmlns="4873beb7-5857-4685-be1f-d57550cc96cc" xsi:nil="true"/>
+    <BlockPublish xmlns="4873beb7-5857-4685-be1f-d57550cc96cc">false</BlockPublish>
+    <TPFriendlyName xmlns="4873beb7-5857-4685-be1f-d57550cc96cc" xsi:nil="true"/>
+    <LocOverallPublishStatusLookup xmlns="4873beb7-5857-4685-be1f-d57550cc96cc" xsi:nil="true"/>
+    <NumericId xmlns="4873beb7-5857-4685-be1f-d57550cc96cc" xsi:nil="true"/>
+    <APEditor xmlns="4873beb7-5857-4685-be1f-d57550cc96cc">
+      <UserInfo>
+        <DisplayName/>
+        <AccountId xsi:nil="true"/>
+        <AccountType/>
+      </UserInfo>
+    </APEditor>
+    <SourceTitle xmlns="4873beb7-5857-4685-be1f-d57550cc96cc" xsi:nil="true"/>
+    <OpenTemplate xmlns="4873beb7-5857-4685-be1f-d57550cc96cc">true</OpenTemplate>
+    <LocOverallLocStatusLookup xmlns="4873beb7-5857-4685-be1f-d57550cc96cc" xsi:nil="true"/>
+    <UALocComments xmlns="4873beb7-5857-4685-be1f-d57550cc96cc" xsi:nil="true"/>
+    <ParentAssetId xmlns="4873beb7-5857-4685-be1f-d57550cc96cc" xsi:nil="true"/>
+    <IntlLangReviewDate xmlns="4873beb7-5857-4685-be1f-d57550cc96cc" xsi:nil="true"/>
+    <FeatureTagsTaxHTField0 xmlns="4873beb7-5857-4685-be1f-d57550cc96cc">
+      <Terms xmlns="http://schemas.microsoft.com/office/infopath/2007/PartnerControls"/>
+    </FeatureTagsTaxHTField0>
+    <PublishStatusLookup xmlns="4873beb7-5857-4685-be1f-d57550cc96cc">
+      <Value>1345093</Value>
+    </PublishStatusLookup>
+    <Providers xmlns="4873beb7-5857-4685-be1f-d57550cc96cc" xsi:nil="true"/>
+    <MachineTranslated xmlns="4873beb7-5857-4685-be1f-d57550cc96cc">false</MachineTranslated>
+    <OriginalSourceMarket xmlns="4873beb7-5857-4685-be1f-d57550cc96cc" xsi:nil="true"/>
+    <APDescription xmlns="4873beb7-5857-4685-be1f-d57550cc96cc">This simple template design works for technology and  businesses, but it's versatile enough to use in other contexts.  It features multiple slide layouts designed for widescreen (16x9 resolution) and includes a sample SmartArt list and chart that are easily editable.</APDescription>
+    <ClipArtFilename xmlns="4873beb7-5857-4685-be1f-d57550cc96cc" xsi:nil="true"/>
+    <ContentItem xmlns="4873beb7-5857-4685-be1f-d57550cc96cc" xsi:nil="true"/>
+    <TPInstallLocation xmlns="4873beb7-5857-4685-be1f-d57550cc96cc" xsi:nil="true"/>
+    <PublishTargets xmlns="4873beb7-5857-4685-be1f-d57550cc96cc">OfficeOnlineVNext</PublishTargets>
+    <TimesCloned xmlns="4873beb7-5857-4685-be1f-d57550cc96cc" xsi:nil="true"/>
+    <AssetStart xmlns="4873beb7-5857-4685-be1f-d57550cc96cc">2011-11-26T00:30:00+00:00</AssetStart>
+    <Provider xmlns="4873beb7-5857-4685-be1f-d57550cc96cc" xsi:nil="true"/>
+    <AcquiredFrom xmlns="4873beb7-5857-4685-be1f-d57550cc96cc">Internal MS</AcquiredFrom>
+    <FriendlyTitle xmlns="4873beb7-5857-4685-be1f-d57550cc96cc" xsi:nil="true"/>
+    <LastHandOff xmlns="4873beb7-5857-4685-be1f-d57550cc96cc" xsi:nil="true"/>
+    <TPClientViewer xmlns="4873beb7-5857-4685-be1f-d57550cc96cc" xsi:nil="true"/>
+    <TemplateStatus xmlns="4873beb7-5857-4685-be1f-d57550cc96cc">Complete</TemplateStatus>
+    <Downloads xmlns="4873beb7-5857-4685-be1f-d57550cc96cc">0</Downloads>
+    <OOCacheId xmlns="4873beb7-5857-4685-be1f-d57550cc96cc" xsi:nil="true"/>
+    <IsDeleted xmlns="4873beb7-5857-4685-be1f-d57550cc96cc">false</IsDeleted>
+    <LocPublishedDependentAssetsLookup xmlns="4873beb7-5857-4685-be1f-d57550cc96cc" xsi:nil="true"/>
+    <TPExecutable xmlns="4873beb7-5857-4685-be1f-d57550cc96cc" xsi:nil="true"/>
+    <EditorialTags xmlns="4873beb7-5857-4685-be1f-d57550cc96cc" xsi:nil="true"/>
+    <SubmitterId xmlns="4873beb7-5857-4685-be1f-d57550cc96cc" xsi:nil="true"/>
+    <ApprovalLog xmlns="4873beb7-5857-4685-be1f-d57550cc96cc" xsi:nil="true"/>
+    <AssetType xmlns="4873beb7-5857-4685-be1f-d57550cc96cc">TP</AssetType>
+    <BugNumber xmlns="4873beb7-5857-4685-be1f-d57550cc96cc" xsi:nil="true"/>
+    <CSXSubmissionDate xmlns="4873beb7-5857-4685-be1f-d57550cc96cc" xsi:nil="true"/>
+    <CSXUpdate xmlns="4873beb7-5857-4685-be1f-d57550cc96cc">false</CSXUpdate>
+    <Milestone xmlns="4873beb7-5857-4685-be1f-d57550cc96cc" xsi:nil="true"/>
+    <RecommendationsModifier xmlns="4873beb7-5857-4685-be1f-d57550cc96cc" xsi:nil="true"/>
+    <OriginAsset xmlns="4873beb7-5857-4685-be1f-d57550cc96cc" xsi:nil="true"/>
+    <TPComponent xmlns="4873beb7-5857-4685-be1f-d57550cc96cc" xsi:nil="true"/>
+    <AssetId xmlns="4873beb7-5857-4685-be1f-d57550cc96cc">TP102787989</AssetId>
+    <IntlLocPriority xmlns="4873beb7-5857-4685-be1f-d57550cc96cc" xsi:nil="true"/>
+    <PolicheckWords xmlns="4873beb7-5857-4685-be1f-d57550cc96cc" xsi:nil="true"/>
+    <TPLaunchHelpLink xmlns="4873beb7-5857-4685-be1f-d57550cc96cc" xsi:nil="true"/>
+    <TPApplication xmlns="4873beb7-5857-4685-be1f-d57550cc96cc" xsi:nil="true"/>
+    <CrawlForDependencies xmlns="4873beb7-5857-4685-be1f-d57550cc96cc">false</CrawlForDependencies>
+    <HandoffToMSDN xmlns="4873beb7-5857-4685-be1f-d57550cc96cc" xsi:nil="true"/>
+    <PlannedPubDate xmlns="4873beb7-5857-4685-be1f-d57550cc96cc" xsi:nil="true"/>
+    <IntlLangReviewer xmlns="4873beb7-5857-4685-be1f-d57550cc96cc" xsi:nil="true"/>
+    <TrustLevel xmlns="4873beb7-5857-4685-be1f-d57550cc96cc">1 Microsoft Managed Content</TrustLevel>
+    <LocLastLocAttemptVersionLookup xmlns="4873beb7-5857-4685-be1f-d57550cc96cc">694266</LocLastLocAttemptVersionLookup>
+    <LocProcessedForHandoffsLookup xmlns="4873beb7-5857-4685-be1f-d57550cc96cc" xsi:nil="true"/>
+    <IsSearchable xmlns="4873beb7-5857-4685-be1f-d57550cc96cc">true</IsSearchable>
+    <TemplateTemplateType xmlns="4873beb7-5857-4685-be1f-d57550cc96cc">PowerPoint Presentation Template</TemplateTemplateType>
+    <CampaignTagsTaxHTField0 xmlns="4873beb7-5857-4685-be1f-d57550cc96cc">
+      <Terms xmlns="http://schemas.microsoft.com/office/infopath/2007/PartnerControls"/>
+    </CampaignTagsTaxHTField0>
+    <TPNamespace xmlns="4873beb7-5857-4685-be1f-d57550cc96cc" xsi:nil="true"/>
+    <LocOverallPreviewStatusLookup xmlns="4873beb7-5857-4685-be1f-d57550cc96cc" xsi:nil="true"/>
+    <TaxCatchAll xmlns="4873beb7-5857-4685-be1f-d57550cc96cc"/>
+    <Markets xmlns="4873beb7-5857-4685-be1f-d57550cc96cc"/>
+    <UAProjectedTotalWords xmlns="4873beb7-5857-4685-be1f-d57550cc96cc" xsi:nil="true"/>
+    <IntlLangReview xmlns="4873beb7-5857-4685-be1f-d57550cc96cc" xsi:nil="true"/>
+    <OutputCachingOn xmlns="4873beb7-5857-4685-be1f-d57550cc96cc">false</OutputCachingOn>
+    <AverageRating xmlns="4873beb7-5857-4685-be1f-d57550cc96cc" xsi:nil="true"/>
+    <APAuthor xmlns="4873beb7-5857-4685-be1f-d57550cc96cc">
+      <UserInfo>
+        <DisplayName>REDMOND\kristaa</DisplayName>
+        <AccountId>136</AccountId>
+        <AccountType/>
+      </UserInfo>
+    </APAuthor>
+    <LocManualTestRequired xmlns="4873beb7-5857-4685-be1f-d57550cc96cc">false</LocManualTestRequired>
+    <TPCommandLine xmlns="4873beb7-5857-4685-be1f-d57550cc96cc" xsi:nil="true"/>
+    <TPAppVersion xmlns="4873beb7-5857-4685-be1f-d57550cc96cc" xsi:nil="true"/>
+    <EditorialStatus xmlns="4873beb7-5857-4685-be1f-d57550cc96cc">Complete</EditorialStatus>
+    <LastModifiedDateTime xmlns="4873beb7-5857-4685-be1f-d57550cc96cc" xsi:nil="true"/>
+    <ScenarioTagsTaxHTField0 xmlns="4873beb7-5857-4685-be1f-d57550cc96cc">
+      <Terms xmlns="http://schemas.microsoft.com/office/infopath/2007/PartnerControls"/>
+    </ScenarioTagsTaxHTField0>
+    <LocProcessedForMarketsLookup xmlns="4873beb7-5857-4685-be1f-d57550cc96cc" xsi:nil="true"/>
+    <TPLaunchHelpLinkType xmlns="4873beb7-5857-4685-be1f-d57550cc96cc">Template</TPLaunchHelpLinkType>
+    <OriginalRelease xmlns="4873beb7-5857-4685-be1f-d57550cc96cc">15</OriginalRelease>
+    <LocalizationTagsTaxHTField0 xmlns="4873beb7-5857-4685-be1f-d57550cc96cc">
+      <Terms xmlns="http://schemas.microsoft.com/office/infopath/2007/PartnerControls"/>
+    </LocalizationTagsTaxHTField0>
+    <UACurrentWords xmlns="4873beb7-5857-4685-be1f-d57550cc96cc" xsi:nil="true"/>
+    <ArtSampleDocs xmlns="4873beb7-5857-4685-be1f-d57550cc96cc" xsi:nil="true"/>
+    <UALocRecommendation xmlns="4873beb7-5857-4685-be1f-d57550cc96cc">Localize</UALocRecommendation>
+    <Manager xmlns="4873beb7-5857-4685-be1f-d57550cc96cc" xsi:nil="true"/>
+    <LocOverallHandbackStatusLookup xmlns="4873beb7-5857-4685-be1f-d57550cc96cc" xsi:nil="true"/>
+    <ShowIn xmlns="4873beb7-5857-4685-be1f-d57550cc96cc">Show everywhere</ShowIn>
+    <UANotes xmlns="4873beb7-5857-4685-be1f-d57550cc96cc" xsi:nil="true"/>
+    <InternalTagsTaxHTField0 xmlns="4873beb7-5857-4685-be1f-d57550cc96cc">
+      <Terms xmlns="http://schemas.microsoft.com/office/infopath/2007/PartnerControls"/>
+    </InternalTagsTaxHTField0>
+    <CSXHash xmlns="4873beb7-5857-4685-be1f-d57550cc96cc" xsi:nil="true"/>
+    <VoteCount xmlns="4873beb7-5857-4685-be1f-d57550cc96cc" xsi:nil="true"/>
+    <AssetExpire xmlns="4873beb7-5857-4685-be1f-d57550cc96cc">2029-05-12T07:00:00+00:00</AssetExpire>
+    <DSATActionTaken xmlns="4873beb7-5857-4685-be1f-d57550cc96cc" xsi:nil="true"/>
+    <CSXSubmissionMarket xmlns="4873beb7-5857-4685-be1f-d57550cc96cc" xsi:nil="true"/>
+    <LocMarketGroupTiers2 xmlns="4873beb7-5857-4685-be1f-d57550cc96cc" xsi:nil="true"/>
+  </documentManagement>
+</p:properties>
+</file>
+
+<file path=customXml/item2.xml><?xml version="1.0" encoding="utf-8"?>
 <ct:contentTypeSchema xmlns:ct="http://schemas.microsoft.com/office/2006/metadata/contentType" xmlns:ma="http://schemas.microsoft.com/office/2006/metadata/properties/metaAttributes" ct:_="" ma:_="" ma:contentTypeName="TemplateFile" ma:contentTypeID="0x0101006EDDDB5EE6D98C44930B742096920B300400F5B6D36B3EF94B4E9A635CDF2A18F5B8" ma:contentTypeVersion="72" ma:contentTypeDescription="Create a new document." ma:contentTypeScope="" ma:versionID="a23e56308344d904b51738559c3d67c9">
   <xsd:schema xmlns:xsd="http://www.w3.org/2001/XMLSchema" xmlns:xs="http://www.w3.org/2001/XMLSchema" xmlns:p="http://schemas.microsoft.com/office/2006/metadata/properties" xmlns:ns2="4873beb7-5857-4685-be1f-d57550cc96cc" targetNamespace="http://schemas.microsoft.com/office/2006/metadata/properties" ma:root="true" ma:fieldsID="cd0908cc4600e77bf5da051303e00c8d" ns2:_="">
     <xsd:import namespace="4873beb7-5857-4685-be1f-d57550cc96cc"/>
@@ -16117,142 +16272,6 @@
 </ct:contentTypeSchema>
 </file>
 
-<file path=customXml/item2.xml><?xml version="1.0" encoding="utf-8"?>
-<p:properties xmlns:p="http://schemas.microsoft.com/office/2006/metadata/properties" xmlns:xsi="http://www.w3.org/2001/XMLSchema-instance" xmlns:pc="http://schemas.microsoft.com/office/infopath/2007/PartnerControls">
-  <documentManagement>
-    <LocPublishedLinkedAssetsLookup xmlns="4873beb7-5857-4685-be1f-d57550cc96cc" xsi:nil="true"/>
-    <ApprovalStatus xmlns="4873beb7-5857-4685-be1f-d57550cc96cc">InProgress</ApprovalStatus>
-    <MarketSpecific xmlns="4873beb7-5857-4685-be1f-d57550cc96cc">false</MarketSpecific>
-    <LocComments xmlns="4873beb7-5857-4685-be1f-d57550cc96cc" xsi:nil="true"/>
-    <LocLastLocAttemptVersionTypeLookup xmlns="4873beb7-5857-4685-be1f-d57550cc96cc" xsi:nil="true"/>
-    <DirectSourceMarket xmlns="4873beb7-5857-4685-be1f-d57550cc96cc" xsi:nil="true"/>
-    <ThumbnailAssetId xmlns="4873beb7-5857-4685-be1f-d57550cc96cc" xsi:nil="true"/>
-    <PrimaryImageGen xmlns="4873beb7-5857-4685-be1f-d57550cc96cc">false</PrimaryImageGen>
-    <LocNewPublishedVersionLookup xmlns="4873beb7-5857-4685-be1f-d57550cc96cc" xsi:nil="true"/>
-    <LegacyData xmlns="4873beb7-5857-4685-be1f-d57550cc96cc" xsi:nil="true"/>
-    <LocRecommendedHandoff xmlns="4873beb7-5857-4685-be1f-d57550cc96cc" xsi:nil="true"/>
-    <BusinessGroup xmlns="4873beb7-5857-4685-be1f-d57550cc96cc" xsi:nil="true"/>
-    <BlockPublish xmlns="4873beb7-5857-4685-be1f-d57550cc96cc">false</BlockPublish>
-    <TPFriendlyName xmlns="4873beb7-5857-4685-be1f-d57550cc96cc" xsi:nil="true"/>
-    <LocOverallPublishStatusLookup xmlns="4873beb7-5857-4685-be1f-d57550cc96cc" xsi:nil="true"/>
-    <NumericId xmlns="4873beb7-5857-4685-be1f-d57550cc96cc" xsi:nil="true"/>
-    <APEditor xmlns="4873beb7-5857-4685-be1f-d57550cc96cc">
-      <UserInfo>
-        <DisplayName/>
-        <AccountId xsi:nil="true"/>
-        <AccountType/>
-      </UserInfo>
-    </APEditor>
-    <SourceTitle xmlns="4873beb7-5857-4685-be1f-d57550cc96cc" xsi:nil="true"/>
-    <OpenTemplate xmlns="4873beb7-5857-4685-be1f-d57550cc96cc">true</OpenTemplate>
-    <LocOverallLocStatusLookup xmlns="4873beb7-5857-4685-be1f-d57550cc96cc" xsi:nil="true"/>
-    <UALocComments xmlns="4873beb7-5857-4685-be1f-d57550cc96cc" xsi:nil="true"/>
-    <ParentAssetId xmlns="4873beb7-5857-4685-be1f-d57550cc96cc" xsi:nil="true"/>
-    <IntlLangReviewDate xmlns="4873beb7-5857-4685-be1f-d57550cc96cc" xsi:nil="true"/>
-    <FeatureTagsTaxHTField0 xmlns="4873beb7-5857-4685-be1f-d57550cc96cc">
-      <Terms xmlns="http://schemas.microsoft.com/office/infopath/2007/PartnerControls"/>
-    </FeatureTagsTaxHTField0>
-    <PublishStatusLookup xmlns="4873beb7-5857-4685-be1f-d57550cc96cc">
-      <Value>1345093</Value>
-    </PublishStatusLookup>
-    <Providers xmlns="4873beb7-5857-4685-be1f-d57550cc96cc" xsi:nil="true"/>
-    <MachineTranslated xmlns="4873beb7-5857-4685-be1f-d57550cc96cc">false</MachineTranslated>
-    <OriginalSourceMarket xmlns="4873beb7-5857-4685-be1f-d57550cc96cc" xsi:nil="true"/>
-    <APDescription xmlns="4873beb7-5857-4685-be1f-d57550cc96cc">This simple template design works for technology and  businesses, but it's versatile enough to use in other contexts.  It features multiple slide layouts designed for widescreen (16x9 resolution) and includes a sample SmartArt list and chart that are easily editable.</APDescription>
-    <ClipArtFilename xmlns="4873beb7-5857-4685-be1f-d57550cc96cc" xsi:nil="true"/>
-    <ContentItem xmlns="4873beb7-5857-4685-be1f-d57550cc96cc" xsi:nil="true"/>
-    <TPInstallLocation xmlns="4873beb7-5857-4685-be1f-d57550cc96cc" xsi:nil="true"/>
-    <PublishTargets xmlns="4873beb7-5857-4685-be1f-d57550cc96cc">OfficeOnlineVNext</PublishTargets>
-    <TimesCloned xmlns="4873beb7-5857-4685-be1f-d57550cc96cc" xsi:nil="true"/>
-    <AssetStart xmlns="4873beb7-5857-4685-be1f-d57550cc96cc">2011-11-26T00:30:00+00:00</AssetStart>
-    <Provider xmlns="4873beb7-5857-4685-be1f-d57550cc96cc" xsi:nil="true"/>
-    <AcquiredFrom xmlns="4873beb7-5857-4685-be1f-d57550cc96cc">Internal MS</AcquiredFrom>
-    <FriendlyTitle xmlns="4873beb7-5857-4685-be1f-d57550cc96cc" xsi:nil="true"/>
-    <LastHandOff xmlns="4873beb7-5857-4685-be1f-d57550cc96cc" xsi:nil="true"/>
-    <TPClientViewer xmlns="4873beb7-5857-4685-be1f-d57550cc96cc" xsi:nil="true"/>
-    <TemplateStatus xmlns="4873beb7-5857-4685-be1f-d57550cc96cc">Complete</TemplateStatus>
-    <Downloads xmlns="4873beb7-5857-4685-be1f-d57550cc96cc">0</Downloads>
-    <OOCacheId xmlns="4873beb7-5857-4685-be1f-d57550cc96cc" xsi:nil="true"/>
-    <IsDeleted xmlns="4873beb7-5857-4685-be1f-d57550cc96cc">false</IsDeleted>
-    <LocPublishedDependentAssetsLookup xmlns="4873beb7-5857-4685-be1f-d57550cc96cc" xsi:nil="true"/>
-    <TPExecutable xmlns="4873beb7-5857-4685-be1f-d57550cc96cc" xsi:nil="true"/>
-    <EditorialTags xmlns="4873beb7-5857-4685-be1f-d57550cc96cc" xsi:nil="true"/>
-    <SubmitterId xmlns="4873beb7-5857-4685-be1f-d57550cc96cc" xsi:nil="true"/>
-    <ApprovalLog xmlns="4873beb7-5857-4685-be1f-d57550cc96cc" xsi:nil="true"/>
-    <AssetType xmlns="4873beb7-5857-4685-be1f-d57550cc96cc">TP</AssetType>
-    <BugNumber xmlns="4873beb7-5857-4685-be1f-d57550cc96cc" xsi:nil="true"/>
-    <CSXSubmissionDate xmlns="4873beb7-5857-4685-be1f-d57550cc96cc" xsi:nil="true"/>
-    <CSXUpdate xmlns="4873beb7-5857-4685-be1f-d57550cc96cc">false</CSXUpdate>
-    <Milestone xmlns="4873beb7-5857-4685-be1f-d57550cc96cc" xsi:nil="true"/>
-    <RecommendationsModifier xmlns="4873beb7-5857-4685-be1f-d57550cc96cc" xsi:nil="true"/>
-    <OriginAsset xmlns="4873beb7-5857-4685-be1f-d57550cc96cc" xsi:nil="true"/>
-    <TPComponent xmlns="4873beb7-5857-4685-be1f-d57550cc96cc" xsi:nil="true"/>
-    <AssetId xmlns="4873beb7-5857-4685-be1f-d57550cc96cc">TP102787989</AssetId>
-    <IntlLocPriority xmlns="4873beb7-5857-4685-be1f-d57550cc96cc" xsi:nil="true"/>
-    <PolicheckWords xmlns="4873beb7-5857-4685-be1f-d57550cc96cc" xsi:nil="true"/>
-    <TPLaunchHelpLink xmlns="4873beb7-5857-4685-be1f-d57550cc96cc" xsi:nil="true"/>
-    <TPApplication xmlns="4873beb7-5857-4685-be1f-d57550cc96cc" xsi:nil="true"/>
-    <CrawlForDependencies xmlns="4873beb7-5857-4685-be1f-d57550cc96cc">false</CrawlForDependencies>
-    <HandoffToMSDN xmlns="4873beb7-5857-4685-be1f-d57550cc96cc" xsi:nil="true"/>
-    <PlannedPubDate xmlns="4873beb7-5857-4685-be1f-d57550cc96cc" xsi:nil="true"/>
-    <IntlLangReviewer xmlns="4873beb7-5857-4685-be1f-d57550cc96cc" xsi:nil="true"/>
-    <TrustLevel xmlns="4873beb7-5857-4685-be1f-d57550cc96cc">1 Microsoft Managed Content</TrustLevel>
-    <LocLastLocAttemptVersionLookup xmlns="4873beb7-5857-4685-be1f-d57550cc96cc">694266</LocLastLocAttemptVersionLookup>
-    <LocProcessedForHandoffsLookup xmlns="4873beb7-5857-4685-be1f-d57550cc96cc" xsi:nil="true"/>
-    <IsSearchable xmlns="4873beb7-5857-4685-be1f-d57550cc96cc">true</IsSearchable>
-    <TemplateTemplateType xmlns="4873beb7-5857-4685-be1f-d57550cc96cc">PowerPoint Presentation Template</TemplateTemplateType>
-    <CampaignTagsTaxHTField0 xmlns="4873beb7-5857-4685-be1f-d57550cc96cc">
-      <Terms xmlns="http://schemas.microsoft.com/office/infopath/2007/PartnerControls"/>
-    </CampaignTagsTaxHTField0>
-    <TPNamespace xmlns="4873beb7-5857-4685-be1f-d57550cc96cc" xsi:nil="true"/>
-    <LocOverallPreviewStatusLookup xmlns="4873beb7-5857-4685-be1f-d57550cc96cc" xsi:nil="true"/>
-    <TaxCatchAll xmlns="4873beb7-5857-4685-be1f-d57550cc96cc"/>
-    <Markets xmlns="4873beb7-5857-4685-be1f-d57550cc96cc"/>
-    <UAProjectedTotalWords xmlns="4873beb7-5857-4685-be1f-d57550cc96cc" xsi:nil="true"/>
-    <IntlLangReview xmlns="4873beb7-5857-4685-be1f-d57550cc96cc" xsi:nil="true"/>
-    <OutputCachingOn xmlns="4873beb7-5857-4685-be1f-d57550cc96cc">false</OutputCachingOn>
-    <AverageRating xmlns="4873beb7-5857-4685-be1f-d57550cc96cc" xsi:nil="true"/>
-    <APAuthor xmlns="4873beb7-5857-4685-be1f-d57550cc96cc">
-      <UserInfo>
-        <DisplayName>REDMOND\kristaa</DisplayName>
-        <AccountId>136</AccountId>
-        <AccountType/>
-      </UserInfo>
-    </APAuthor>
-    <LocManualTestRequired xmlns="4873beb7-5857-4685-be1f-d57550cc96cc">false</LocManualTestRequired>
-    <TPCommandLine xmlns="4873beb7-5857-4685-be1f-d57550cc96cc" xsi:nil="true"/>
-    <TPAppVersion xmlns="4873beb7-5857-4685-be1f-d57550cc96cc" xsi:nil="true"/>
-    <EditorialStatus xmlns="4873beb7-5857-4685-be1f-d57550cc96cc">Complete</EditorialStatus>
-    <LastModifiedDateTime xmlns="4873beb7-5857-4685-be1f-d57550cc96cc" xsi:nil="true"/>
-    <ScenarioTagsTaxHTField0 xmlns="4873beb7-5857-4685-be1f-d57550cc96cc">
-      <Terms xmlns="http://schemas.microsoft.com/office/infopath/2007/PartnerControls"/>
-    </ScenarioTagsTaxHTField0>
-    <LocProcessedForMarketsLookup xmlns="4873beb7-5857-4685-be1f-d57550cc96cc" xsi:nil="true"/>
-    <TPLaunchHelpLinkType xmlns="4873beb7-5857-4685-be1f-d57550cc96cc">Template</TPLaunchHelpLinkType>
-    <OriginalRelease xmlns="4873beb7-5857-4685-be1f-d57550cc96cc">15</OriginalRelease>
-    <LocalizationTagsTaxHTField0 xmlns="4873beb7-5857-4685-be1f-d57550cc96cc">
-      <Terms xmlns="http://schemas.microsoft.com/office/infopath/2007/PartnerControls"/>
-    </LocalizationTagsTaxHTField0>
-    <UACurrentWords xmlns="4873beb7-5857-4685-be1f-d57550cc96cc" xsi:nil="true"/>
-    <ArtSampleDocs xmlns="4873beb7-5857-4685-be1f-d57550cc96cc" xsi:nil="true"/>
-    <UALocRecommendation xmlns="4873beb7-5857-4685-be1f-d57550cc96cc">Localize</UALocRecommendation>
-    <Manager xmlns="4873beb7-5857-4685-be1f-d57550cc96cc" xsi:nil="true"/>
-    <LocOverallHandbackStatusLookup xmlns="4873beb7-5857-4685-be1f-d57550cc96cc" xsi:nil="true"/>
-    <ShowIn xmlns="4873beb7-5857-4685-be1f-d57550cc96cc">Show everywhere</ShowIn>
-    <UANotes xmlns="4873beb7-5857-4685-be1f-d57550cc96cc" xsi:nil="true"/>
-    <InternalTagsTaxHTField0 xmlns="4873beb7-5857-4685-be1f-d57550cc96cc">
-      <Terms xmlns="http://schemas.microsoft.com/office/infopath/2007/PartnerControls"/>
-    </InternalTagsTaxHTField0>
-    <CSXHash xmlns="4873beb7-5857-4685-be1f-d57550cc96cc" xsi:nil="true"/>
-    <VoteCount xmlns="4873beb7-5857-4685-be1f-d57550cc96cc" xsi:nil="true"/>
-    <AssetExpire xmlns="4873beb7-5857-4685-be1f-d57550cc96cc">2029-05-12T07:00:00+00:00</AssetExpire>
-    <DSATActionTaken xmlns="4873beb7-5857-4685-be1f-d57550cc96cc" xsi:nil="true"/>
-    <CSXSubmissionMarket xmlns="4873beb7-5857-4685-be1f-d57550cc96cc" xsi:nil="true"/>
-    <LocMarketGroupTiers2 xmlns="4873beb7-5857-4685-be1f-d57550cc96cc" xsi:nil="true"/>
-  </documentManagement>
-</p:properties>
-</file>
-
 <file path=customXml/item3.xml><?xml version="1.0" encoding="utf-8"?>
 <?mso-contentType ?>
 <FormTemplates xmlns="http://schemas.microsoft.com/sharepoint/v3/contenttype/forms">
@@ -16263,6 +16282,22 @@
 </file>
 
 <file path=customXml/itemProps1.xml><?xml version="1.0" encoding="utf-8"?>
+<ds:datastoreItem xmlns:ds="http://schemas.openxmlformats.org/officeDocument/2006/customXml" ds:itemID="{60C67BEE-D13F-4BD2-98A5-34D8A0977F68}">
+  <ds:schemaRefs>
+    <ds:schemaRef ds:uri="http://schemas.openxmlformats.org/package/2006/metadata/core-properties"/>
+    <ds:schemaRef ds:uri="http://schemas.microsoft.com/office/2006/metadata/properties"/>
+    <ds:schemaRef ds:uri="http://schemas.microsoft.com/office/2006/documentManagement/types"/>
+    <ds:schemaRef ds:uri="http://purl.org/dc/dcmitype/"/>
+    <ds:schemaRef ds:uri="http://purl.org/dc/elements/1.1/"/>
+    <ds:schemaRef ds:uri="4873beb7-5857-4685-be1f-d57550cc96cc"/>
+    <ds:schemaRef ds:uri="http://purl.org/dc/terms/"/>
+    <ds:schemaRef ds:uri="http://www.w3.org/XML/1998/namespace"/>
+    <ds:schemaRef ds:uri="http://schemas.microsoft.com/office/infopath/2007/PartnerControls"/>
+  </ds:schemaRefs>
+</ds:datastoreItem>
+</file>
+
+<file path=customXml/itemProps2.xml><?xml version="1.0" encoding="utf-8"?>
 <ds:datastoreItem xmlns:ds="http://schemas.openxmlformats.org/officeDocument/2006/customXml" ds:itemID="{A09BF4D4-EF60-4196-BFC3-9462D607978C}">
   <ds:schemaRefs>
     <ds:schemaRef ds:uri="http://schemas.microsoft.com/office/2006/metadata/contentType"/>
@@ -16280,22 +16315,6 @@
 </ds:datastoreItem>
 </file>
 
-<file path=customXml/itemProps2.xml><?xml version="1.0" encoding="utf-8"?>
-<ds:datastoreItem xmlns:ds="http://schemas.openxmlformats.org/officeDocument/2006/customXml" ds:itemID="{60C67BEE-D13F-4BD2-98A5-34D8A0977F68}">
-  <ds:schemaRefs>
-    <ds:schemaRef ds:uri="http://schemas.openxmlformats.org/package/2006/metadata/core-properties"/>
-    <ds:schemaRef ds:uri="http://schemas.microsoft.com/office/2006/metadata/properties"/>
-    <ds:schemaRef ds:uri="http://schemas.microsoft.com/office/2006/documentManagement/types"/>
-    <ds:schemaRef ds:uri="http://purl.org/dc/dcmitype/"/>
-    <ds:schemaRef ds:uri="http://purl.org/dc/elements/1.1/"/>
-    <ds:schemaRef ds:uri="4873beb7-5857-4685-be1f-d57550cc96cc"/>
-    <ds:schemaRef ds:uri="http://purl.org/dc/terms/"/>
-    <ds:schemaRef ds:uri="http://www.w3.org/XML/1998/namespace"/>
-    <ds:schemaRef ds:uri="http://schemas.microsoft.com/office/infopath/2007/PartnerControls"/>
-  </ds:schemaRefs>
-</ds:datastoreItem>
-</file>
-
 <file path=customXml/itemProps3.xml><?xml version="1.0" encoding="utf-8"?>
 <ds:datastoreItem xmlns:ds="http://schemas.openxmlformats.org/officeDocument/2006/customXml" ds:itemID="{3836F65B-1B07-41EE-A0E8-BC6EF3855225}">
   <ds:schemaRefs>

</xml_diff>

<commit_message>
Inicio de Pipes en diapositivas
</commit_message>
<xml_diff>
--- a/Angular.pptx
+++ b/Angular.pptx
@@ -5,10 +5,10 @@
     <p:sldMasterId id="2147483660" r:id="rId4"/>
   </p:sldMasterIdLst>
   <p:notesMasterIdLst>
-    <p:notesMasterId r:id="rId36"/>
+    <p:notesMasterId r:id="rId43"/>
   </p:notesMasterIdLst>
   <p:handoutMasterIdLst>
-    <p:handoutMasterId r:id="rId37"/>
+    <p:handoutMasterId r:id="rId44"/>
   </p:handoutMasterIdLst>
   <p:sldIdLst>
     <p:sldId id="257" r:id="rId5"/>
@@ -42,6 +42,13 @@
     <p:sldId id="304" r:id="rId33"/>
     <p:sldId id="295" r:id="rId34"/>
     <p:sldId id="305" r:id="rId35"/>
+    <p:sldId id="306" r:id="rId36"/>
+    <p:sldId id="307" r:id="rId37"/>
+    <p:sldId id="308" r:id="rId38"/>
+    <p:sldId id="312" r:id="rId39"/>
+    <p:sldId id="311" r:id="rId40"/>
+    <p:sldId id="310" r:id="rId41"/>
+    <p:sldId id="313" r:id="rId42"/>
   </p:sldIdLst>
   <p:sldSz cx="12188825" cy="6858000"/>
   <p:notesSz cx="6858000" cy="9144000"/>
@@ -3412,7 +3419,7 @@
             <a:pPr algn="r" rtl="0"/>
             <a:fld id="{C8F1D84B-F747-4821-8617-FBD61E8F4308}" type="datetime1">
               <a:rPr lang="es-ES" smtClean="0"/>
-              <a:t>18/12/2018</a:t>
+              <a:t>19/12/2018</a:t>
             </a:fld>
             <a:endParaRPr lang="es-ES" dirty="0"/>
           </a:p>
@@ -3481,7 +3488,7 @@
             <a:fld id="{79429053-DC2A-4342-ADD4-2FD729D91E2C}" type="slidenum">
               <a:rPr lang="es-ES" smtClean="0"/>
               <a:pPr algn="r" rtl="0"/>
-              <a:t>‹#›</a:t>
+              <a:t>‹Nº›</a:t>
             </a:fld>
             <a:endParaRPr lang="es-ES" dirty="0"/>
           </a:p>
@@ -3582,7 +3589,7 @@
             <a:fld id="{DA87C823-BB9F-45DA-99AB-416A32E1B948}" type="datetime1">
               <a:rPr lang="es-ES" noProof="0" smtClean="0"/>
               <a:pPr/>
-              <a:t>18/12/2018</a:t>
+              <a:t>19/12/2018</a:t>
             </a:fld>
             <a:endParaRPr lang="es-ES" noProof="0" dirty="0"/>
           </a:p>
@@ -3743,7 +3750,7 @@
             <a:fld id="{3EBA5BD7-F043-4D1B-AA17-CD412FC534DE}" type="slidenum">
               <a:rPr lang="es-ES" noProof="0" smtClean="0"/>
               <a:pPr/>
-              <a:t>‹#›</a:t>
+              <a:t>‹Nº›</a:t>
             </a:fld>
             <a:endParaRPr lang="es-ES" noProof="0" dirty="0"/>
           </a:p>
@@ -5210,7 +5217,7 @@
             <a:fld id="{A042E67D-14C0-4ED9-A218-9C14494A6A84}" type="datetime1">
               <a:rPr lang="es-ES" noProof="0" smtClean="0"/>
               <a:pPr/>
-              <a:t>18/12/2018</a:t>
+              <a:t>19/12/2018</a:t>
             </a:fld>
             <a:endParaRPr lang="es-ES" noProof="0" dirty="0"/>
           </a:p>
@@ -5254,7 +5261,7 @@
             <a:pPr rtl="0"/>
             <a:fld id="{C014DD1E-5D91-48A3-AD6D-45FBA980D106}" type="slidenum">
               <a:rPr lang="es-ES" noProof="0" smtClean="0"/>
-              <a:t>‹#›</a:t>
+              <a:t>‹Nº›</a:t>
             </a:fld>
             <a:endParaRPr lang="es-ES" noProof="0" dirty="0"/>
           </a:p>
@@ -5420,7 +5427,7 @@
             <a:fld id="{40A1DB83-C382-4684-8887-65A03EA4FFF0}" type="datetime1">
               <a:rPr lang="es-ES" noProof="0" smtClean="0"/>
               <a:pPr/>
-              <a:t>18/12/2018</a:t>
+              <a:t>19/12/2018</a:t>
             </a:fld>
             <a:endParaRPr lang="es-ES" noProof="0" dirty="0"/>
           </a:p>
@@ -5464,7 +5471,7 @@
             <a:pPr rtl="0"/>
             <a:fld id="{C014DD1E-5D91-48A3-AD6D-45FBA980D106}" type="slidenum">
               <a:rPr lang="es-ES" noProof="0" smtClean="0"/>
-              <a:t>‹#›</a:t>
+              <a:t>‹Nº›</a:t>
             </a:fld>
             <a:endParaRPr lang="es-ES" noProof="0" dirty="0"/>
           </a:p>
@@ -5636,7 +5643,7 @@
             <a:fld id="{C60E81D3-9B82-44CA-B1F9-FCEFDC87935B}" type="datetime1">
               <a:rPr lang="es-ES" noProof="0" smtClean="0"/>
               <a:pPr/>
-              <a:t>18/12/2018</a:t>
+              <a:t>19/12/2018</a:t>
             </a:fld>
             <a:endParaRPr lang="es-ES" noProof="0" dirty="0"/>
           </a:p>
@@ -5680,7 +5687,7 @@
             <a:pPr rtl="0"/>
             <a:fld id="{C014DD1E-5D91-48A3-AD6D-45FBA980D106}" type="slidenum">
               <a:rPr lang="es-ES" noProof="0" smtClean="0"/>
-              <a:t>‹#›</a:t>
+              <a:t>‹Nº›</a:t>
             </a:fld>
             <a:endParaRPr lang="es-ES" noProof="0" dirty="0"/>
           </a:p>
@@ -5842,7 +5849,7 @@
             <a:fld id="{82E48AAE-5AE8-418A-A225-B506C222F2F9}" type="datetime1">
               <a:rPr lang="es-ES" noProof="0" smtClean="0"/>
               <a:pPr/>
-              <a:t>18/12/2018</a:t>
+              <a:t>19/12/2018</a:t>
             </a:fld>
             <a:endParaRPr lang="es-ES" noProof="0" dirty="0"/>
           </a:p>
@@ -5886,7 +5893,7 @@
             <a:pPr rtl="0"/>
             <a:fld id="{C014DD1E-5D91-48A3-AD6D-45FBA980D106}" type="slidenum">
               <a:rPr lang="es-ES" noProof="0" smtClean="0"/>
-              <a:t>‹#›</a:t>
+              <a:t>‹Nº›</a:t>
             </a:fld>
             <a:endParaRPr lang="es-ES" noProof="0" dirty="0"/>
           </a:p>
@@ -6282,7 +6289,7 @@
             <a:fld id="{AA1D35CA-82F5-4AD4-B9EC-66E805B73542}" type="datetime1">
               <a:rPr lang="es-ES" noProof="0" smtClean="0"/>
               <a:pPr/>
-              <a:t>18/12/2018</a:t>
+              <a:t>19/12/2018</a:t>
             </a:fld>
             <a:endParaRPr lang="es-ES" noProof="0" dirty="0"/>
           </a:p>
@@ -6326,7 +6333,7 @@
             <a:pPr rtl="0"/>
             <a:fld id="{C014DD1E-5D91-48A3-AD6D-45FBA980D106}" type="slidenum">
               <a:rPr lang="es-ES" noProof="0" smtClean="0"/>
-              <a:t>‹#›</a:t>
+              <a:t>‹Nº›</a:t>
             </a:fld>
             <a:endParaRPr lang="es-ES" noProof="0" dirty="0"/>
           </a:p>
@@ -6594,7 +6601,7 @@
             <a:fld id="{834CCE92-710B-4678-B1B1-EFCAA5CDF075}" type="datetime1">
               <a:rPr lang="es-ES" noProof="0" smtClean="0"/>
               <a:pPr/>
-              <a:t>18/12/2018</a:t>
+              <a:t>19/12/2018</a:t>
             </a:fld>
             <a:endParaRPr lang="es-ES" noProof="0" dirty="0"/>
           </a:p>
@@ -6638,7 +6645,7 @@
             <a:pPr rtl="0"/>
             <a:fld id="{C014DD1E-5D91-48A3-AD6D-45FBA980D106}" type="slidenum">
               <a:rPr lang="es-ES" noProof="0" smtClean="0"/>
-              <a:t>‹#›</a:t>
+              <a:t>‹Nº›</a:t>
             </a:fld>
             <a:endParaRPr lang="es-ES" noProof="0" dirty="0"/>
           </a:p>
@@ -7058,7 +7065,7 @@
             <a:fld id="{83FB0F2C-25D9-4D7E-B43A-29A2E16C960D}" type="datetime1">
               <a:rPr lang="es-ES" noProof="0" smtClean="0"/>
               <a:pPr/>
-              <a:t>18/12/2018</a:t>
+              <a:t>19/12/2018</a:t>
             </a:fld>
             <a:endParaRPr lang="es-ES" noProof="0" dirty="0"/>
           </a:p>
@@ -7102,7 +7109,7 @@
             <a:pPr rtl="0"/>
             <a:fld id="{C014DD1E-5D91-48A3-AD6D-45FBA980D106}" type="slidenum">
               <a:rPr lang="es-ES" noProof="0" smtClean="0"/>
-              <a:t>‹#›</a:t>
+              <a:t>‹Nº›</a:t>
             </a:fld>
             <a:endParaRPr lang="es-ES" noProof="0" dirty="0"/>
           </a:p>
@@ -7196,7 +7203,7 @@
             <a:fld id="{FD34687D-B11B-47A5-95F6-B79DA932A6DF}" type="datetime1">
               <a:rPr lang="es-ES" noProof="0" smtClean="0"/>
               <a:pPr/>
-              <a:t>18/12/2018</a:t>
+              <a:t>19/12/2018</a:t>
             </a:fld>
             <a:endParaRPr lang="es-ES" noProof="0" dirty="0"/>
           </a:p>
@@ -7240,7 +7247,7 @@
             <a:pPr rtl="0"/>
             <a:fld id="{C014DD1E-5D91-48A3-AD6D-45FBA980D106}" type="slidenum">
               <a:rPr lang="es-ES" noProof="0" smtClean="0"/>
-              <a:t>‹#›</a:t>
+              <a:t>‹Nº›</a:t>
             </a:fld>
             <a:endParaRPr lang="es-ES" noProof="0" dirty="0"/>
           </a:p>
@@ -7310,7 +7317,7 @@
             <a:fld id="{93C656DE-1E46-4450-9484-A739B4FADFBC}" type="datetime1">
               <a:rPr lang="es-ES" noProof="0" smtClean="0"/>
               <a:pPr/>
-              <a:t>18/12/2018</a:t>
+              <a:t>19/12/2018</a:t>
             </a:fld>
             <a:endParaRPr lang="es-ES" noProof="0" dirty="0"/>
           </a:p>
@@ -7354,7 +7361,7 @@
             <a:pPr rtl="0"/>
             <a:fld id="{C014DD1E-5D91-48A3-AD6D-45FBA980D106}" type="slidenum">
               <a:rPr lang="es-ES" noProof="0" smtClean="0"/>
-              <a:t>‹#›</a:t>
+              <a:t>‹Nº›</a:t>
             </a:fld>
             <a:endParaRPr lang="es-ES" noProof="0" dirty="0"/>
           </a:p>
@@ -7617,7 +7624,7 @@
             <a:fld id="{EEA77F8B-D469-4ECD-B91E-3B01AD692331}" type="datetime1">
               <a:rPr lang="es-ES" noProof="0" smtClean="0"/>
               <a:pPr/>
-              <a:t>18/12/2018</a:t>
+              <a:t>19/12/2018</a:t>
             </a:fld>
             <a:endParaRPr lang="es-ES" noProof="0" dirty="0"/>
           </a:p>
@@ -7661,7 +7668,7 @@
             <a:pPr rtl="0"/>
             <a:fld id="{C014DD1E-5D91-48A3-AD6D-45FBA980D106}" type="slidenum">
               <a:rPr lang="es-ES" noProof="0" smtClean="0"/>
-              <a:t>‹#›</a:t>
+              <a:t>‹Nº›</a:t>
             </a:fld>
             <a:endParaRPr lang="es-ES" noProof="0" dirty="0"/>
           </a:p>
@@ -7914,7 +7921,7 @@
             <a:fld id="{49BA7B1C-709E-4257-93A5-EC2F0807D42F}" type="datetime1">
               <a:rPr lang="es-ES" noProof="0" smtClean="0"/>
               <a:pPr/>
-              <a:t>18/12/2018</a:t>
+              <a:t>19/12/2018</a:t>
             </a:fld>
             <a:endParaRPr lang="es-ES" noProof="0" dirty="0"/>
           </a:p>
@@ -7958,7 +7965,7 @@
             <a:pPr rtl="0"/>
             <a:fld id="{C014DD1E-5D91-48A3-AD6D-45FBA980D106}" type="slidenum">
               <a:rPr lang="es-ES" noProof="0" smtClean="0"/>
-              <a:t>‹#›</a:t>
+              <a:t>‹Nº›</a:t>
             </a:fld>
             <a:endParaRPr lang="es-ES" noProof="0" dirty="0"/>
           </a:p>
@@ -8538,7 +8545,7 @@
             <a:fld id="{35C83AD5-F5AF-4BDC-901E-85A05CCFFAAA}" type="datetime1">
               <a:rPr lang="es-ES" noProof="0" smtClean="0"/>
               <a:pPr/>
-              <a:t>18/12/2018</a:t>
+              <a:t>19/12/2018</a:t>
             </a:fld>
             <a:endParaRPr lang="es-ES" noProof="0" dirty="0"/>
           </a:p>
@@ -8618,7 +8625,7 @@
             <a:fld id="{C014DD1E-5D91-48A3-AD6D-45FBA980D106}" type="slidenum">
               <a:rPr lang="es-ES" smtClean="0"/>
               <a:pPr/>
-              <a:t>‹#›</a:t>
+              <a:t>‹Nº›</a:t>
             </a:fld>
             <a:endParaRPr lang="es-ES" dirty="0"/>
           </a:p>
@@ -12356,7 +12363,7 @@
           <a:p>
             <a:r>
               <a:rPr lang="es-ES" dirty="0"/>
-              <a:t>Permiten la comunicación e interacción entre padre e hijo y viceversa.</a:t>
+              <a:t>Permiten la comunicación e interacción entre componentes padre e hijo y viceversa.</a:t>
             </a:r>
           </a:p>
           <a:p>
@@ -12899,7 +12906,7 @@
             </a:pPr>
             <a:r>
               <a:rPr lang="es-ES" dirty="0"/>
-              <a:t>El componente padre le podrá pasar un valor inicial desde donde se iniciara el contador, así como el componente hijo le podrá avisar al componente padre que el contador se ha reiniciado, para que el componente padre pueda mostrar un mensaje de alerta indicando que se reinicio el contador.</a:t>
+              <a:t>El componente padre le podrá pasar un valor inicial desde donde se iniciara el contador, así como el componente hijo le podrá avisar al componente padre que el contador se ha reiniciado para que el componente padre pueda mostrar un mensaje de alerta indicando que se reinicio el contador.</a:t>
             </a:r>
           </a:p>
           <a:p>
@@ -12923,6 +12930,917 @@
     <p:extLst>
       <p:ext uri="{BB962C8B-B14F-4D97-AF65-F5344CB8AC3E}">
         <p14:creationId xmlns:p14="http://schemas.microsoft.com/office/powerpoint/2010/main" val="2150197447"/>
+      </p:ext>
+    </p:extLst>
+  </p:cSld>
+  <p:clrMapOvr>
+    <a:masterClrMapping/>
+  </p:clrMapOvr>
+  <mc:AlternateContent xmlns:mc="http://schemas.openxmlformats.org/markup-compatibility/2006" xmlns:p14="http://schemas.microsoft.com/office/powerpoint/2010/main">
+    <mc:Choice Requires="p14">
+      <p:transition spd="med" p14:dur="700">
+        <p:fade/>
+      </p:transition>
+    </mc:Choice>
+    <mc:Fallback xmlns="">
+      <p:transition spd="med">
+        <p:fade/>
+      </p:transition>
+    </mc:Fallback>
+  </mc:AlternateContent>
+</p:sld>
+</file>
+
+<file path=ppt/slides/slide32.xml><?xml version="1.0" encoding="utf-8"?>
+<p:sld xmlns:a="http://schemas.openxmlformats.org/drawingml/2006/main" xmlns:r="http://schemas.openxmlformats.org/officeDocument/2006/relationships" xmlns:p="http://schemas.openxmlformats.org/presentationml/2006/main">
+  <p:cSld>
+    <p:spTree>
+      <p:nvGrpSpPr>
+        <p:cNvPr id="1" name=""/>
+        <p:cNvGrpSpPr/>
+        <p:nvPr/>
+      </p:nvGrpSpPr>
+      <p:grpSpPr>
+        <a:xfrm>
+          <a:off x="0" y="0"/>
+          <a:ext cx="0" cy="0"/>
+          <a:chOff x="0" y="0"/>
+          <a:chExt cx="0" cy="0"/>
+        </a:xfrm>
+      </p:grpSpPr>
+      <p:sp>
+        <p:nvSpPr>
+          <p:cNvPr id="2" name="Título 1">
+            <a:extLst>
+              <a:ext uri="{FF2B5EF4-FFF2-40B4-BE49-F238E27FC236}">
+                <a16:creationId xmlns:a16="http://schemas.microsoft.com/office/drawing/2014/main" id="{C2683100-E3FB-4717-B85E-73D43C8F1DB3}"/>
+              </a:ext>
+            </a:extLst>
+          </p:cNvPr>
+          <p:cNvSpPr>
+            <a:spLocks noGrp="1"/>
+          </p:cNvSpPr>
+          <p:nvPr>
+            <p:ph type="title"/>
+          </p:nvPr>
+        </p:nvSpPr>
+        <p:spPr/>
+        <p:txBody>
+          <a:bodyPr/>
+          <a:lstStyle/>
+          <a:p>
+            <a:r>
+              <a:rPr lang="es-ES" dirty="0"/>
+              <a:t>Directivas</a:t>
+            </a:r>
+          </a:p>
+        </p:txBody>
+      </p:sp>
+      <p:sp>
+        <p:nvSpPr>
+          <p:cNvPr id="3" name="Marcador de contenido 2">
+            <a:extLst>
+              <a:ext uri="{FF2B5EF4-FFF2-40B4-BE49-F238E27FC236}">
+                <a16:creationId xmlns:a16="http://schemas.microsoft.com/office/drawing/2014/main" id="{11CD8C93-B4C2-4E56-BAEF-8BA95C1A7028}"/>
+              </a:ext>
+            </a:extLst>
+          </p:cNvPr>
+          <p:cNvSpPr>
+            <a:spLocks noGrp="1"/>
+          </p:cNvSpPr>
+          <p:nvPr>
+            <p:ph idx="1"/>
+          </p:nvPr>
+        </p:nvSpPr>
+        <p:spPr>
+          <a:xfrm>
+            <a:off x="1218883" y="1701796"/>
+            <a:ext cx="5523601" cy="4679531"/>
+          </a:xfrm>
+        </p:spPr>
+        <p:txBody>
+          <a:bodyPr/>
+          <a:lstStyle/>
+          <a:p>
+            <a:r>
+              <a:rPr lang="es-ES" dirty="0"/>
+              <a:t>Instrucciones que se ejecutan sobre los elementos del HTML</a:t>
+            </a:r>
+          </a:p>
+          <a:p>
+            <a:r>
+              <a:rPr lang="es-ES" dirty="0"/>
+              <a:t>Definido por el decorador @</a:t>
+            </a:r>
+            <a:r>
+              <a:rPr lang="es-ES" dirty="0" err="1"/>
+              <a:t>Directive</a:t>
+            </a:r>
+            <a:endParaRPr lang="es-ES" dirty="0"/>
+          </a:p>
+          <a:p>
+            <a:r>
+              <a:rPr lang="es-ES" dirty="0"/>
+              <a:t>Reutilizar lógica en diferentes componentes, para eliminar, modificar o actualizar algún elemento.</a:t>
+            </a:r>
+          </a:p>
+        </p:txBody>
+      </p:sp>
+      <p:pic>
+        <p:nvPicPr>
+          <p:cNvPr id="4" name="Imagen 3">
+            <a:extLst>
+              <a:ext uri="{FF2B5EF4-FFF2-40B4-BE49-F238E27FC236}">
+                <a16:creationId xmlns:a16="http://schemas.microsoft.com/office/drawing/2014/main" id="{D8C01522-93BD-4D6A-BD1B-23690F3900A1}"/>
+              </a:ext>
+            </a:extLst>
+          </p:cNvPr>
+          <p:cNvPicPr>
+            <a:picLocks noChangeAspect="1"/>
+          </p:cNvPicPr>
+          <p:nvPr/>
+        </p:nvPicPr>
+        <p:blipFill>
+          <a:blip r:embed="rId2"/>
+          <a:stretch>
+            <a:fillRect/>
+          </a:stretch>
+        </p:blipFill>
+        <p:spPr>
+          <a:xfrm>
+            <a:off x="6886500" y="1701796"/>
+            <a:ext cx="4613467" cy="2624062"/>
+          </a:xfrm>
+          <a:prstGeom prst="rect">
+            <a:avLst/>
+          </a:prstGeom>
+        </p:spPr>
+      </p:pic>
+      <p:pic>
+        <p:nvPicPr>
+          <p:cNvPr id="5" name="Imagen 4">
+            <a:extLst>
+              <a:ext uri="{FF2B5EF4-FFF2-40B4-BE49-F238E27FC236}">
+                <a16:creationId xmlns:a16="http://schemas.microsoft.com/office/drawing/2014/main" id="{75BB6C3C-0F2F-43F0-850E-90C4E0F854B5}"/>
+              </a:ext>
+            </a:extLst>
+          </p:cNvPr>
+          <p:cNvPicPr>
+            <a:picLocks noChangeAspect="1"/>
+          </p:cNvPicPr>
+          <p:nvPr/>
+        </p:nvPicPr>
+        <p:blipFill>
+          <a:blip r:embed="rId3"/>
+          <a:stretch>
+            <a:fillRect/>
+          </a:stretch>
+        </p:blipFill>
+        <p:spPr>
+          <a:xfrm>
+            <a:off x="6886500" y="4889504"/>
+            <a:ext cx="4474899" cy="843752"/>
+          </a:xfrm>
+          <a:prstGeom prst="rect">
+            <a:avLst/>
+          </a:prstGeom>
+        </p:spPr>
+      </p:pic>
+    </p:spTree>
+    <p:extLst>
+      <p:ext uri="{BB962C8B-B14F-4D97-AF65-F5344CB8AC3E}">
+        <p14:creationId xmlns:p14="http://schemas.microsoft.com/office/powerpoint/2010/main" val="194138801"/>
+      </p:ext>
+    </p:extLst>
+  </p:cSld>
+  <p:clrMapOvr>
+    <a:masterClrMapping/>
+  </p:clrMapOvr>
+  <mc:AlternateContent xmlns:mc="http://schemas.openxmlformats.org/markup-compatibility/2006" xmlns:p14="http://schemas.microsoft.com/office/powerpoint/2010/main">
+    <mc:Choice Requires="p14">
+      <p:transition spd="med" p14:dur="700">
+        <p:fade/>
+      </p:transition>
+    </mc:Choice>
+    <mc:Fallback xmlns="">
+      <p:transition spd="med">
+        <p:fade/>
+      </p:transition>
+    </mc:Fallback>
+  </mc:AlternateContent>
+</p:sld>
+</file>
+
+<file path=ppt/slides/slide33.xml><?xml version="1.0" encoding="utf-8"?>
+<p:sld xmlns:a="http://schemas.openxmlformats.org/drawingml/2006/main" xmlns:r="http://schemas.openxmlformats.org/officeDocument/2006/relationships" xmlns:p="http://schemas.openxmlformats.org/presentationml/2006/main">
+  <p:cSld>
+    <p:spTree>
+      <p:nvGrpSpPr>
+        <p:cNvPr id="1" name=""/>
+        <p:cNvGrpSpPr/>
+        <p:nvPr/>
+      </p:nvGrpSpPr>
+      <p:grpSpPr>
+        <a:xfrm>
+          <a:off x="0" y="0"/>
+          <a:ext cx="0" cy="0"/>
+          <a:chOff x="0" y="0"/>
+          <a:chExt cx="0" cy="0"/>
+        </a:xfrm>
+      </p:grpSpPr>
+      <p:sp>
+        <p:nvSpPr>
+          <p:cNvPr id="2" name="Título 1">
+            <a:extLst>
+              <a:ext uri="{FF2B5EF4-FFF2-40B4-BE49-F238E27FC236}">
+                <a16:creationId xmlns:a16="http://schemas.microsoft.com/office/drawing/2014/main" id="{AB07C872-83CB-442A-998A-9D40173BDA03}"/>
+              </a:ext>
+            </a:extLst>
+          </p:cNvPr>
+          <p:cNvSpPr>
+            <a:spLocks noGrp="1"/>
+          </p:cNvSpPr>
+          <p:nvPr>
+            <p:ph type="title"/>
+          </p:nvPr>
+        </p:nvSpPr>
+        <p:spPr/>
+        <p:txBody>
+          <a:bodyPr/>
+          <a:lstStyle/>
+          <a:p>
+            <a:r>
+              <a:rPr lang="es-ES" dirty="0"/>
+              <a:t>Directivas estructurales</a:t>
+            </a:r>
+          </a:p>
+        </p:txBody>
+      </p:sp>
+      <p:sp>
+        <p:nvSpPr>
+          <p:cNvPr id="3" name="Marcador de contenido 2">
+            <a:extLst>
+              <a:ext uri="{FF2B5EF4-FFF2-40B4-BE49-F238E27FC236}">
+                <a16:creationId xmlns:a16="http://schemas.microsoft.com/office/drawing/2014/main" id="{18EC68DD-ADF3-4DFE-A231-4A08DA6D1B62}"/>
+              </a:ext>
+            </a:extLst>
+          </p:cNvPr>
+          <p:cNvSpPr>
+            <a:spLocks noGrp="1"/>
+          </p:cNvSpPr>
+          <p:nvPr>
+            <p:ph idx="1"/>
+          </p:nvPr>
+        </p:nvSpPr>
+        <p:spPr/>
+        <p:txBody>
+          <a:bodyPr/>
+          <a:lstStyle/>
+          <a:p>
+            <a:pPr marL="0" indent="0">
+              <a:buNone/>
+            </a:pPr>
+            <a:r>
+              <a:rPr lang="es-ES" dirty="0"/>
+              <a:t>Cambian la estructura en el HTML, permitiendo añadir, manipular o eliminar elementos.</a:t>
+            </a:r>
+          </a:p>
+          <a:p>
+            <a:r>
+              <a:rPr lang="es-ES" dirty="0" err="1"/>
+              <a:t>ngIf</a:t>
+            </a:r>
+            <a:r>
+              <a:rPr lang="es-ES" dirty="0"/>
+              <a:t> ; </a:t>
+            </a:r>
+            <a:r>
+              <a:rPr lang="es-ES" dirty="0" err="1"/>
+              <a:t>else</a:t>
+            </a:r>
+            <a:endParaRPr lang="es-ES" dirty="0"/>
+          </a:p>
+          <a:p>
+            <a:r>
+              <a:rPr lang="es-ES" dirty="0" err="1"/>
+              <a:t>ngTemplate</a:t>
+            </a:r>
+            <a:endParaRPr lang="es-ES" dirty="0"/>
+          </a:p>
+          <a:p>
+            <a:r>
+              <a:rPr lang="es-ES" dirty="0" err="1"/>
+              <a:t>ngSwitch</a:t>
+            </a:r>
+            <a:r>
+              <a:rPr lang="es-ES" dirty="0"/>
+              <a:t> – </a:t>
+            </a:r>
+            <a:r>
+              <a:rPr lang="es-ES" dirty="0" err="1"/>
+              <a:t>ngSwitchCase</a:t>
+            </a:r>
+            <a:r>
+              <a:rPr lang="es-ES" dirty="0"/>
+              <a:t> - </a:t>
+            </a:r>
+            <a:r>
+              <a:rPr lang="es-ES" dirty="0" err="1"/>
+              <a:t>ngSwitchDefault</a:t>
+            </a:r>
+            <a:endParaRPr lang="es-ES" dirty="0"/>
+          </a:p>
+          <a:p>
+            <a:r>
+              <a:rPr lang="es-ES" dirty="0" err="1"/>
+              <a:t>ngFor</a:t>
+            </a:r>
+            <a:endParaRPr lang="es-ES" dirty="0"/>
+          </a:p>
+          <a:p>
+            <a:r>
+              <a:rPr lang="es-ES" dirty="0" err="1"/>
+              <a:t>ngContainer</a:t>
+            </a:r>
+            <a:endParaRPr lang="es-ES" dirty="0"/>
+          </a:p>
+          <a:p>
+            <a:endParaRPr lang="es-ES" dirty="0"/>
+          </a:p>
+        </p:txBody>
+      </p:sp>
+    </p:spTree>
+    <p:extLst>
+      <p:ext uri="{BB962C8B-B14F-4D97-AF65-F5344CB8AC3E}">
+        <p14:creationId xmlns:p14="http://schemas.microsoft.com/office/powerpoint/2010/main" val="2192076002"/>
+      </p:ext>
+    </p:extLst>
+  </p:cSld>
+  <p:clrMapOvr>
+    <a:masterClrMapping/>
+  </p:clrMapOvr>
+  <mc:AlternateContent xmlns:mc="http://schemas.openxmlformats.org/markup-compatibility/2006" xmlns:p14="http://schemas.microsoft.com/office/powerpoint/2010/main">
+    <mc:Choice Requires="p14">
+      <p:transition spd="med" p14:dur="700">
+        <p:fade/>
+      </p:transition>
+    </mc:Choice>
+    <mc:Fallback xmlns="">
+      <p:transition spd="med">
+        <p:fade/>
+      </p:transition>
+    </mc:Fallback>
+  </mc:AlternateContent>
+</p:sld>
+</file>
+
+<file path=ppt/slides/slide34.xml><?xml version="1.0" encoding="utf-8"?>
+<p:sld xmlns:a="http://schemas.openxmlformats.org/drawingml/2006/main" xmlns:r="http://schemas.openxmlformats.org/officeDocument/2006/relationships" xmlns:p="http://schemas.openxmlformats.org/presentationml/2006/main">
+  <p:cSld>
+    <p:spTree>
+      <p:nvGrpSpPr>
+        <p:cNvPr id="1" name=""/>
+        <p:cNvGrpSpPr/>
+        <p:nvPr/>
+      </p:nvGrpSpPr>
+      <p:grpSpPr>
+        <a:xfrm>
+          <a:off x="0" y="0"/>
+          <a:ext cx="0" cy="0"/>
+          <a:chOff x="0" y="0"/>
+          <a:chExt cx="0" cy="0"/>
+        </a:xfrm>
+      </p:grpSpPr>
+      <p:sp>
+        <p:nvSpPr>
+          <p:cNvPr id="2" name="Título 1">
+            <a:extLst>
+              <a:ext uri="{FF2B5EF4-FFF2-40B4-BE49-F238E27FC236}">
+                <a16:creationId xmlns:a16="http://schemas.microsoft.com/office/drawing/2014/main" id="{AB07C872-83CB-442A-998A-9D40173BDA03}"/>
+              </a:ext>
+            </a:extLst>
+          </p:cNvPr>
+          <p:cNvSpPr>
+            <a:spLocks noGrp="1"/>
+          </p:cNvSpPr>
+          <p:nvPr>
+            <p:ph type="title"/>
+          </p:nvPr>
+        </p:nvSpPr>
+        <p:spPr/>
+        <p:txBody>
+          <a:bodyPr/>
+          <a:lstStyle/>
+          <a:p>
+            <a:r>
+              <a:rPr lang="es-ES" dirty="0"/>
+              <a:t>Directivas de atributos</a:t>
+            </a:r>
+          </a:p>
+        </p:txBody>
+      </p:sp>
+      <p:sp>
+        <p:nvSpPr>
+          <p:cNvPr id="3" name="Marcador de contenido 2">
+            <a:extLst>
+              <a:ext uri="{FF2B5EF4-FFF2-40B4-BE49-F238E27FC236}">
+                <a16:creationId xmlns:a16="http://schemas.microsoft.com/office/drawing/2014/main" id="{18EC68DD-ADF3-4DFE-A231-4A08DA6D1B62}"/>
+              </a:ext>
+            </a:extLst>
+          </p:cNvPr>
+          <p:cNvSpPr>
+            <a:spLocks noGrp="1"/>
+          </p:cNvSpPr>
+          <p:nvPr>
+            <p:ph idx="1"/>
+          </p:nvPr>
+        </p:nvSpPr>
+        <p:spPr/>
+        <p:txBody>
+          <a:bodyPr/>
+          <a:lstStyle/>
+          <a:p>
+            <a:pPr marL="0" indent="0">
+              <a:buNone/>
+            </a:pPr>
+            <a:r>
+              <a:rPr lang="es-ES" dirty="0"/>
+              <a:t>Cambian la apariencia o el comportamiento de los elementos en el HTML</a:t>
+            </a:r>
+          </a:p>
+          <a:p>
+            <a:r>
+              <a:rPr lang="es-ES" dirty="0" err="1"/>
+              <a:t>ngStyle</a:t>
+            </a:r>
+            <a:r>
+              <a:rPr lang="es-ES" dirty="0"/>
+              <a:t>: modifica los estilos del componente por medio de estilos CSS.</a:t>
+            </a:r>
+          </a:p>
+          <a:p>
+            <a:r>
+              <a:rPr lang="es-ES" dirty="0" err="1"/>
+              <a:t>ngClass</a:t>
+            </a:r>
+            <a:r>
+              <a:rPr lang="es-ES" dirty="0"/>
+              <a:t>: modifica los estilos del componente por medio de clases CSS.</a:t>
+            </a:r>
+          </a:p>
+        </p:txBody>
+      </p:sp>
+    </p:spTree>
+    <p:extLst>
+      <p:ext uri="{BB962C8B-B14F-4D97-AF65-F5344CB8AC3E}">
+        <p14:creationId xmlns:p14="http://schemas.microsoft.com/office/powerpoint/2010/main" val="466492632"/>
+      </p:ext>
+    </p:extLst>
+  </p:cSld>
+  <p:clrMapOvr>
+    <a:masterClrMapping/>
+  </p:clrMapOvr>
+  <mc:AlternateContent xmlns:mc="http://schemas.openxmlformats.org/markup-compatibility/2006" xmlns:p14="http://schemas.microsoft.com/office/powerpoint/2010/main">
+    <mc:Choice Requires="p14">
+      <p:transition spd="med" p14:dur="700">
+        <p:fade/>
+      </p:transition>
+    </mc:Choice>
+    <mc:Fallback xmlns="">
+      <p:transition spd="med">
+        <p:fade/>
+      </p:transition>
+    </mc:Fallback>
+  </mc:AlternateContent>
+</p:sld>
+</file>
+
+<file path=ppt/slides/slide35.xml><?xml version="1.0" encoding="utf-8"?>
+<p:sld xmlns:a="http://schemas.openxmlformats.org/drawingml/2006/main" xmlns:r="http://schemas.openxmlformats.org/officeDocument/2006/relationships" xmlns:p="http://schemas.openxmlformats.org/presentationml/2006/main">
+  <p:cSld>
+    <p:spTree>
+      <p:nvGrpSpPr>
+        <p:cNvPr id="1" name=""/>
+        <p:cNvGrpSpPr/>
+        <p:nvPr/>
+      </p:nvGrpSpPr>
+      <p:grpSpPr>
+        <a:xfrm>
+          <a:off x="0" y="0"/>
+          <a:ext cx="0" cy="0"/>
+          <a:chOff x="0" y="0"/>
+          <a:chExt cx="0" cy="0"/>
+        </a:xfrm>
+      </p:grpSpPr>
+      <p:sp>
+        <p:nvSpPr>
+          <p:cNvPr id="2" name="Título 1">
+            <a:extLst>
+              <a:ext uri="{FF2B5EF4-FFF2-40B4-BE49-F238E27FC236}">
+                <a16:creationId xmlns:a16="http://schemas.microsoft.com/office/drawing/2014/main" id="{319A57F6-7C14-4A47-9E5D-DA3A7A8F6469}"/>
+              </a:ext>
+            </a:extLst>
+          </p:cNvPr>
+          <p:cNvSpPr>
+            <a:spLocks noGrp="1"/>
+          </p:cNvSpPr>
+          <p:nvPr>
+            <p:ph type="title"/>
+          </p:nvPr>
+        </p:nvSpPr>
+        <p:spPr>
+          <a:xfrm>
+            <a:off x="814957" y="-13658"/>
+            <a:ext cx="10558909" cy="7043058"/>
+          </a:xfrm>
+        </p:spPr>
+        <p:txBody>
+          <a:bodyPr anchor="ctr">
+            <a:normAutofit/>
+          </a:bodyPr>
+          <a:lstStyle/>
+          <a:p>
+            <a:pPr algn="ctr"/>
+            <a:r>
+              <a:rPr lang="es-ES" sz="6000" dirty="0"/>
+              <a:t>Directivas Personalizadas</a:t>
+            </a:r>
+          </a:p>
+        </p:txBody>
+      </p:sp>
+    </p:spTree>
+    <p:extLst>
+      <p:ext uri="{BB962C8B-B14F-4D97-AF65-F5344CB8AC3E}">
+        <p14:creationId xmlns:p14="http://schemas.microsoft.com/office/powerpoint/2010/main" val="2780639055"/>
+      </p:ext>
+    </p:extLst>
+  </p:cSld>
+  <p:clrMapOvr>
+    <a:masterClrMapping/>
+  </p:clrMapOvr>
+  <mc:AlternateContent xmlns:mc="http://schemas.openxmlformats.org/markup-compatibility/2006" xmlns:p14="http://schemas.microsoft.com/office/powerpoint/2010/main">
+    <mc:Choice Requires="p14">
+      <p:transition spd="med" p14:dur="700">
+        <p:fade/>
+      </p:transition>
+    </mc:Choice>
+    <mc:Fallback xmlns="">
+      <p:transition spd="med">
+        <p:fade/>
+      </p:transition>
+    </mc:Fallback>
+  </mc:AlternateContent>
+</p:sld>
+</file>
+
+<file path=ppt/slides/slide36.xml><?xml version="1.0" encoding="utf-8"?>
+<p:sld xmlns:a="http://schemas.openxmlformats.org/drawingml/2006/main" xmlns:r="http://schemas.openxmlformats.org/officeDocument/2006/relationships" xmlns:p="http://schemas.openxmlformats.org/presentationml/2006/main">
+  <p:cSld>
+    <p:spTree>
+      <p:nvGrpSpPr>
+        <p:cNvPr id="1" name=""/>
+        <p:cNvGrpSpPr/>
+        <p:nvPr/>
+      </p:nvGrpSpPr>
+      <p:grpSpPr>
+        <a:xfrm>
+          <a:off x="0" y="0"/>
+          <a:ext cx="0" cy="0"/>
+          <a:chOff x="0" y="0"/>
+          <a:chExt cx="0" cy="0"/>
+        </a:xfrm>
+      </p:grpSpPr>
+      <p:sp>
+        <p:nvSpPr>
+          <p:cNvPr id="2" name="Título 1">
+            <a:extLst>
+              <a:ext uri="{FF2B5EF4-FFF2-40B4-BE49-F238E27FC236}">
+                <a16:creationId xmlns:a16="http://schemas.microsoft.com/office/drawing/2014/main" id="{319A57F6-7C14-4A47-9E5D-DA3A7A8F6469}"/>
+              </a:ext>
+            </a:extLst>
+          </p:cNvPr>
+          <p:cNvSpPr>
+            <a:spLocks noGrp="1"/>
+          </p:cNvSpPr>
+          <p:nvPr>
+            <p:ph type="title"/>
+          </p:nvPr>
+        </p:nvSpPr>
+        <p:spPr>
+          <a:xfrm>
+            <a:off x="814957" y="-13658"/>
+            <a:ext cx="10558909" cy="6858000"/>
+          </a:xfrm>
+        </p:spPr>
+        <p:txBody>
+          <a:bodyPr anchor="ctr">
+            <a:normAutofit/>
+          </a:bodyPr>
+          <a:lstStyle/>
+          <a:p>
+            <a:pPr algn="ctr"/>
+            <a:r>
+              <a:rPr lang="es-ES" sz="6000" dirty="0"/>
+              <a:t>Preguntas y Respuestas</a:t>
+            </a:r>
+          </a:p>
+        </p:txBody>
+      </p:sp>
+    </p:spTree>
+    <p:extLst>
+      <p:ext uri="{BB962C8B-B14F-4D97-AF65-F5344CB8AC3E}">
+        <p14:creationId xmlns:p14="http://schemas.microsoft.com/office/powerpoint/2010/main" val="3300965751"/>
+      </p:ext>
+    </p:extLst>
+  </p:cSld>
+  <p:clrMapOvr>
+    <a:masterClrMapping/>
+  </p:clrMapOvr>
+  <mc:AlternateContent xmlns:mc="http://schemas.openxmlformats.org/markup-compatibility/2006" xmlns:p14="http://schemas.microsoft.com/office/powerpoint/2010/main">
+    <mc:Choice Requires="p14">
+      <p:transition spd="med" p14:dur="700">
+        <p:fade/>
+      </p:transition>
+    </mc:Choice>
+    <mc:Fallback xmlns="">
+      <p:transition spd="med">
+        <p:fade/>
+      </p:transition>
+    </mc:Fallback>
+  </mc:AlternateContent>
+</p:sld>
+</file>
+
+<file path=ppt/slides/slide37.xml><?xml version="1.0" encoding="utf-8"?>
+<p:sld xmlns:a="http://schemas.openxmlformats.org/drawingml/2006/main" xmlns:r="http://schemas.openxmlformats.org/officeDocument/2006/relationships" xmlns:p="http://schemas.openxmlformats.org/presentationml/2006/main">
+  <p:cSld>
+    <p:spTree>
+      <p:nvGrpSpPr>
+        <p:cNvPr id="1" name=""/>
+        <p:cNvGrpSpPr/>
+        <p:nvPr/>
+      </p:nvGrpSpPr>
+      <p:grpSpPr>
+        <a:xfrm>
+          <a:off x="0" y="0"/>
+          <a:ext cx="0" cy="0"/>
+          <a:chOff x="0" y="0"/>
+          <a:chExt cx="0" cy="0"/>
+        </a:xfrm>
+      </p:grpSpPr>
+      <p:sp>
+        <p:nvSpPr>
+          <p:cNvPr id="2" name="Título 1">
+            <a:extLst>
+              <a:ext uri="{FF2B5EF4-FFF2-40B4-BE49-F238E27FC236}">
+                <a16:creationId xmlns:a16="http://schemas.microsoft.com/office/drawing/2014/main" id="{E2FBBA38-D79D-4F5A-93E4-2C6CAA69BAB2}"/>
+              </a:ext>
+            </a:extLst>
+          </p:cNvPr>
+          <p:cNvSpPr>
+            <a:spLocks noGrp="1"/>
+          </p:cNvSpPr>
+          <p:nvPr>
+            <p:ph type="title"/>
+          </p:nvPr>
+        </p:nvSpPr>
+        <p:spPr/>
+        <p:txBody>
+          <a:bodyPr>
+            <a:normAutofit/>
+          </a:bodyPr>
+          <a:lstStyle/>
+          <a:p>
+            <a:r>
+              <a:rPr lang="es-ES" sz="4800" dirty="0"/>
+              <a:t>TALLER</a:t>
+            </a:r>
+            <a:endParaRPr lang="es-ES" sz="2400" dirty="0"/>
+          </a:p>
+        </p:txBody>
+      </p:sp>
+      <p:sp>
+        <p:nvSpPr>
+          <p:cNvPr id="3" name="Marcador de contenido 2">
+            <a:extLst>
+              <a:ext uri="{FF2B5EF4-FFF2-40B4-BE49-F238E27FC236}">
+                <a16:creationId xmlns:a16="http://schemas.microsoft.com/office/drawing/2014/main" id="{0176E8E0-5837-44E1-9E03-B4BAA21801F8}"/>
+              </a:ext>
+            </a:extLst>
+          </p:cNvPr>
+          <p:cNvSpPr>
+            <a:spLocks noGrp="1"/>
+          </p:cNvSpPr>
+          <p:nvPr>
+            <p:ph idx="1"/>
+          </p:nvPr>
+        </p:nvSpPr>
+        <p:spPr/>
+        <p:txBody>
+          <a:bodyPr/>
+          <a:lstStyle/>
+          <a:p>
+            <a:r>
+              <a:rPr lang="es-ES" dirty="0"/>
+              <a:t>Mostrar el listado de facturas incluyendo los ítems de la factura utilizando directivas estructurales, también usar algún tipo de directiva de atributo para cambiar el color de una factura cuando esta se encuentre en estado anulada.</a:t>
+            </a:r>
+          </a:p>
+        </p:txBody>
+      </p:sp>
+    </p:spTree>
+    <p:extLst>
+      <p:ext uri="{BB962C8B-B14F-4D97-AF65-F5344CB8AC3E}">
+        <p14:creationId xmlns:p14="http://schemas.microsoft.com/office/powerpoint/2010/main" val="3309357845"/>
+      </p:ext>
+    </p:extLst>
+  </p:cSld>
+  <p:clrMapOvr>
+    <a:masterClrMapping/>
+  </p:clrMapOvr>
+  <mc:AlternateContent xmlns:mc="http://schemas.openxmlformats.org/markup-compatibility/2006" xmlns:p14="http://schemas.microsoft.com/office/powerpoint/2010/main">
+    <mc:Choice Requires="p14">
+      <p:transition spd="med" p14:dur="700">
+        <p:fade/>
+      </p:transition>
+    </mc:Choice>
+    <mc:Fallback xmlns="">
+      <p:transition spd="med">
+        <p:fade/>
+      </p:transition>
+    </mc:Fallback>
+  </mc:AlternateContent>
+</p:sld>
+</file>
+
+<file path=ppt/slides/slide38.xml><?xml version="1.0" encoding="utf-8"?>
+<p:sld xmlns:a="http://schemas.openxmlformats.org/drawingml/2006/main" xmlns:r="http://schemas.openxmlformats.org/officeDocument/2006/relationships" xmlns:p="http://schemas.openxmlformats.org/presentationml/2006/main">
+  <p:cSld>
+    <p:spTree>
+      <p:nvGrpSpPr>
+        <p:cNvPr id="1" name=""/>
+        <p:cNvGrpSpPr/>
+        <p:nvPr/>
+      </p:nvGrpSpPr>
+      <p:grpSpPr>
+        <a:xfrm>
+          <a:off x="0" y="0"/>
+          <a:ext cx="0" cy="0"/>
+          <a:chOff x="0" y="0"/>
+          <a:chExt cx="0" cy="0"/>
+        </a:xfrm>
+      </p:grpSpPr>
+      <p:sp>
+        <p:nvSpPr>
+          <p:cNvPr id="2" name="Título 1">
+            <a:extLst>
+              <a:ext uri="{FF2B5EF4-FFF2-40B4-BE49-F238E27FC236}">
+                <a16:creationId xmlns:a16="http://schemas.microsoft.com/office/drawing/2014/main" id="{75E1D69F-D374-48DB-89AA-5C4249D76385}"/>
+              </a:ext>
+            </a:extLst>
+          </p:cNvPr>
+          <p:cNvSpPr>
+            <a:spLocks noGrp="1"/>
+          </p:cNvSpPr>
+          <p:nvPr>
+            <p:ph type="title"/>
+          </p:nvPr>
+        </p:nvSpPr>
+        <p:spPr/>
+        <p:txBody>
+          <a:bodyPr/>
+          <a:lstStyle/>
+          <a:p>
+            <a:r>
+              <a:rPr lang="es-ES" dirty="0"/>
+              <a:t>Pipes (Tuberías)</a:t>
+            </a:r>
+          </a:p>
+        </p:txBody>
+      </p:sp>
+      <p:sp>
+        <p:nvSpPr>
+          <p:cNvPr id="3" name="Marcador de contenido 2">
+            <a:extLst>
+              <a:ext uri="{FF2B5EF4-FFF2-40B4-BE49-F238E27FC236}">
+                <a16:creationId xmlns:a16="http://schemas.microsoft.com/office/drawing/2014/main" id="{14F95FD3-F90A-4611-A951-C8A6B763398C}"/>
+              </a:ext>
+            </a:extLst>
+          </p:cNvPr>
+          <p:cNvSpPr>
+            <a:spLocks noGrp="1"/>
+          </p:cNvSpPr>
+          <p:nvPr>
+            <p:ph idx="1"/>
+          </p:nvPr>
+        </p:nvSpPr>
+        <p:spPr>
+          <a:xfrm>
+            <a:off x="1218883" y="1701797"/>
+            <a:ext cx="4875529" cy="4462272"/>
+          </a:xfrm>
+        </p:spPr>
+        <p:txBody>
+          <a:bodyPr/>
+          <a:lstStyle/>
+          <a:p>
+            <a:r>
+              <a:rPr lang="es-ES" dirty="0"/>
+              <a:t>Usado para transformar datos a nivel de interfaz de usuario, sin modificar el valor real.</a:t>
+            </a:r>
+          </a:p>
+          <a:p>
+            <a:r>
+              <a:rPr lang="es-ES" dirty="0"/>
+              <a:t>Utiliza el decorador @Pipe</a:t>
+            </a:r>
+          </a:p>
+          <a:p>
+            <a:r>
+              <a:rPr lang="es-ES" dirty="0"/>
+              <a:t>Permite reutilizar algún tipo de transformación de datos en diferentes componentes</a:t>
+            </a:r>
+          </a:p>
+          <a:p>
+            <a:pPr marL="0" indent="0" algn="ctr">
+              <a:buNone/>
+            </a:pPr>
+            <a:endParaRPr lang="es-ES" sz="600" dirty="0"/>
+          </a:p>
+          <a:p>
+            <a:pPr marL="0" indent="0" algn="ctr">
+              <a:buNone/>
+            </a:pPr>
+            <a:r>
+              <a:rPr lang="es-ES" dirty="0"/>
+              <a:t>hola mundo =&gt; Hola Mundo</a:t>
+            </a:r>
+          </a:p>
+        </p:txBody>
+      </p:sp>
+      <p:pic>
+        <p:nvPicPr>
+          <p:cNvPr id="4" name="Imagen 3">
+            <a:extLst>
+              <a:ext uri="{FF2B5EF4-FFF2-40B4-BE49-F238E27FC236}">
+                <a16:creationId xmlns:a16="http://schemas.microsoft.com/office/drawing/2014/main" id="{B196E935-B373-4BFA-AF46-441DFDD7B909}"/>
+              </a:ext>
+            </a:extLst>
+          </p:cNvPr>
+          <p:cNvPicPr>
+            <a:picLocks noChangeAspect="1"/>
+          </p:cNvPicPr>
+          <p:nvPr/>
+        </p:nvPicPr>
+        <p:blipFill>
+          <a:blip r:embed="rId2"/>
+          <a:stretch>
+            <a:fillRect/>
+          </a:stretch>
+        </p:blipFill>
+        <p:spPr>
+          <a:xfrm>
+            <a:off x="6642493" y="1701797"/>
+            <a:ext cx="4908893" cy="1727203"/>
+          </a:xfrm>
+          <a:prstGeom prst="rect">
+            <a:avLst/>
+          </a:prstGeom>
+        </p:spPr>
+      </p:pic>
+      <p:pic>
+        <p:nvPicPr>
+          <p:cNvPr id="5" name="Imagen 4">
+            <a:extLst>
+              <a:ext uri="{FF2B5EF4-FFF2-40B4-BE49-F238E27FC236}">
+                <a16:creationId xmlns:a16="http://schemas.microsoft.com/office/drawing/2014/main" id="{F7B12459-C5D1-4AEC-AC0C-E247CCEDB8CB}"/>
+              </a:ext>
+            </a:extLst>
+          </p:cNvPr>
+          <p:cNvPicPr>
+            <a:picLocks noChangeAspect="1"/>
+          </p:cNvPicPr>
+          <p:nvPr/>
+        </p:nvPicPr>
+        <p:blipFill>
+          <a:blip r:embed="rId3"/>
+          <a:stretch>
+            <a:fillRect/>
+          </a:stretch>
+        </p:blipFill>
+        <p:spPr>
+          <a:xfrm>
+            <a:off x="6670490" y="3600395"/>
+            <a:ext cx="4907033" cy="2563674"/>
+          </a:xfrm>
+          <a:prstGeom prst="rect">
+            <a:avLst/>
+          </a:prstGeom>
+        </p:spPr>
+      </p:pic>
+    </p:spTree>
+    <p:extLst>
+      <p:ext uri="{BB962C8B-B14F-4D97-AF65-F5344CB8AC3E}">
+        <p14:creationId xmlns:p14="http://schemas.microsoft.com/office/powerpoint/2010/main" val="64433057"/>
       </p:ext>
     </p:extLst>
   </p:cSld>
@@ -15233,6 +16151,15 @@
 </file>
 
 <file path=customXml/item2.xml><?xml version="1.0" encoding="utf-8"?>
+<?mso-contentType ?>
+<FormTemplates xmlns="http://schemas.microsoft.com/sharepoint/v3/contenttype/forms">
+  <Display>DocumentLibraryForm</Display>
+  <Edit>AssetEditForm</Edit>
+  <New>DocumentLibraryForm</New>
+</FormTemplates>
+</file>
+
+<file path=customXml/item3.xml><?xml version="1.0" encoding="utf-8"?>
 <ct:contentTypeSchema xmlns:ct="http://schemas.microsoft.com/office/2006/metadata/contentType" xmlns:ma="http://schemas.microsoft.com/office/2006/metadata/properties/metaAttributes" ct:_="" ma:_="" ma:contentTypeName="TemplateFile" ma:contentTypeID="0x0101006EDDDB5EE6D98C44930B742096920B300400F5B6D36B3EF94B4E9A635CDF2A18F5B8" ma:contentTypeVersion="72" ma:contentTypeDescription="Create a new document." ma:contentTypeScope="" ma:versionID="a23e56308344d904b51738559c3d67c9">
   <xsd:schema xmlns:xsd="http://www.w3.org/2001/XMLSchema" xmlns:xs="http://www.w3.org/2001/XMLSchema" xmlns:p="http://schemas.microsoft.com/office/2006/metadata/properties" xmlns:ns2="4873beb7-5857-4685-be1f-d57550cc96cc" targetNamespace="http://schemas.microsoft.com/office/2006/metadata/properties" ma:root="true" ma:fieldsID="cd0908cc4600e77bf5da051303e00c8d" ns2:_="">
     <xsd:import namespace="4873beb7-5857-4685-be1f-d57550cc96cc"/>
@@ -16272,15 +17199,6 @@
 </ct:contentTypeSchema>
 </file>
 
-<file path=customXml/item3.xml><?xml version="1.0" encoding="utf-8"?>
-<?mso-contentType ?>
-<FormTemplates xmlns="http://schemas.microsoft.com/sharepoint/v3/contenttype/forms">
-  <Display>DocumentLibraryForm</Display>
-  <Edit>AssetEditForm</Edit>
-  <New>DocumentLibraryForm</New>
-</FormTemplates>
-</file>
-
 <file path=customXml/itemProps1.xml><?xml version="1.0" encoding="utf-8"?>
 <ds:datastoreItem xmlns:ds="http://schemas.openxmlformats.org/officeDocument/2006/customXml" ds:itemID="{60C67BEE-D13F-4BD2-98A5-34D8A0977F68}">
   <ds:schemaRefs>
@@ -16298,6 +17216,14 @@
 </file>
 
 <file path=customXml/itemProps2.xml><?xml version="1.0" encoding="utf-8"?>
+<ds:datastoreItem xmlns:ds="http://schemas.openxmlformats.org/officeDocument/2006/customXml" ds:itemID="{3836F65B-1B07-41EE-A0E8-BC6EF3855225}">
+  <ds:schemaRefs>
+    <ds:schemaRef ds:uri="http://schemas.microsoft.com/sharepoint/v3/contenttype/forms"/>
+  </ds:schemaRefs>
+</ds:datastoreItem>
+</file>
+
+<file path=customXml/itemProps3.xml><?xml version="1.0" encoding="utf-8"?>
 <ds:datastoreItem xmlns:ds="http://schemas.openxmlformats.org/officeDocument/2006/customXml" ds:itemID="{A09BF4D4-EF60-4196-BFC3-9462D607978C}">
   <ds:schemaRefs>
     <ds:schemaRef ds:uri="http://schemas.microsoft.com/office/2006/metadata/contentType"/>
@@ -16313,12 +17239,4 @@
     <ds:schemaRef ds:uri="http://schemas.microsoft.com/internal/obd"/>
   </ds:schemaRefs>
 </ds:datastoreItem>
-</file>
-
-<file path=customXml/itemProps3.xml><?xml version="1.0" encoding="utf-8"?>
-<ds:datastoreItem xmlns:ds="http://schemas.openxmlformats.org/officeDocument/2006/customXml" ds:itemID="{3836F65B-1B07-41EE-A0E8-BC6EF3855225}">
-  <ds:schemaRefs>
-    <ds:schemaRef ds:uri="http://schemas.microsoft.com/sharepoint/v3/contenttype/forms"/>
-  </ds:schemaRefs>
-</ds:datastoreItem>
 </file>
</xml_diff>

<commit_message>
Actualizacion diapositivas con Pipes
</commit_message>
<xml_diff>
--- a/Angular.pptx
+++ b/Angular.pptx
@@ -5,10 +5,10 @@
     <p:sldMasterId id="2147483660" r:id="rId4"/>
   </p:sldMasterIdLst>
   <p:notesMasterIdLst>
-    <p:notesMasterId r:id="rId43"/>
+    <p:notesMasterId r:id="rId47"/>
   </p:notesMasterIdLst>
   <p:handoutMasterIdLst>
-    <p:handoutMasterId r:id="rId44"/>
+    <p:handoutMasterId r:id="rId48"/>
   </p:handoutMasterIdLst>
   <p:sldIdLst>
     <p:sldId id="257" r:id="rId5"/>
@@ -49,6 +49,10 @@
     <p:sldId id="311" r:id="rId40"/>
     <p:sldId id="310" r:id="rId41"/>
     <p:sldId id="313" r:id="rId42"/>
+    <p:sldId id="314" r:id="rId43"/>
+    <p:sldId id="316" r:id="rId44"/>
+    <p:sldId id="315" r:id="rId45"/>
+    <p:sldId id="317" r:id="rId46"/>
   </p:sldIdLst>
   <p:sldSz cx="12188825" cy="6858000"/>
   <p:notesSz cx="6858000" cy="9144000"/>
@@ -3419,7 +3423,7 @@
             <a:pPr algn="r" rtl="0"/>
             <a:fld id="{C8F1D84B-F747-4821-8617-FBD61E8F4308}" type="datetime1">
               <a:rPr lang="es-ES" smtClean="0"/>
-              <a:t>19/12/2018</a:t>
+              <a:t>20/12/2018</a:t>
             </a:fld>
             <a:endParaRPr lang="es-ES" dirty="0"/>
           </a:p>
@@ -3589,7 +3593,7 @@
             <a:fld id="{DA87C823-BB9F-45DA-99AB-416A32E1B948}" type="datetime1">
               <a:rPr lang="es-ES" noProof="0" smtClean="0"/>
               <a:pPr/>
-              <a:t>19/12/2018</a:t>
+              <a:t>20/12/2018</a:t>
             </a:fld>
             <a:endParaRPr lang="es-ES" noProof="0" dirty="0"/>
           </a:p>
@@ -5217,7 +5221,7 @@
             <a:fld id="{A042E67D-14C0-4ED9-A218-9C14494A6A84}" type="datetime1">
               <a:rPr lang="es-ES" noProof="0" smtClean="0"/>
               <a:pPr/>
-              <a:t>19/12/2018</a:t>
+              <a:t>20/12/2018</a:t>
             </a:fld>
             <a:endParaRPr lang="es-ES" noProof="0" dirty="0"/>
           </a:p>
@@ -5427,7 +5431,7 @@
             <a:fld id="{40A1DB83-C382-4684-8887-65A03EA4FFF0}" type="datetime1">
               <a:rPr lang="es-ES" noProof="0" smtClean="0"/>
               <a:pPr/>
-              <a:t>19/12/2018</a:t>
+              <a:t>20/12/2018</a:t>
             </a:fld>
             <a:endParaRPr lang="es-ES" noProof="0" dirty="0"/>
           </a:p>
@@ -5643,7 +5647,7 @@
             <a:fld id="{C60E81D3-9B82-44CA-B1F9-FCEFDC87935B}" type="datetime1">
               <a:rPr lang="es-ES" noProof="0" smtClean="0"/>
               <a:pPr/>
-              <a:t>19/12/2018</a:t>
+              <a:t>20/12/2018</a:t>
             </a:fld>
             <a:endParaRPr lang="es-ES" noProof="0" dirty="0"/>
           </a:p>
@@ -5849,7 +5853,7 @@
             <a:fld id="{82E48AAE-5AE8-418A-A225-B506C222F2F9}" type="datetime1">
               <a:rPr lang="es-ES" noProof="0" smtClean="0"/>
               <a:pPr/>
-              <a:t>19/12/2018</a:t>
+              <a:t>20/12/2018</a:t>
             </a:fld>
             <a:endParaRPr lang="es-ES" noProof="0" dirty="0"/>
           </a:p>
@@ -6289,7 +6293,7 @@
             <a:fld id="{AA1D35CA-82F5-4AD4-B9EC-66E805B73542}" type="datetime1">
               <a:rPr lang="es-ES" noProof="0" smtClean="0"/>
               <a:pPr/>
-              <a:t>19/12/2018</a:t>
+              <a:t>20/12/2018</a:t>
             </a:fld>
             <a:endParaRPr lang="es-ES" noProof="0" dirty="0"/>
           </a:p>
@@ -6601,7 +6605,7 @@
             <a:fld id="{834CCE92-710B-4678-B1B1-EFCAA5CDF075}" type="datetime1">
               <a:rPr lang="es-ES" noProof="0" smtClean="0"/>
               <a:pPr/>
-              <a:t>19/12/2018</a:t>
+              <a:t>20/12/2018</a:t>
             </a:fld>
             <a:endParaRPr lang="es-ES" noProof="0" dirty="0"/>
           </a:p>
@@ -7065,7 +7069,7 @@
             <a:fld id="{83FB0F2C-25D9-4D7E-B43A-29A2E16C960D}" type="datetime1">
               <a:rPr lang="es-ES" noProof="0" smtClean="0"/>
               <a:pPr/>
-              <a:t>19/12/2018</a:t>
+              <a:t>20/12/2018</a:t>
             </a:fld>
             <a:endParaRPr lang="es-ES" noProof="0" dirty="0"/>
           </a:p>
@@ -7203,7 +7207,7 @@
             <a:fld id="{FD34687D-B11B-47A5-95F6-B79DA932A6DF}" type="datetime1">
               <a:rPr lang="es-ES" noProof="0" smtClean="0"/>
               <a:pPr/>
-              <a:t>19/12/2018</a:t>
+              <a:t>20/12/2018</a:t>
             </a:fld>
             <a:endParaRPr lang="es-ES" noProof="0" dirty="0"/>
           </a:p>
@@ -7317,7 +7321,7 @@
             <a:fld id="{93C656DE-1E46-4450-9484-A739B4FADFBC}" type="datetime1">
               <a:rPr lang="es-ES" noProof="0" smtClean="0"/>
               <a:pPr/>
-              <a:t>19/12/2018</a:t>
+              <a:t>20/12/2018</a:t>
             </a:fld>
             <a:endParaRPr lang="es-ES" noProof="0" dirty="0"/>
           </a:p>
@@ -7624,7 +7628,7 @@
             <a:fld id="{EEA77F8B-D469-4ECD-B91E-3B01AD692331}" type="datetime1">
               <a:rPr lang="es-ES" noProof="0" smtClean="0"/>
               <a:pPr/>
-              <a:t>19/12/2018</a:t>
+              <a:t>20/12/2018</a:t>
             </a:fld>
             <a:endParaRPr lang="es-ES" noProof="0" dirty="0"/>
           </a:p>
@@ -7921,7 +7925,7 @@
             <a:fld id="{49BA7B1C-709E-4257-93A5-EC2F0807D42F}" type="datetime1">
               <a:rPr lang="es-ES" noProof="0" smtClean="0"/>
               <a:pPr/>
-              <a:t>19/12/2018</a:t>
+              <a:t>20/12/2018</a:t>
             </a:fld>
             <a:endParaRPr lang="es-ES" noProof="0" dirty="0"/>
           </a:p>
@@ -8545,7 +8549,7 @@
             <a:fld id="{35C83AD5-F5AF-4BDC-901E-85A05CCFFAAA}" type="datetime1">
               <a:rPr lang="es-ES" noProof="0" smtClean="0"/>
               <a:pPr/>
-              <a:t>19/12/2018</a:t>
+              <a:t>20/12/2018</a:t>
             </a:fld>
             <a:endParaRPr lang="es-ES" noProof="0" dirty="0"/>
           </a:p>
@@ -13740,7 +13744,9 @@
           </a:xfrm>
         </p:spPr>
         <p:txBody>
-          <a:bodyPr/>
+          <a:bodyPr>
+            <a:normAutofit/>
+          </a:bodyPr>
           <a:lstStyle/>
           <a:p>
             <a:r>
@@ -13862,6 +13868,128 @@
 </p:sld>
 </file>
 
+<file path=ppt/slides/slide39.xml><?xml version="1.0" encoding="utf-8"?>
+<p:sld xmlns:a="http://schemas.openxmlformats.org/drawingml/2006/main" xmlns:r="http://schemas.openxmlformats.org/officeDocument/2006/relationships" xmlns:p="http://schemas.openxmlformats.org/presentationml/2006/main">
+  <p:cSld>
+    <p:spTree>
+      <p:nvGrpSpPr>
+        <p:cNvPr id="1" name=""/>
+        <p:cNvGrpSpPr/>
+        <p:nvPr/>
+      </p:nvGrpSpPr>
+      <p:grpSpPr>
+        <a:xfrm>
+          <a:off x="0" y="0"/>
+          <a:ext cx="0" cy="0"/>
+          <a:chOff x="0" y="0"/>
+          <a:chExt cx="0" cy="0"/>
+        </a:xfrm>
+      </p:grpSpPr>
+      <p:sp>
+        <p:nvSpPr>
+          <p:cNvPr id="2" name="Título 1">
+            <a:extLst>
+              <a:ext uri="{FF2B5EF4-FFF2-40B4-BE49-F238E27FC236}">
+                <a16:creationId xmlns:a16="http://schemas.microsoft.com/office/drawing/2014/main" id="{BBCF0380-929F-4164-9B28-8D5FA4536C6F}"/>
+              </a:ext>
+            </a:extLst>
+          </p:cNvPr>
+          <p:cNvSpPr>
+            <a:spLocks noGrp="1"/>
+          </p:cNvSpPr>
+          <p:nvPr>
+            <p:ph type="title"/>
+          </p:nvPr>
+        </p:nvSpPr>
+        <p:spPr/>
+        <p:txBody>
+          <a:bodyPr/>
+          <a:lstStyle/>
+          <a:p>
+            <a:r>
+              <a:rPr lang="es-ES" sz="4000" dirty="0"/>
+              <a:t>Tipos</a:t>
+            </a:r>
+            <a:r>
+              <a:rPr lang="es-ES" dirty="0"/>
+              <a:t> de pipes</a:t>
+            </a:r>
+          </a:p>
+        </p:txBody>
+      </p:sp>
+      <p:sp>
+        <p:nvSpPr>
+          <p:cNvPr id="3" name="Marcador de contenido 2">
+            <a:extLst>
+              <a:ext uri="{FF2B5EF4-FFF2-40B4-BE49-F238E27FC236}">
+                <a16:creationId xmlns:a16="http://schemas.microsoft.com/office/drawing/2014/main" id="{E56AB7BD-730A-40E7-BC73-9B7F2F990772}"/>
+              </a:ext>
+            </a:extLst>
+          </p:cNvPr>
+          <p:cNvSpPr>
+            <a:spLocks noGrp="1"/>
+          </p:cNvSpPr>
+          <p:nvPr>
+            <p:ph idx="1"/>
+          </p:nvPr>
+        </p:nvSpPr>
+        <p:spPr/>
+        <p:txBody>
+          <a:bodyPr/>
+          <a:lstStyle/>
+          <a:p>
+            <a:pPr algn="just"/>
+            <a:r>
+              <a:rPr lang="es-ES" sz="3600" dirty="0"/>
+              <a:t>Puros: El tipo por defecto al crear un pipe. Ejecuta el pipe cuando cambia el valor de un tipo de dato primitivo o una referencia de un objeto.</a:t>
+            </a:r>
+          </a:p>
+          <a:p>
+            <a:pPr algn="just"/>
+            <a:r>
+              <a:rPr lang="es-ES" sz="3600" dirty="0"/>
+              <a:t>Impuros: Ejecuta el pipe durante el ciclo de detección de cambios de los componentes. Es menos eficiente.</a:t>
+            </a:r>
+          </a:p>
+          <a:p>
+            <a:pPr marL="0" indent="0">
+              <a:buNone/>
+            </a:pPr>
+            <a:endParaRPr lang="es-ES" sz="3600" dirty="0"/>
+          </a:p>
+          <a:p>
+            <a:pPr marL="0" indent="0">
+              <a:buNone/>
+            </a:pPr>
+            <a:endParaRPr lang="es-ES" dirty="0"/>
+          </a:p>
+        </p:txBody>
+      </p:sp>
+    </p:spTree>
+    <p:extLst>
+      <p:ext uri="{BB962C8B-B14F-4D97-AF65-F5344CB8AC3E}">
+        <p14:creationId xmlns:p14="http://schemas.microsoft.com/office/powerpoint/2010/main" val="3383277090"/>
+      </p:ext>
+    </p:extLst>
+  </p:cSld>
+  <p:clrMapOvr>
+    <a:masterClrMapping/>
+  </p:clrMapOvr>
+  <mc:AlternateContent xmlns:mc="http://schemas.openxmlformats.org/markup-compatibility/2006" xmlns:p14="http://schemas.microsoft.com/office/powerpoint/2010/main">
+    <mc:Choice Requires="p14">
+      <p:transition spd="med" p14:dur="700">
+        <p:fade/>
+      </p:transition>
+    </mc:Choice>
+    <mc:Fallback xmlns="">
+      <p:transition spd="med">
+        <p:fade/>
+      </p:transition>
+    </mc:Fallback>
+  </mc:AlternateContent>
+</p:sld>
+</file>
+
 <file path=ppt/slides/slide4.xml><?xml version="1.0" encoding="utf-8"?>
 <p:sld xmlns:a="http://schemas.openxmlformats.org/drawingml/2006/main" xmlns:r="http://schemas.openxmlformats.org/officeDocument/2006/relationships" xmlns:p="http://schemas.openxmlformats.org/presentationml/2006/main">
   <p:cSld>
@@ -14009,6 +14137,358 @@
     <p:extLst>
       <p:ext uri="{BB962C8B-B14F-4D97-AF65-F5344CB8AC3E}">
         <p14:creationId xmlns:p14="http://schemas.microsoft.com/office/powerpoint/2010/main" val="2736470549"/>
+      </p:ext>
+    </p:extLst>
+  </p:cSld>
+  <p:clrMapOvr>
+    <a:masterClrMapping/>
+  </p:clrMapOvr>
+  <mc:AlternateContent xmlns:mc="http://schemas.openxmlformats.org/markup-compatibility/2006" xmlns:p14="http://schemas.microsoft.com/office/powerpoint/2010/main">
+    <mc:Choice Requires="p14">
+      <p:transition spd="med" p14:dur="700">
+        <p:fade/>
+      </p:transition>
+    </mc:Choice>
+    <mc:Fallback xmlns="">
+      <p:transition spd="med">
+        <p:fade/>
+      </p:transition>
+    </mc:Fallback>
+  </mc:AlternateContent>
+</p:sld>
+</file>
+
+<file path=ppt/slides/slide40.xml><?xml version="1.0" encoding="utf-8"?>
+<p:sld xmlns:a="http://schemas.openxmlformats.org/drawingml/2006/main" xmlns:r="http://schemas.openxmlformats.org/officeDocument/2006/relationships" xmlns:p="http://schemas.openxmlformats.org/presentationml/2006/main">
+  <p:cSld>
+    <p:spTree>
+      <p:nvGrpSpPr>
+        <p:cNvPr id="1" name=""/>
+        <p:cNvGrpSpPr/>
+        <p:nvPr/>
+      </p:nvGrpSpPr>
+      <p:grpSpPr>
+        <a:xfrm>
+          <a:off x="0" y="0"/>
+          <a:ext cx="0" cy="0"/>
+          <a:chOff x="0" y="0"/>
+          <a:chExt cx="0" cy="0"/>
+        </a:xfrm>
+      </p:grpSpPr>
+      <p:sp>
+        <p:nvSpPr>
+          <p:cNvPr id="2" name="Título 1">
+            <a:extLst>
+              <a:ext uri="{FF2B5EF4-FFF2-40B4-BE49-F238E27FC236}">
+                <a16:creationId xmlns:a16="http://schemas.microsoft.com/office/drawing/2014/main" id="{BBCF0380-929F-4164-9B28-8D5FA4536C6F}"/>
+              </a:ext>
+            </a:extLst>
+          </p:cNvPr>
+          <p:cNvSpPr>
+            <a:spLocks noGrp="1"/>
+          </p:cNvSpPr>
+          <p:nvPr>
+            <p:ph type="title"/>
+          </p:nvPr>
+        </p:nvSpPr>
+        <p:spPr/>
+        <p:txBody>
+          <a:bodyPr/>
+          <a:lstStyle/>
+          <a:p>
+            <a:r>
+              <a:rPr lang="es-ES" sz="4000" dirty="0" err="1"/>
+              <a:t>Commons</a:t>
+            </a:r>
+            <a:r>
+              <a:rPr lang="es-ES" sz="4000" dirty="0"/>
+              <a:t> Pipe</a:t>
+            </a:r>
+            <a:endParaRPr lang="es-ES" dirty="0"/>
+          </a:p>
+        </p:txBody>
+      </p:sp>
+      <p:sp>
+        <p:nvSpPr>
+          <p:cNvPr id="3" name="Marcador de contenido 2">
+            <a:extLst>
+              <a:ext uri="{FF2B5EF4-FFF2-40B4-BE49-F238E27FC236}">
+                <a16:creationId xmlns:a16="http://schemas.microsoft.com/office/drawing/2014/main" id="{E56AB7BD-730A-40E7-BC73-9B7F2F990772}"/>
+              </a:ext>
+            </a:extLst>
+          </p:cNvPr>
+          <p:cNvSpPr>
+            <a:spLocks noGrp="1"/>
+          </p:cNvSpPr>
+          <p:nvPr>
+            <p:ph idx="1"/>
+          </p:nvPr>
+        </p:nvSpPr>
+        <p:spPr/>
+        <p:txBody>
+          <a:bodyPr>
+            <a:normAutofit fontScale="77500" lnSpcReduction="20000"/>
+          </a:bodyPr>
+          <a:lstStyle/>
+          <a:p>
+            <a:r>
+              <a:rPr lang="es-ES" sz="3600" dirty="0" err="1"/>
+              <a:t>CurrencyPipe</a:t>
+            </a:r>
+            <a:r>
+              <a:rPr lang="es-ES" sz="3600" dirty="0"/>
+              <a:t>: Para el manejo de formato de monedas.</a:t>
+            </a:r>
+          </a:p>
+          <a:p>
+            <a:r>
+              <a:rPr lang="es-ES" sz="3600" dirty="0" err="1"/>
+              <a:t>DatePipe</a:t>
+            </a:r>
+            <a:r>
+              <a:rPr lang="es-ES" sz="3600" dirty="0"/>
+              <a:t>: Para el manejo de formato de fechas.</a:t>
+            </a:r>
+          </a:p>
+          <a:p>
+            <a:r>
+              <a:rPr lang="es-ES" sz="3600" dirty="0" err="1"/>
+              <a:t>DecimalPipe</a:t>
+            </a:r>
+            <a:r>
+              <a:rPr lang="es-ES" sz="3600" dirty="0"/>
+              <a:t>: Para el manejo de formato de decimales.</a:t>
+            </a:r>
+          </a:p>
+          <a:p>
+            <a:r>
+              <a:rPr lang="es-ES" sz="3600" dirty="0" err="1"/>
+              <a:t>JsonPipe</a:t>
+            </a:r>
+            <a:r>
+              <a:rPr lang="es-ES" sz="3600" dirty="0"/>
+              <a:t>: Para mostrar la estructura de un objeto JSON.</a:t>
+            </a:r>
+          </a:p>
+          <a:p>
+            <a:r>
+              <a:rPr lang="es-ES" sz="3600" dirty="0" err="1"/>
+              <a:t>LowerCasePipe</a:t>
+            </a:r>
+            <a:r>
+              <a:rPr lang="es-ES" sz="3600" dirty="0"/>
+              <a:t>: Convierte texto a minúscula.</a:t>
+            </a:r>
+          </a:p>
+          <a:p>
+            <a:r>
+              <a:rPr lang="es-ES" sz="3600" dirty="0" err="1"/>
+              <a:t>UpperCasePipe</a:t>
+            </a:r>
+            <a:r>
+              <a:rPr lang="es-ES" sz="3600" dirty="0"/>
+              <a:t>: Convierte texto a </a:t>
+            </a:r>
+            <a:r>
+              <a:rPr lang="es-ES" sz="3600" dirty="0" err="1"/>
+              <a:t>mayuscula</a:t>
+            </a:r>
+            <a:r>
+              <a:rPr lang="es-ES" sz="3600" dirty="0"/>
+              <a:t>.</a:t>
+            </a:r>
+          </a:p>
+          <a:p>
+            <a:r>
+              <a:rPr lang="es-ES" sz="3600" dirty="0" err="1"/>
+              <a:t>TitleCasePipe</a:t>
+            </a:r>
+            <a:r>
+              <a:rPr lang="es-ES" sz="3600" dirty="0"/>
+              <a:t>: Para capitalizar texto</a:t>
+            </a:r>
+          </a:p>
+          <a:p>
+            <a:r>
+              <a:rPr lang="es-ES" sz="3600" dirty="0" err="1"/>
+              <a:t>SlicePipe</a:t>
+            </a:r>
+            <a:r>
+              <a:rPr lang="es-ES" sz="3600" dirty="0"/>
+              <a:t>: Crear un nuevo arreglo que contiene el nuevo subconjunto</a:t>
+            </a:r>
+          </a:p>
+          <a:p>
+            <a:endParaRPr lang="es-ES" sz="3600" dirty="0"/>
+          </a:p>
+          <a:p>
+            <a:pPr marL="0" indent="0">
+              <a:buNone/>
+            </a:pPr>
+            <a:endParaRPr lang="es-ES" dirty="0"/>
+          </a:p>
+        </p:txBody>
+      </p:sp>
+    </p:spTree>
+    <p:extLst>
+      <p:ext uri="{BB962C8B-B14F-4D97-AF65-F5344CB8AC3E}">
+        <p14:creationId xmlns:p14="http://schemas.microsoft.com/office/powerpoint/2010/main" val="644939771"/>
+      </p:ext>
+    </p:extLst>
+  </p:cSld>
+  <p:clrMapOvr>
+    <a:masterClrMapping/>
+  </p:clrMapOvr>
+  <mc:AlternateContent xmlns:mc="http://schemas.openxmlformats.org/markup-compatibility/2006" xmlns:p14="http://schemas.microsoft.com/office/powerpoint/2010/main">
+    <mc:Choice Requires="p14">
+      <p:transition spd="med" p14:dur="700">
+        <p:fade/>
+      </p:transition>
+    </mc:Choice>
+    <mc:Fallback xmlns="">
+      <p:transition spd="med">
+        <p:fade/>
+      </p:transition>
+    </mc:Fallback>
+  </mc:AlternateContent>
+</p:sld>
+</file>
+
+<file path=ppt/slides/slide41.xml><?xml version="1.0" encoding="utf-8"?>
+<p:sld xmlns:a="http://schemas.openxmlformats.org/drawingml/2006/main" xmlns:r="http://schemas.openxmlformats.org/officeDocument/2006/relationships" xmlns:p="http://schemas.openxmlformats.org/presentationml/2006/main">
+  <p:cSld>
+    <p:spTree>
+      <p:nvGrpSpPr>
+        <p:cNvPr id="1" name=""/>
+        <p:cNvGrpSpPr/>
+        <p:nvPr/>
+      </p:nvGrpSpPr>
+      <p:grpSpPr>
+        <a:xfrm>
+          <a:off x="0" y="0"/>
+          <a:ext cx="0" cy="0"/>
+          <a:chOff x="0" y="0"/>
+          <a:chExt cx="0" cy="0"/>
+        </a:xfrm>
+      </p:grpSpPr>
+      <p:sp>
+        <p:nvSpPr>
+          <p:cNvPr id="2" name="Título 1">
+            <a:extLst>
+              <a:ext uri="{FF2B5EF4-FFF2-40B4-BE49-F238E27FC236}">
+                <a16:creationId xmlns:a16="http://schemas.microsoft.com/office/drawing/2014/main" id="{319A57F6-7C14-4A47-9E5D-DA3A7A8F6469}"/>
+              </a:ext>
+            </a:extLst>
+          </p:cNvPr>
+          <p:cNvSpPr>
+            <a:spLocks noGrp="1"/>
+          </p:cNvSpPr>
+          <p:nvPr>
+            <p:ph type="title"/>
+          </p:nvPr>
+        </p:nvSpPr>
+        <p:spPr>
+          <a:xfrm>
+            <a:off x="814957" y="-13658"/>
+            <a:ext cx="10558909" cy="7043058"/>
+          </a:xfrm>
+        </p:spPr>
+        <p:txBody>
+          <a:bodyPr anchor="ctr">
+            <a:normAutofit/>
+          </a:bodyPr>
+          <a:lstStyle/>
+          <a:p>
+            <a:pPr algn="ctr"/>
+            <a:r>
+              <a:rPr lang="es-ES" sz="6000" dirty="0"/>
+              <a:t>Pipes Personalizadas</a:t>
+            </a:r>
+          </a:p>
+        </p:txBody>
+      </p:sp>
+    </p:spTree>
+    <p:extLst>
+      <p:ext uri="{BB962C8B-B14F-4D97-AF65-F5344CB8AC3E}">
+        <p14:creationId xmlns:p14="http://schemas.microsoft.com/office/powerpoint/2010/main" val="3593048047"/>
+      </p:ext>
+    </p:extLst>
+  </p:cSld>
+  <p:clrMapOvr>
+    <a:masterClrMapping/>
+  </p:clrMapOvr>
+  <mc:AlternateContent xmlns:mc="http://schemas.openxmlformats.org/markup-compatibility/2006" xmlns:p14="http://schemas.microsoft.com/office/powerpoint/2010/main">
+    <mc:Choice Requires="p14">
+      <p:transition spd="med" p14:dur="700">
+        <p:fade/>
+      </p:transition>
+    </mc:Choice>
+    <mc:Fallback xmlns="">
+      <p:transition spd="med">
+        <p:fade/>
+      </p:transition>
+    </mc:Fallback>
+  </mc:AlternateContent>
+</p:sld>
+</file>
+
+<file path=ppt/slides/slide42.xml><?xml version="1.0" encoding="utf-8"?>
+<p:sld xmlns:a="http://schemas.openxmlformats.org/drawingml/2006/main" xmlns:r="http://schemas.openxmlformats.org/officeDocument/2006/relationships" xmlns:p="http://schemas.openxmlformats.org/presentationml/2006/main">
+  <p:cSld>
+    <p:spTree>
+      <p:nvGrpSpPr>
+        <p:cNvPr id="1" name=""/>
+        <p:cNvGrpSpPr/>
+        <p:nvPr/>
+      </p:nvGrpSpPr>
+      <p:grpSpPr>
+        <a:xfrm>
+          <a:off x="0" y="0"/>
+          <a:ext cx="0" cy="0"/>
+          <a:chOff x="0" y="0"/>
+          <a:chExt cx="0" cy="0"/>
+        </a:xfrm>
+      </p:grpSpPr>
+      <p:sp>
+        <p:nvSpPr>
+          <p:cNvPr id="2" name="Título 1">
+            <a:extLst>
+              <a:ext uri="{FF2B5EF4-FFF2-40B4-BE49-F238E27FC236}">
+                <a16:creationId xmlns:a16="http://schemas.microsoft.com/office/drawing/2014/main" id="{319A57F6-7C14-4A47-9E5D-DA3A7A8F6469}"/>
+              </a:ext>
+            </a:extLst>
+          </p:cNvPr>
+          <p:cNvSpPr>
+            <a:spLocks noGrp="1"/>
+          </p:cNvSpPr>
+          <p:nvPr>
+            <p:ph type="title"/>
+          </p:nvPr>
+        </p:nvSpPr>
+        <p:spPr>
+          <a:xfrm>
+            <a:off x="814957" y="-13658"/>
+            <a:ext cx="10558909" cy="6858000"/>
+          </a:xfrm>
+        </p:spPr>
+        <p:txBody>
+          <a:bodyPr anchor="ctr">
+            <a:normAutofit/>
+          </a:bodyPr>
+          <a:lstStyle/>
+          <a:p>
+            <a:pPr algn="ctr"/>
+            <a:r>
+              <a:rPr lang="es-ES" sz="6000" dirty="0"/>
+              <a:t>Preguntas y Respuestas</a:t>
+            </a:r>
+          </a:p>
+        </p:txBody>
+      </p:sp>
+    </p:spTree>
+    <p:extLst>
+      <p:ext uri="{BB962C8B-B14F-4D97-AF65-F5344CB8AC3E}">
+        <p14:creationId xmlns:p14="http://schemas.microsoft.com/office/powerpoint/2010/main" val="1016245299"/>
       </p:ext>
     </p:extLst>
   </p:cSld>
@@ -16015,151 +16495,6 @@
 </file>
 
 <file path=customXml/item1.xml><?xml version="1.0" encoding="utf-8"?>
-<p:properties xmlns:p="http://schemas.microsoft.com/office/2006/metadata/properties" xmlns:xsi="http://www.w3.org/2001/XMLSchema-instance" xmlns:pc="http://schemas.microsoft.com/office/infopath/2007/PartnerControls">
-  <documentManagement>
-    <LocPublishedLinkedAssetsLookup xmlns="4873beb7-5857-4685-be1f-d57550cc96cc" xsi:nil="true"/>
-    <ApprovalStatus xmlns="4873beb7-5857-4685-be1f-d57550cc96cc">InProgress</ApprovalStatus>
-    <MarketSpecific xmlns="4873beb7-5857-4685-be1f-d57550cc96cc">false</MarketSpecific>
-    <LocComments xmlns="4873beb7-5857-4685-be1f-d57550cc96cc" xsi:nil="true"/>
-    <LocLastLocAttemptVersionTypeLookup xmlns="4873beb7-5857-4685-be1f-d57550cc96cc" xsi:nil="true"/>
-    <DirectSourceMarket xmlns="4873beb7-5857-4685-be1f-d57550cc96cc" xsi:nil="true"/>
-    <ThumbnailAssetId xmlns="4873beb7-5857-4685-be1f-d57550cc96cc" xsi:nil="true"/>
-    <PrimaryImageGen xmlns="4873beb7-5857-4685-be1f-d57550cc96cc">false</PrimaryImageGen>
-    <LocNewPublishedVersionLookup xmlns="4873beb7-5857-4685-be1f-d57550cc96cc" xsi:nil="true"/>
-    <LegacyData xmlns="4873beb7-5857-4685-be1f-d57550cc96cc" xsi:nil="true"/>
-    <LocRecommendedHandoff xmlns="4873beb7-5857-4685-be1f-d57550cc96cc" xsi:nil="true"/>
-    <BusinessGroup xmlns="4873beb7-5857-4685-be1f-d57550cc96cc" xsi:nil="true"/>
-    <BlockPublish xmlns="4873beb7-5857-4685-be1f-d57550cc96cc">false</BlockPublish>
-    <TPFriendlyName xmlns="4873beb7-5857-4685-be1f-d57550cc96cc" xsi:nil="true"/>
-    <LocOverallPublishStatusLookup xmlns="4873beb7-5857-4685-be1f-d57550cc96cc" xsi:nil="true"/>
-    <NumericId xmlns="4873beb7-5857-4685-be1f-d57550cc96cc" xsi:nil="true"/>
-    <APEditor xmlns="4873beb7-5857-4685-be1f-d57550cc96cc">
-      <UserInfo>
-        <DisplayName/>
-        <AccountId xsi:nil="true"/>
-        <AccountType/>
-      </UserInfo>
-    </APEditor>
-    <SourceTitle xmlns="4873beb7-5857-4685-be1f-d57550cc96cc" xsi:nil="true"/>
-    <OpenTemplate xmlns="4873beb7-5857-4685-be1f-d57550cc96cc">true</OpenTemplate>
-    <LocOverallLocStatusLookup xmlns="4873beb7-5857-4685-be1f-d57550cc96cc" xsi:nil="true"/>
-    <UALocComments xmlns="4873beb7-5857-4685-be1f-d57550cc96cc" xsi:nil="true"/>
-    <ParentAssetId xmlns="4873beb7-5857-4685-be1f-d57550cc96cc" xsi:nil="true"/>
-    <IntlLangReviewDate xmlns="4873beb7-5857-4685-be1f-d57550cc96cc" xsi:nil="true"/>
-    <FeatureTagsTaxHTField0 xmlns="4873beb7-5857-4685-be1f-d57550cc96cc">
-      <Terms xmlns="http://schemas.microsoft.com/office/infopath/2007/PartnerControls"/>
-    </FeatureTagsTaxHTField0>
-    <PublishStatusLookup xmlns="4873beb7-5857-4685-be1f-d57550cc96cc">
-      <Value>1345093</Value>
-    </PublishStatusLookup>
-    <Providers xmlns="4873beb7-5857-4685-be1f-d57550cc96cc" xsi:nil="true"/>
-    <MachineTranslated xmlns="4873beb7-5857-4685-be1f-d57550cc96cc">false</MachineTranslated>
-    <OriginalSourceMarket xmlns="4873beb7-5857-4685-be1f-d57550cc96cc" xsi:nil="true"/>
-    <APDescription xmlns="4873beb7-5857-4685-be1f-d57550cc96cc">This simple template design works for technology and  businesses, but it's versatile enough to use in other contexts.  It features multiple slide layouts designed for widescreen (16x9 resolution) and includes a sample SmartArt list and chart that are easily editable.</APDescription>
-    <ClipArtFilename xmlns="4873beb7-5857-4685-be1f-d57550cc96cc" xsi:nil="true"/>
-    <ContentItem xmlns="4873beb7-5857-4685-be1f-d57550cc96cc" xsi:nil="true"/>
-    <TPInstallLocation xmlns="4873beb7-5857-4685-be1f-d57550cc96cc" xsi:nil="true"/>
-    <PublishTargets xmlns="4873beb7-5857-4685-be1f-d57550cc96cc">OfficeOnlineVNext</PublishTargets>
-    <TimesCloned xmlns="4873beb7-5857-4685-be1f-d57550cc96cc" xsi:nil="true"/>
-    <AssetStart xmlns="4873beb7-5857-4685-be1f-d57550cc96cc">2011-11-26T00:30:00+00:00</AssetStart>
-    <Provider xmlns="4873beb7-5857-4685-be1f-d57550cc96cc" xsi:nil="true"/>
-    <AcquiredFrom xmlns="4873beb7-5857-4685-be1f-d57550cc96cc">Internal MS</AcquiredFrom>
-    <FriendlyTitle xmlns="4873beb7-5857-4685-be1f-d57550cc96cc" xsi:nil="true"/>
-    <LastHandOff xmlns="4873beb7-5857-4685-be1f-d57550cc96cc" xsi:nil="true"/>
-    <TPClientViewer xmlns="4873beb7-5857-4685-be1f-d57550cc96cc" xsi:nil="true"/>
-    <TemplateStatus xmlns="4873beb7-5857-4685-be1f-d57550cc96cc">Complete</TemplateStatus>
-    <Downloads xmlns="4873beb7-5857-4685-be1f-d57550cc96cc">0</Downloads>
-    <OOCacheId xmlns="4873beb7-5857-4685-be1f-d57550cc96cc" xsi:nil="true"/>
-    <IsDeleted xmlns="4873beb7-5857-4685-be1f-d57550cc96cc">false</IsDeleted>
-    <LocPublishedDependentAssetsLookup xmlns="4873beb7-5857-4685-be1f-d57550cc96cc" xsi:nil="true"/>
-    <TPExecutable xmlns="4873beb7-5857-4685-be1f-d57550cc96cc" xsi:nil="true"/>
-    <EditorialTags xmlns="4873beb7-5857-4685-be1f-d57550cc96cc" xsi:nil="true"/>
-    <SubmitterId xmlns="4873beb7-5857-4685-be1f-d57550cc96cc" xsi:nil="true"/>
-    <ApprovalLog xmlns="4873beb7-5857-4685-be1f-d57550cc96cc" xsi:nil="true"/>
-    <AssetType xmlns="4873beb7-5857-4685-be1f-d57550cc96cc">TP</AssetType>
-    <BugNumber xmlns="4873beb7-5857-4685-be1f-d57550cc96cc" xsi:nil="true"/>
-    <CSXSubmissionDate xmlns="4873beb7-5857-4685-be1f-d57550cc96cc" xsi:nil="true"/>
-    <CSXUpdate xmlns="4873beb7-5857-4685-be1f-d57550cc96cc">false</CSXUpdate>
-    <Milestone xmlns="4873beb7-5857-4685-be1f-d57550cc96cc" xsi:nil="true"/>
-    <RecommendationsModifier xmlns="4873beb7-5857-4685-be1f-d57550cc96cc" xsi:nil="true"/>
-    <OriginAsset xmlns="4873beb7-5857-4685-be1f-d57550cc96cc" xsi:nil="true"/>
-    <TPComponent xmlns="4873beb7-5857-4685-be1f-d57550cc96cc" xsi:nil="true"/>
-    <AssetId xmlns="4873beb7-5857-4685-be1f-d57550cc96cc">TP102787989</AssetId>
-    <IntlLocPriority xmlns="4873beb7-5857-4685-be1f-d57550cc96cc" xsi:nil="true"/>
-    <PolicheckWords xmlns="4873beb7-5857-4685-be1f-d57550cc96cc" xsi:nil="true"/>
-    <TPLaunchHelpLink xmlns="4873beb7-5857-4685-be1f-d57550cc96cc" xsi:nil="true"/>
-    <TPApplication xmlns="4873beb7-5857-4685-be1f-d57550cc96cc" xsi:nil="true"/>
-    <CrawlForDependencies xmlns="4873beb7-5857-4685-be1f-d57550cc96cc">false</CrawlForDependencies>
-    <HandoffToMSDN xmlns="4873beb7-5857-4685-be1f-d57550cc96cc" xsi:nil="true"/>
-    <PlannedPubDate xmlns="4873beb7-5857-4685-be1f-d57550cc96cc" xsi:nil="true"/>
-    <IntlLangReviewer xmlns="4873beb7-5857-4685-be1f-d57550cc96cc" xsi:nil="true"/>
-    <TrustLevel xmlns="4873beb7-5857-4685-be1f-d57550cc96cc">1 Microsoft Managed Content</TrustLevel>
-    <LocLastLocAttemptVersionLookup xmlns="4873beb7-5857-4685-be1f-d57550cc96cc">694266</LocLastLocAttemptVersionLookup>
-    <LocProcessedForHandoffsLookup xmlns="4873beb7-5857-4685-be1f-d57550cc96cc" xsi:nil="true"/>
-    <IsSearchable xmlns="4873beb7-5857-4685-be1f-d57550cc96cc">true</IsSearchable>
-    <TemplateTemplateType xmlns="4873beb7-5857-4685-be1f-d57550cc96cc">PowerPoint Presentation Template</TemplateTemplateType>
-    <CampaignTagsTaxHTField0 xmlns="4873beb7-5857-4685-be1f-d57550cc96cc">
-      <Terms xmlns="http://schemas.microsoft.com/office/infopath/2007/PartnerControls"/>
-    </CampaignTagsTaxHTField0>
-    <TPNamespace xmlns="4873beb7-5857-4685-be1f-d57550cc96cc" xsi:nil="true"/>
-    <LocOverallPreviewStatusLookup xmlns="4873beb7-5857-4685-be1f-d57550cc96cc" xsi:nil="true"/>
-    <TaxCatchAll xmlns="4873beb7-5857-4685-be1f-d57550cc96cc"/>
-    <Markets xmlns="4873beb7-5857-4685-be1f-d57550cc96cc"/>
-    <UAProjectedTotalWords xmlns="4873beb7-5857-4685-be1f-d57550cc96cc" xsi:nil="true"/>
-    <IntlLangReview xmlns="4873beb7-5857-4685-be1f-d57550cc96cc" xsi:nil="true"/>
-    <OutputCachingOn xmlns="4873beb7-5857-4685-be1f-d57550cc96cc">false</OutputCachingOn>
-    <AverageRating xmlns="4873beb7-5857-4685-be1f-d57550cc96cc" xsi:nil="true"/>
-    <APAuthor xmlns="4873beb7-5857-4685-be1f-d57550cc96cc">
-      <UserInfo>
-        <DisplayName>REDMOND\kristaa</DisplayName>
-        <AccountId>136</AccountId>
-        <AccountType/>
-      </UserInfo>
-    </APAuthor>
-    <LocManualTestRequired xmlns="4873beb7-5857-4685-be1f-d57550cc96cc">false</LocManualTestRequired>
-    <TPCommandLine xmlns="4873beb7-5857-4685-be1f-d57550cc96cc" xsi:nil="true"/>
-    <TPAppVersion xmlns="4873beb7-5857-4685-be1f-d57550cc96cc" xsi:nil="true"/>
-    <EditorialStatus xmlns="4873beb7-5857-4685-be1f-d57550cc96cc">Complete</EditorialStatus>
-    <LastModifiedDateTime xmlns="4873beb7-5857-4685-be1f-d57550cc96cc" xsi:nil="true"/>
-    <ScenarioTagsTaxHTField0 xmlns="4873beb7-5857-4685-be1f-d57550cc96cc">
-      <Terms xmlns="http://schemas.microsoft.com/office/infopath/2007/PartnerControls"/>
-    </ScenarioTagsTaxHTField0>
-    <LocProcessedForMarketsLookup xmlns="4873beb7-5857-4685-be1f-d57550cc96cc" xsi:nil="true"/>
-    <TPLaunchHelpLinkType xmlns="4873beb7-5857-4685-be1f-d57550cc96cc">Template</TPLaunchHelpLinkType>
-    <OriginalRelease xmlns="4873beb7-5857-4685-be1f-d57550cc96cc">15</OriginalRelease>
-    <LocalizationTagsTaxHTField0 xmlns="4873beb7-5857-4685-be1f-d57550cc96cc">
-      <Terms xmlns="http://schemas.microsoft.com/office/infopath/2007/PartnerControls"/>
-    </LocalizationTagsTaxHTField0>
-    <UACurrentWords xmlns="4873beb7-5857-4685-be1f-d57550cc96cc" xsi:nil="true"/>
-    <ArtSampleDocs xmlns="4873beb7-5857-4685-be1f-d57550cc96cc" xsi:nil="true"/>
-    <UALocRecommendation xmlns="4873beb7-5857-4685-be1f-d57550cc96cc">Localize</UALocRecommendation>
-    <Manager xmlns="4873beb7-5857-4685-be1f-d57550cc96cc" xsi:nil="true"/>
-    <LocOverallHandbackStatusLookup xmlns="4873beb7-5857-4685-be1f-d57550cc96cc" xsi:nil="true"/>
-    <ShowIn xmlns="4873beb7-5857-4685-be1f-d57550cc96cc">Show everywhere</ShowIn>
-    <UANotes xmlns="4873beb7-5857-4685-be1f-d57550cc96cc" xsi:nil="true"/>
-    <InternalTagsTaxHTField0 xmlns="4873beb7-5857-4685-be1f-d57550cc96cc">
-      <Terms xmlns="http://schemas.microsoft.com/office/infopath/2007/PartnerControls"/>
-    </InternalTagsTaxHTField0>
-    <CSXHash xmlns="4873beb7-5857-4685-be1f-d57550cc96cc" xsi:nil="true"/>
-    <VoteCount xmlns="4873beb7-5857-4685-be1f-d57550cc96cc" xsi:nil="true"/>
-    <AssetExpire xmlns="4873beb7-5857-4685-be1f-d57550cc96cc">2029-05-12T07:00:00+00:00</AssetExpire>
-    <DSATActionTaken xmlns="4873beb7-5857-4685-be1f-d57550cc96cc" xsi:nil="true"/>
-    <CSXSubmissionMarket xmlns="4873beb7-5857-4685-be1f-d57550cc96cc" xsi:nil="true"/>
-    <LocMarketGroupTiers2 xmlns="4873beb7-5857-4685-be1f-d57550cc96cc" xsi:nil="true"/>
-  </documentManagement>
-</p:properties>
-</file>
-
-<file path=customXml/item2.xml><?xml version="1.0" encoding="utf-8"?>
-<?mso-contentType ?>
-<FormTemplates xmlns="http://schemas.microsoft.com/sharepoint/v3/contenttype/forms">
-  <Display>DocumentLibraryForm</Display>
-  <Edit>AssetEditForm</Edit>
-  <New>DocumentLibraryForm</New>
-</FormTemplates>
-</file>
-
-<file path=customXml/item3.xml><?xml version="1.0" encoding="utf-8"?>
 <ct:contentTypeSchema xmlns:ct="http://schemas.microsoft.com/office/2006/metadata/contentType" xmlns:ma="http://schemas.microsoft.com/office/2006/metadata/properties/metaAttributes" ct:_="" ma:_="" ma:contentTypeName="TemplateFile" ma:contentTypeID="0x0101006EDDDB5EE6D98C44930B742096920B300400F5B6D36B3EF94B4E9A635CDF2A18F5B8" ma:contentTypeVersion="72" ma:contentTypeDescription="Create a new document." ma:contentTypeScope="" ma:versionID="a23e56308344d904b51738559c3d67c9">
   <xsd:schema xmlns:xsd="http://www.w3.org/2001/XMLSchema" xmlns:xs="http://www.w3.org/2001/XMLSchema" xmlns:p="http://schemas.microsoft.com/office/2006/metadata/properties" xmlns:ns2="4873beb7-5857-4685-be1f-d57550cc96cc" targetNamespace="http://schemas.microsoft.com/office/2006/metadata/properties" ma:root="true" ma:fieldsID="cd0908cc4600e77bf5da051303e00c8d" ns2:_="">
     <xsd:import namespace="4873beb7-5857-4685-be1f-d57550cc96cc"/>
@@ -17199,7 +17534,170 @@
 </ct:contentTypeSchema>
 </file>
 
+<file path=customXml/item2.xml><?xml version="1.0" encoding="utf-8"?>
+<p:properties xmlns:p="http://schemas.microsoft.com/office/2006/metadata/properties" xmlns:xsi="http://www.w3.org/2001/XMLSchema-instance" xmlns:pc="http://schemas.microsoft.com/office/infopath/2007/PartnerControls">
+  <documentManagement>
+    <LocPublishedLinkedAssetsLookup xmlns="4873beb7-5857-4685-be1f-d57550cc96cc" xsi:nil="true"/>
+    <ApprovalStatus xmlns="4873beb7-5857-4685-be1f-d57550cc96cc">InProgress</ApprovalStatus>
+    <MarketSpecific xmlns="4873beb7-5857-4685-be1f-d57550cc96cc">false</MarketSpecific>
+    <LocComments xmlns="4873beb7-5857-4685-be1f-d57550cc96cc" xsi:nil="true"/>
+    <LocLastLocAttemptVersionTypeLookup xmlns="4873beb7-5857-4685-be1f-d57550cc96cc" xsi:nil="true"/>
+    <DirectSourceMarket xmlns="4873beb7-5857-4685-be1f-d57550cc96cc" xsi:nil="true"/>
+    <ThumbnailAssetId xmlns="4873beb7-5857-4685-be1f-d57550cc96cc" xsi:nil="true"/>
+    <PrimaryImageGen xmlns="4873beb7-5857-4685-be1f-d57550cc96cc">false</PrimaryImageGen>
+    <LocNewPublishedVersionLookup xmlns="4873beb7-5857-4685-be1f-d57550cc96cc" xsi:nil="true"/>
+    <LegacyData xmlns="4873beb7-5857-4685-be1f-d57550cc96cc" xsi:nil="true"/>
+    <LocRecommendedHandoff xmlns="4873beb7-5857-4685-be1f-d57550cc96cc" xsi:nil="true"/>
+    <BusinessGroup xmlns="4873beb7-5857-4685-be1f-d57550cc96cc" xsi:nil="true"/>
+    <BlockPublish xmlns="4873beb7-5857-4685-be1f-d57550cc96cc">false</BlockPublish>
+    <TPFriendlyName xmlns="4873beb7-5857-4685-be1f-d57550cc96cc" xsi:nil="true"/>
+    <LocOverallPublishStatusLookup xmlns="4873beb7-5857-4685-be1f-d57550cc96cc" xsi:nil="true"/>
+    <NumericId xmlns="4873beb7-5857-4685-be1f-d57550cc96cc" xsi:nil="true"/>
+    <APEditor xmlns="4873beb7-5857-4685-be1f-d57550cc96cc">
+      <UserInfo>
+        <DisplayName/>
+        <AccountId xsi:nil="true"/>
+        <AccountType/>
+      </UserInfo>
+    </APEditor>
+    <SourceTitle xmlns="4873beb7-5857-4685-be1f-d57550cc96cc" xsi:nil="true"/>
+    <OpenTemplate xmlns="4873beb7-5857-4685-be1f-d57550cc96cc">true</OpenTemplate>
+    <LocOverallLocStatusLookup xmlns="4873beb7-5857-4685-be1f-d57550cc96cc" xsi:nil="true"/>
+    <UALocComments xmlns="4873beb7-5857-4685-be1f-d57550cc96cc" xsi:nil="true"/>
+    <ParentAssetId xmlns="4873beb7-5857-4685-be1f-d57550cc96cc" xsi:nil="true"/>
+    <IntlLangReviewDate xmlns="4873beb7-5857-4685-be1f-d57550cc96cc" xsi:nil="true"/>
+    <FeatureTagsTaxHTField0 xmlns="4873beb7-5857-4685-be1f-d57550cc96cc">
+      <Terms xmlns="http://schemas.microsoft.com/office/infopath/2007/PartnerControls"/>
+    </FeatureTagsTaxHTField0>
+    <PublishStatusLookup xmlns="4873beb7-5857-4685-be1f-d57550cc96cc">
+      <Value>1345093</Value>
+    </PublishStatusLookup>
+    <Providers xmlns="4873beb7-5857-4685-be1f-d57550cc96cc" xsi:nil="true"/>
+    <MachineTranslated xmlns="4873beb7-5857-4685-be1f-d57550cc96cc">false</MachineTranslated>
+    <OriginalSourceMarket xmlns="4873beb7-5857-4685-be1f-d57550cc96cc" xsi:nil="true"/>
+    <APDescription xmlns="4873beb7-5857-4685-be1f-d57550cc96cc">This simple template design works for technology and  businesses, but it's versatile enough to use in other contexts.  It features multiple slide layouts designed for widescreen (16x9 resolution) and includes a sample SmartArt list and chart that are easily editable.</APDescription>
+    <ClipArtFilename xmlns="4873beb7-5857-4685-be1f-d57550cc96cc" xsi:nil="true"/>
+    <ContentItem xmlns="4873beb7-5857-4685-be1f-d57550cc96cc" xsi:nil="true"/>
+    <TPInstallLocation xmlns="4873beb7-5857-4685-be1f-d57550cc96cc" xsi:nil="true"/>
+    <PublishTargets xmlns="4873beb7-5857-4685-be1f-d57550cc96cc">OfficeOnlineVNext</PublishTargets>
+    <TimesCloned xmlns="4873beb7-5857-4685-be1f-d57550cc96cc" xsi:nil="true"/>
+    <AssetStart xmlns="4873beb7-5857-4685-be1f-d57550cc96cc">2011-11-26T00:30:00+00:00</AssetStart>
+    <Provider xmlns="4873beb7-5857-4685-be1f-d57550cc96cc" xsi:nil="true"/>
+    <AcquiredFrom xmlns="4873beb7-5857-4685-be1f-d57550cc96cc">Internal MS</AcquiredFrom>
+    <FriendlyTitle xmlns="4873beb7-5857-4685-be1f-d57550cc96cc" xsi:nil="true"/>
+    <LastHandOff xmlns="4873beb7-5857-4685-be1f-d57550cc96cc" xsi:nil="true"/>
+    <TPClientViewer xmlns="4873beb7-5857-4685-be1f-d57550cc96cc" xsi:nil="true"/>
+    <TemplateStatus xmlns="4873beb7-5857-4685-be1f-d57550cc96cc">Complete</TemplateStatus>
+    <Downloads xmlns="4873beb7-5857-4685-be1f-d57550cc96cc">0</Downloads>
+    <OOCacheId xmlns="4873beb7-5857-4685-be1f-d57550cc96cc" xsi:nil="true"/>
+    <IsDeleted xmlns="4873beb7-5857-4685-be1f-d57550cc96cc">false</IsDeleted>
+    <LocPublishedDependentAssetsLookup xmlns="4873beb7-5857-4685-be1f-d57550cc96cc" xsi:nil="true"/>
+    <TPExecutable xmlns="4873beb7-5857-4685-be1f-d57550cc96cc" xsi:nil="true"/>
+    <EditorialTags xmlns="4873beb7-5857-4685-be1f-d57550cc96cc" xsi:nil="true"/>
+    <SubmitterId xmlns="4873beb7-5857-4685-be1f-d57550cc96cc" xsi:nil="true"/>
+    <ApprovalLog xmlns="4873beb7-5857-4685-be1f-d57550cc96cc" xsi:nil="true"/>
+    <AssetType xmlns="4873beb7-5857-4685-be1f-d57550cc96cc">TP</AssetType>
+    <BugNumber xmlns="4873beb7-5857-4685-be1f-d57550cc96cc" xsi:nil="true"/>
+    <CSXSubmissionDate xmlns="4873beb7-5857-4685-be1f-d57550cc96cc" xsi:nil="true"/>
+    <CSXUpdate xmlns="4873beb7-5857-4685-be1f-d57550cc96cc">false</CSXUpdate>
+    <Milestone xmlns="4873beb7-5857-4685-be1f-d57550cc96cc" xsi:nil="true"/>
+    <RecommendationsModifier xmlns="4873beb7-5857-4685-be1f-d57550cc96cc" xsi:nil="true"/>
+    <OriginAsset xmlns="4873beb7-5857-4685-be1f-d57550cc96cc" xsi:nil="true"/>
+    <TPComponent xmlns="4873beb7-5857-4685-be1f-d57550cc96cc" xsi:nil="true"/>
+    <AssetId xmlns="4873beb7-5857-4685-be1f-d57550cc96cc">TP102787989</AssetId>
+    <IntlLocPriority xmlns="4873beb7-5857-4685-be1f-d57550cc96cc" xsi:nil="true"/>
+    <PolicheckWords xmlns="4873beb7-5857-4685-be1f-d57550cc96cc" xsi:nil="true"/>
+    <TPLaunchHelpLink xmlns="4873beb7-5857-4685-be1f-d57550cc96cc" xsi:nil="true"/>
+    <TPApplication xmlns="4873beb7-5857-4685-be1f-d57550cc96cc" xsi:nil="true"/>
+    <CrawlForDependencies xmlns="4873beb7-5857-4685-be1f-d57550cc96cc">false</CrawlForDependencies>
+    <HandoffToMSDN xmlns="4873beb7-5857-4685-be1f-d57550cc96cc" xsi:nil="true"/>
+    <PlannedPubDate xmlns="4873beb7-5857-4685-be1f-d57550cc96cc" xsi:nil="true"/>
+    <IntlLangReviewer xmlns="4873beb7-5857-4685-be1f-d57550cc96cc" xsi:nil="true"/>
+    <TrustLevel xmlns="4873beb7-5857-4685-be1f-d57550cc96cc">1 Microsoft Managed Content</TrustLevel>
+    <LocLastLocAttemptVersionLookup xmlns="4873beb7-5857-4685-be1f-d57550cc96cc">694266</LocLastLocAttemptVersionLookup>
+    <LocProcessedForHandoffsLookup xmlns="4873beb7-5857-4685-be1f-d57550cc96cc" xsi:nil="true"/>
+    <IsSearchable xmlns="4873beb7-5857-4685-be1f-d57550cc96cc">true</IsSearchable>
+    <TemplateTemplateType xmlns="4873beb7-5857-4685-be1f-d57550cc96cc">PowerPoint Presentation Template</TemplateTemplateType>
+    <CampaignTagsTaxHTField0 xmlns="4873beb7-5857-4685-be1f-d57550cc96cc">
+      <Terms xmlns="http://schemas.microsoft.com/office/infopath/2007/PartnerControls"/>
+    </CampaignTagsTaxHTField0>
+    <TPNamespace xmlns="4873beb7-5857-4685-be1f-d57550cc96cc" xsi:nil="true"/>
+    <LocOverallPreviewStatusLookup xmlns="4873beb7-5857-4685-be1f-d57550cc96cc" xsi:nil="true"/>
+    <TaxCatchAll xmlns="4873beb7-5857-4685-be1f-d57550cc96cc"/>
+    <Markets xmlns="4873beb7-5857-4685-be1f-d57550cc96cc"/>
+    <UAProjectedTotalWords xmlns="4873beb7-5857-4685-be1f-d57550cc96cc" xsi:nil="true"/>
+    <IntlLangReview xmlns="4873beb7-5857-4685-be1f-d57550cc96cc" xsi:nil="true"/>
+    <OutputCachingOn xmlns="4873beb7-5857-4685-be1f-d57550cc96cc">false</OutputCachingOn>
+    <AverageRating xmlns="4873beb7-5857-4685-be1f-d57550cc96cc" xsi:nil="true"/>
+    <APAuthor xmlns="4873beb7-5857-4685-be1f-d57550cc96cc">
+      <UserInfo>
+        <DisplayName>REDMOND\kristaa</DisplayName>
+        <AccountId>136</AccountId>
+        <AccountType/>
+      </UserInfo>
+    </APAuthor>
+    <LocManualTestRequired xmlns="4873beb7-5857-4685-be1f-d57550cc96cc">false</LocManualTestRequired>
+    <TPCommandLine xmlns="4873beb7-5857-4685-be1f-d57550cc96cc" xsi:nil="true"/>
+    <TPAppVersion xmlns="4873beb7-5857-4685-be1f-d57550cc96cc" xsi:nil="true"/>
+    <EditorialStatus xmlns="4873beb7-5857-4685-be1f-d57550cc96cc">Complete</EditorialStatus>
+    <LastModifiedDateTime xmlns="4873beb7-5857-4685-be1f-d57550cc96cc" xsi:nil="true"/>
+    <ScenarioTagsTaxHTField0 xmlns="4873beb7-5857-4685-be1f-d57550cc96cc">
+      <Terms xmlns="http://schemas.microsoft.com/office/infopath/2007/PartnerControls"/>
+    </ScenarioTagsTaxHTField0>
+    <LocProcessedForMarketsLookup xmlns="4873beb7-5857-4685-be1f-d57550cc96cc" xsi:nil="true"/>
+    <TPLaunchHelpLinkType xmlns="4873beb7-5857-4685-be1f-d57550cc96cc">Template</TPLaunchHelpLinkType>
+    <OriginalRelease xmlns="4873beb7-5857-4685-be1f-d57550cc96cc">15</OriginalRelease>
+    <LocalizationTagsTaxHTField0 xmlns="4873beb7-5857-4685-be1f-d57550cc96cc">
+      <Terms xmlns="http://schemas.microsoft.com/office/infopath/2007/PartnerControls"/>
+    </LocalizationTagsTaxHTField0>
+    <UACurrentWords xmlns="4873beb7-5857-4685-be1f-d57550cc96cc" xsi:nil="true"/>
+    <ArtSampleDocs xmlns="4873beb7-5857-4685-be1f-d57550cc96cc" xsi:nil="true"/>
+    <UALocRecommendation xmlns="4873beb7-5857-4685-be1f-d57550cc96cc">Localize</UALocRecommendation>
+    <Manager xmlns="4873beb7-5857-4685-be1f-d57550cc96cc" xsi:nil="true"/>
+    <LocOverallHandbackStatusLookup xmlns="4873beb7-5857-4685-be1f-d57550cc96cc" xsi:nil="true"/>
+    <ShowIn xmlns="4873beb7-5857-4685-be1f-d57550cc96cc">Show everywhere</ShowIn>
+    <UANotes xmlns="4873beb7-5857-4685-be1f-d57550cc96cc" xsi:nil="true"/>
+    <InternalTagsTaxHTField0 xmlns="4873beb7-5857-4685-be1f-d57550cc96cc">
+      <Terms xmlns="http://schemas.microsoft.com/office/infopath/2007/PartnerControls"/>
+    </InternalTagsTaxHTField0>
+    <CSXHash xmlns="4873beb7-5857-4685-be1f-d57550cc96cc" xsi:nil="true"/>
+    <VoteCount xmlns="4873beb7-5857-4685-be1f-d57550cc96cc" xsi:nil="true"/>
+    <AssetExpire xmlns="4873beb7-5857-4685-be1f-d57550cc96cc">2029-05-12T07:00:00+00:00</AssetExpire>
+    <DSATActionTaken xmlns="4873beb7-5857-4685-be1f-d57550cc96cc" xsi:nil="true"/>
+    <CSXSubmissionMarket xmlns="4873beb7-5857-4685-be1f-d57550cc96cc" xsi:nil="true"/>
+    <LocMarketGroupTiers2 xmlns="4873beb7-5857-4685-be1f-d57550cc96cc" xsi:nil="true"/>
+  </documentManagement>
+</p:properties>
+</file>
+
+<file path=customXml/item3.xml><?xml version="1.0" encoding="utf-8"?>
+<?mso-contentType ?>
+<FormTemplates xmlns="http://schemas.microsoft.com/sharepoint/v3/contenttype/forms">
+  <Display>DocumentLibraryForm</Display>
+  <Edit>AssetEditForm</Edit>
+  <New>DocumentLibraryForm</New>
+</FormTemplates>
+</file>
+
 <file path=customXml/itemProps1.xml><?xml version="1.0" encoding="utf-8"?>
+<ds:datastoreItem xmlns:ds="http://schemas.openxmlformats.org/officeDocument/2006/customXml" ds:itemID="{A09BF4D4-EF60-4196-BFC3-9462D607978C}">
+  <ds:schemaRefs>
+    <ds:schemaRef ds:uri="http://schemas.microsoft.com/office/2006/metadata/contentType"/>
+    <ds:schemaRef ds:uri="http://schemas.microsoft.com/office/2006/metadata/properties/metaAttributes"/>
+    <ds:schemaRef ds:uri="http://www.w3.org/2001/XMLSchema"/>
+    <ds:schemaRef ds:uri="http://schemas.microsoft.com/office/2006/metadata/properties"/>
+    <ds:schemaRef ds:uri="4873beb7-5857-4685-be1f-d57550cc96cc"/>
+    <ds:schemaRef ds:uri="http://schemas.microsoft.com/office/2006/documentManagement/types"/>
+    <ds:schemaRef ds:uri="http://schemas.microsoft.com/office/infopath/2007/PartnerControls"/>
+    <ds:schemaRef ds:uri="http://schemas.openxmlformats.org/package/2006/metadata/core-properties"/>
+    <ds:schemaRef ds:uri="http://purl.org/dc/elements/1.1/"/>
+    <ds:schemaRef ds:uri="http://purl.org/dc/terms/"/>
+    <ds:schemaRef ds:uri="http://schemas.microsoft.com/internal/obd"/>
+  </ds:schemaRefs>
+</ds:datastoreItem>
+</file>
+
+<file path=customXml/itemProps2.xml><?xml version="1.0" encoding="utf-8"?>
 <ds:datastoreItem xmlns:ds="http://schemas.openxmlformats.org/officeDocument/2006/customXml" ds:itemID="{60C67BEE-D13F-4BD2-98A5-34D8A0977F68}">
   <ds:schemaRefs>
     <ds:schemaRef ds:uri="http://schemas.openxmlformats.org/package/2006/metadata/core-properties"/>
@@ -17215,28 +17713,10 @@
 </ds:datastoreItem>
 </file>
 
-<file path=customXml/itemProps2.xml><?xml version="1.0" encoding="utf-8"?>
+<file path=customXml/itemProps3.xml><?xml version="1.0" encoding="utf-8"?>
 <ds:datastoreItem xmlns:ds="http://schemas.openxmlformats.org/officeDocument/2006/customXml" ds:itemID="{3836F65B-1B07-41EE-A0E8-BC6EF3855225}">
   <ds:schemaRefs>
     <ds:schemaRef ds:uri="http://schemas.microsoft.com/sharepoint/v3/contenttype/forms"/>
   </ds:schemaRefs>
 </ds:datastoreItem>
-</file>
-
-<file path=customXml/itemProps3.xml><?xml version="1.0" encoding="utf-8"?>
-<ds:datastoreItem xmlns:ds="http://schemas.openxmlformats.org/officeDocument/2006/customXml" ds:itemID="{A09BF4D4-EF60-4196-BFC3-9462D607978C}">
-  <ds:schemaRefs>
-    <ds:schemaRef ds:uri="http://schemas.microsoft.com/office/2006/metadata/contentType"/>
-    <ds:schemaRef ds:uri="http://schemas.microsoft.com/office/2006/metadata/properties/metaAttributes"/>
-    <ds:schemaRef ds:uri="http://www.w3.org/2001/XMLSchema"/>
-    <ds:schemaRef ds:uri="http://schemas.microsoft.com/office/2006/metadata/properties"/>
-    <ds:schemaRef ds:uri="4873beb7-5857-4685-be1f-d57550cc96cc"/>
-    <ds:schemaRef ds:uri="http://schemas.microsoft.com/office/2006/documentManagement/types"/>
-    <ds:schemaRef ds:uri="http://schemas.microsoft.com/office/infopath/2007/PartnerControls"/>
-    <ds:schemaRef ds:uri="http://schemas.openxmlformats.org/package/2006/metadata/core-properties"/>
-    <ds:schemaRef ds:uri="http://purl.org/dc/elements/1.1/"/>
-    <ds:schemaRef ds:uri="http://purl.org/dc/terms/"/>
-    <ds:schemaRef ds:uri="http://schemas.microsoft.com/internal/obd"/>
-  </ds:schemaRefs>
-</ds:datastoreItem>
 </file>
</xml_diff>

<commit_message>
Actualizacion diapositivas con introduccion servicios
</commit_message>
<xml_diff>
--- a/Angular.pptx
+++ b/Angular.pptx
@@ -5,10 +5,10 @@
     <p:sldMasterId id="2147483660" r:id="rId4"/>
   </p:sldMasterIdLst>
   <p:notesMasterIdLst>
-    <p:notesMasterId r:id="rId47"/>
+    <p:notesMasterId r:id="rId49"/>
   </p:notesMasterIdLst>
   <p:handoutMasterIdLst>
-    <p:handoutMasterId r:id="rId48"/>
+    <p:handoutMasterId r:id="rId50"/>
   </p:handoutMasterIdLst>
   <p:sldIdLst>
     <p:sldId id="257" r:id="rId5"/>
@@ -53,6 +53,8 @@
     <p:sldId id="316" r:id="rId44"/>
     <p:sldId id="315" r:id="rId45"/>
     <p:sldId id="317" r:id="rId46"/>
+    <p:sldId id="318" r:id="rId47"/>
+    <p:sldId id="319" r:id="rId48"/>
   </p:sldIdLst>
   <p:sldSz cx="12188825" cy="6858000"/>
   <p:notesSz cx="6858000" cy="9144000"/>
@@ -14510,6 +14512,370 @@
 </p:sld>
 </file>
 
+<file path=ppt/slides/slide43.xml><?xml version="1.0" encoding="utf-8"?>
+<p:sld xmlns:a="http://schemas.openxmlformats.org/drawingml/2006/main" xmlns:r="http://schemas.openxmlformats.org/officeDocument/2006/relationships" xmlns:p="http://schemas.openxmlformats.org/presentationml/2006/main">
+  <p:cSld>
+    <p:spTree>
+      <p:nvGrpSpPr>
+        <p:cNvPr id="1" name=""/>
+        <p:cNvGrpSpPr/>
+        <p:nvPr/>
+      </p:nvGrpSpPr>
+      <p:grpSpPr>
+        <a:xfrm>
+          <a:off x="0" y="0"/>
+          <a:ext cx="0" cy="0"/>
+          <a:chOff x="0" y="0"/>
+          <a:chExt cx="0" cy="0"/>
+        </a:xfrm>
+      </p:grpSpPr>
+      <p:sp>
+        <p:nvSpPr>
+          <p:cNvPr id="2" name="Título 1">
+            <a:extLst>
+              <a:ext uri="{FF2B5EF4-FFF2-40B4-BE49-F238E27FC236}">
+                <a16:creationId xmlns:a16="http://schemas.microsoft.com/office/drawing/2014/main" id="{75E1D69F-D374-48DB-89AA-5C4249D76385}"/>
+              </a:ext>
+            </a:extLst>
+          </p:cNvPr>
+          <p:cNvSpPr>
+            <a:spLocks noGrp="1"/>
+          </p:cNvSpPr>
+          <p:nvPr>
+            <p:ph type="title"/>
+          </p:nvPr>
+        </p:nvSpPr>
+        <p:spPr/>
+        <p:txBody>
+          <a:bodyPr/>
+          <a:lstStyle/>
+          <a:p>
+            <a:r>
+              <a:rPr lang="es-ES" dirty="0"/>
+              <a:t>Servicios</a:t>
+            </a:r>
+          </a:p>
+        </p:txBody>
+      </p:sp>
+      <p:sp>
+        <p:nvSpPr>
+          <p:cNvPr id="3" name="Marcador de contenido 2">
+            <a:extLst>
+              <a:ext uri="{FF2B5EF4-FFF2-40B4-BE49-F238E27FC236}">
+                <a16:creationId xmlns:a16="http://schemas.microsoft.com/office/drawing/2014/main" id="{14F95FD3-F90A-4611-A951-C8A6B763398C}"/>
+              </a:ext>
+            </a:extLst>
+          </p:cNvPr>
+          <p:cNvSpPr>
+            <a:spLocks noGrp="1"/>
+          </p:cNvSpPr>
+          <p:nvPr>
+            <p:ph idx="1"/>
+          </p:nvPr>
+        </p:nvSpPr>
+        <p:spPr>
+          <a:xfrm>
+            <a:off x="1218883" y="1701797"/>
+            <a:ext cx="4875529" cy="4462272"/>
+          </a:xfrm>
+        </p:spPr>
+        <p:txBody>
+          <a:bodyPr>
+            <a:normAutofit lnSpcReduction="10000"/>
+          </a:bodyPr>
+          <a:lstStyle/>
+          <a:p>
+            <a:pPr algn="just"/>
+            <a:r>
+              <a:rPr lang="es-ES" dirty="0"/>
+              <a:t>Clase que ofrecen una lógica reutilizable que tiene un propósito y esta bien definida.</a:t>
+            </a:r>
+          </a:p>
+          <a:p>
+            <a:pPr algn="just"/>
+            <a:r>
+              <a:rPr lang="es-ES" dirty="0"/>
+              <a:t>Utiliza el decorador @</a:t>
+            </a:r>
+            <a:r>
+              <a:rPr lang="es-ES" dirty="0" err="1"/>
+              <a:t>Injectable</a:t>
+            </a:r>
+            <a:endParaRPr lang="es-ES" dirty="0"/>
+          </a:p>
+          <a:p>
+            <a:pPr algn="just"/>
+            <a:r>
+              <a:rPr lang="es-ES" dirty="0"/>
+              <a:t>Para utilizar un servicio Angular nos ofrece la inyección de dependencia en los constructores de una clase.</a:t>
+            </a:r>
+          </a:p>
+        </p:txBody>
+      </p:sp>
+      <p:pic>
+        <p:nvPicPr>
+          <p:cNvPr id="6" name="Imagen 5">
+            <a:extLst>
+              <a:ext uri="{FF2B5EF4-FFF2-40B4-BE49-F238E27FC236}">
+                <a16:creationId xmlns:a16="http://schemas.microsoft.com/office/drawing/2014/main" id="{027D033F-86CC-45AB-BE68-C9B60FB97DD7}"/>
+              </a:ext>
+            </a:extLst>
+          </p:cNvPr>
+          <p:cNvPicPr>
+            <a:picLocks noChangeAspect="1"/>
+          </p:cNvPicPr>
+          <p:nvPr/>
+        </p:nvPicPr>
+        <p:blipFill>
+          <a:blip r:embed="rId2"/>
+          <a:stretch>
+            <a:fillRect/>
+          </a:stretch>
+        </p:blipFill>
+        <p:spPr>
+          <a:xfrm>
+            <a:off x="6670477" y="1701796"/>
+            <a:ext cx="4450143" cy="3253578"/>
+          </a:xfrm>
+          <a:prstGeom prst="rect">
+            <a:avLst/>
+          </a:prstGeom>
+        </p:spPr>
+      </p:pic>
+      <p:pic>
+        <p:nvPicPr>
+          <p:cNvPr id="7" name="Imagen 6">
+            <a:extLst>
+              <a:ext uri="{FF2B5EF4-FFF2-40B4-BE49-F238E27FC236}">
+                <a16:creationId xmlns:a16="http://schemas.microsoft.com/office/drawing/2014/main" id="{CC72ABF3-AC59-47CB-8FD9-E4FC8A44951C}"/>
+              </a:ext>
+            </a:extLst>
+          </p:cNvPr>
+          <p:cNvPicPr>
+            <a:picLocks noChangeAspect="1"/>
+          </p:cNvPicPr>
+          <p:nvPr/>
+        </p:nvPicPr>
+        <p:blipFill>
+          <a:blip r:embed="rId3"/>
+          <a:stretch>
+            <a:fillRect/>
+          </a:stretch>
+        </p:blipFill>
+        <p:spPr>
+          <a:xfrm>
+            <a:off x="6670477" y="5156204"/>
+            <a:ext cx="5111857" cy="721068"/>
+          </a:xfrm>
+          <a:prstGeom prst="rect">
+            <a:avLst/>
+          </a:prstGeom>
+        </p:spPr>
+      </p:pic>
+    </p:spTree>
+    <p:extLst>
+      <p:ext uri="{BB962C8B-B14F-4D97-AF65-F5344CB8AC3E}">
+        <p14:creationId xmlns:p14="http://schemas.microsoft.com/office/powerpoint/2010/main" val="26457219"/>
+      </p:ext>
+    </p:extLst>
+  </p:cSld>
+  <p:clrMapOvr>
+    <a:masterClrMapping/>
+  </p:clrMapOvr>
+  <mc:AlternateContent xmlns:mc="http://schemas.openxmlformats.org/markup-compatibility/2006" xmlns:p14="http://schemas.microsoft.com/office/powerpoint/2010/main">
+    <mc:Choice Requires="p14">
+      <p:transition spd="med" p14:dur="700">
+        <p:fade/>
+      </p:transition>
+    </mc:Choice>
+    <mc:Fallback xmlns="">
+      <p:transition spd="med">
+        <p:fade/>
+      </p:transition>
+    </mc:Fallback>
+  </mc:AlternateContent>
+</p:sld>
+</file>
+
+<file path=ppt/slides/slide44.xml><?xml version="1.0" encoding="utf-8"?>
+<p:sld xmlns:a="http://schemas.openxmlformats.org/drawingml/2006/main" xmlns:r="http://schemas.openxmlformats.org/officeDocument/2006/relationships" xmlns:p="http://schemas.openxmlformats.org/presentationml/2006/main">
+  <p:cSld>
+    <p:spTree>
+      <p:nvGrpSpPr>
+        <p:cNvPr id="1" name=""/>
+        <p:cNvGrpSpPr/>
+        <p:nvPr/>
+      </p:nvGrpSpPr>
+      <p:grpSpPr>
+        <a:xfrm>
+          <a:off x="0" y="0"/>
+          <a:ext cx="0" cy="0"/>
+          <a:chOff x="0" y="0"/>
+          <a:chExt cx="0" cy="0"/>
+        </a:xfrm>
+      </p:grpSpPr>
+      <p:sp>
+        <p:nvSpPr>
+          <p:cNvPr id="2" name="Título 1">
+            <a:extLst>
+              <a:ext uri="{FF2B5EF4-FFF2-40B4-BE49-F238E27FC236}">
+                <a16:creationId xmlns:a16="http://schemas.microsoft.com/office/drawing/2014/main" id="{62C7611B-3911-4F83-9DAC-23EAF1A87EFC}"/>
+              </a:ext>
+            </a:extLst>
+          </p:cNvPr>
+          <p:cNvSpPr>
+            <a:spLocks noGrp="1"/>
+          </p:cNvSpPr>
+          <p:nvPr>
+            <p:ph type="title"/>
+          </p:nvPr>
+        </p:nvSpPr>
+        <p:spPr/>
+        <p:txBody>
+          <a:bodyPr/>
+          <a:lstStyle/>
+          <a:p>
+            <a:r>
+              <a:rPr lang="es-ES" dirty="0"/>
+              <a:t>Observables vs </a:t>
+            </a:r>
+            <a:r>
+              <a:rPr lang="es-ES" dirty="0" err="1"/>
+              <a:t>Promises</a:t>
+            </a:r>
+            <a:endParaRPr lang="es-ES" dirty="0"/>
+          </a:p>
+        </p:txBody>
+      </p:sp>
+      <p:sp>
+        <p:nvSpPr>
+          <p:cNvPr id="3" name="Marcador de contenido 2">
+            <a:extLst>
+              <a:ext uri="{FF2B5EF4-FFF2-40B4-BE49-F238E27FC236}">
+                <a16:creationId xmlns:a16="http://schemas.microsoft.com/office/drawing/2014/main" id="{55685444-7CE1-471F-ABF1-B7EE1B8B1A71}"/>
+              </a:ext>
+            </a:extLst>
+          </p:cNvPr>
+          <p:cNvSpPr>
+            <a:spLocks noGrp="1"/>
+          </p:cNvSpPr>
+          <p:nvPr>
+            <p:ph idx="1"/>
+          </p:nvPr>
+        </p:nvSpPr>
+        <p:spPr/>
+        <p:txBody>
+          <a:bodyPr/>
+          <a:lstStyle/>
+          <a:p>
+            <a:r>
+              <a:rPr lang="es-ES" dirty="0"/>
+              <a:t>Observables: Permite manejar y reaccionar ante un flujo de datos. Sin importar si se maneja 0, 1 o varios eventos.</a:t>
+            </a:r>
+          </a:p>
+          <a:p>
+            <a:r>
+              <a:rPr lang="es-ES" dirty="0" err="1"/>
+              <a:t>Promises</a:t>
+            </a:r>
+            <a:r>
+              <a:rPr lang="es-ES" dirty="0"/>
+              <a:t>: Solo se puede manejar un único evento.</a:t>
+            </a:r>
+          </a:p>
+          <a:p>
+            <a:pPr marL="0" indent="0">
+              <a:buNone/>
+            </a:pPr>
+            <a:endParaRPr lang="es-ES" dirty="0"/>
+          </a:p>
+        </p:txBody>
+      </p:sp>
+      <p:pic>
+        <p:nvPicPr>
+          <p:cNvPr id="5" name="Imagen 4">
+            <a:extLst>
+              <a:ext uri="{FF2B5EF4-FFF2-40B4-BE49-F238E27FC236}">
+                <a16:creationId xmlns:a16="http://schemas.microsoft.com/office/drawing/2014/main" id="{69499796-A712-4431-B483-153EB30EA8AA}"/>
+              </a:ext>
+            </a:extLst>
+          </p:cNvPr>
+          <p:cNvPicPr>
+            <a:picLocks noChangeAspect="1"/>
+          </p:cNvPicPr>
+          <p:nvPr/>
+        </p:nvPicPr>
+        <p:blipFill>
+          <a:blip r:embed="rId2"/>
+          <a:stretch>
+            <a:fillRect/>
+          </a:stretch>
+        </p:blipFill>
+        <p:spPr>
+          <a:xfrm>
+            <a:off x="6454452" y="3573016"/>
+            <a:ext cx="4625021" cy="2376264"/>
+          </a:xfrm>
+          <a:prstGeom prst="rect">
+            <a:avLst/>
+          </a:prstGeom>
+        </p:spPr>
+      </p:pic>
+      <p:pic>
+        <p:nvPicPr>
+          <p:cNvPr id="6" name="Imagen 5">
+            <a:extLst>
+              <a:ext uri="{FF2B5EF4-FFF2-40B4-BE49-F238E27FC236}">
+                <a16:creationId xmlns:a16="http://schemas.microsoft.com/office/drawing/2014/main" id="{6CDA167A-8C2A-43E4-917C-F089F7E8B758}"/>
+              </a:ext>
+            </a:extLst>
+          </p:cNvPr>
+          <p:cNvPicPr>
+            <a:picLocks noChangeAspect="1"/>
+          </p:cNvPicPr>
+          <p:nvPr/>
+        </p:nvPicPr>
+        <p:blipFill>
+          <a:blip r:embed="rId3"/>
+          <a:stretch>
+            <a:fillRect/>
+          </a:stretch>
+        </p:blipFill>
+        <p:spPr>
+          <a:xfrm>
+            <a:off x="1487316" y="3573016"/>
+            <a:ext cx="4467225" cy="2381250"/>
+          </a:xfrm>
+          <a:prstGeom prst="rect">
+            <a:avLst/>
+          </a:prstGeom>
+        </p:spPr>
+      </p:pic>
+    </p:spTree>
+    <p:extLst>
+      <p:ext uri="{BB962C8B-B14F-4D97-AF65-F5344CB8AC3E}">
+        <p14:creationId xmlns:p14="http://schemas.microsoft.com/office/powerpoint/2010/main" val="3687435352"/>
+      </p:ext>
+    </p:extLst>
+  </p:cSld>
+  <p:clrMapOvr>
+    <a:masterClrMapping/>
+  </p:clrMapOvr>
+  <mc:AlternateContent xmlns:mc="http://schemas.openxmlformats.org/markup-compatibility/2006" xmlns:p14="http://schemas.microsoft.com/office/powerpoint/2010/main">
+    <mc:Choice Requires="p14">
+      <p:transition spd="med" p14:dur="700">
+        <p:fade/>
+      </p:transition>
+    </mc:Choice>
+    <mc:Fallback xmlns="">
+      <p:transition spd="med">
+        <p:fade/>
+      </p:transition>
+    </mc:Fallback>
+  </mc:AlternateContent>
+</p:sld>
+</file>
+
 <file path=ppt/slides/slide5.xml><?xml version="1.0" encoding="utf-8"?>
 <p:sld xmlns:a="http://schemas.openxmlformats.org/drawingml/2006/main" xmlns:r="http://schemas.openxmlformats.org/officeDocument/2006/relationships" xmlns:p="http://schemas.openxmlformats.org/presentationml/2006/main">
   <p:cSld>
@@ -16495,6 +16861,151 @@
 </file>
 
 <file path=customXml/item1.xml><?xml version="1.0" encoding="utf-8"?>
+<p:properties xmlns:p="http://schemas.microsoft.com/office/2006/metadata/properties" xmlns:xsi="http://www.w3.org/2001/XMLSchema-instance" xmlns:pc="http://schemas.microsoft.com/office/infopath/2007/PartnerControls">
+  <documentManagement>
+    <LocPublishedLinkedAssetsLookup xmlns="4873beb7-5857-4685-be1f-d57550cc96cc" xsi:nil="true"/>
+    <ApprovalStatus xmlns="4873beb7-5857-4685-be1f-d57550cc96cc">InProgress</ApprovalStatus>
+    <MarketSpecific xmlns="4873beb7-5857-4685-be1f-d57550cc96cc">false</MarketSpecific>
+    <LocComments xmlns="4873beb7-5857-4685-be1f-d57550cc96cc" xsi:nil="true"/>
+    <LocLastLocAttemptVersionTypeLookup xmlns="4873beb7-5857-4685-be1f-d57550cc96cc" xsi:nil="true"/>
+    <DirectSourceMarket xmlns="4873beb7-5857-4685-be1f-d57550cc96cc" xsi:nil="true"/>
+    <ThumbnailAssetId xmlns="4873beb7-5857-4685-be1f-d57550cc96cc" xsi:nil="true"/>
+    <PrimaryImageGen xmlns="4873beb7-5857-4685-be1f-d57550cc96cc">false</PrimaryImageGen>
+    <LocNewPublishedVersionLookup xmlns="4873beb7-5857-4685-be1f-d57550cc96cc" xsi:nil="true"/>
+    <LegacyData xmlns="4873beb7-5857-4685-be1f-d57550cc96cc" xsi:nil="true"/>
+    <LocRecommendedHandoff xmlns="4873beb7-5857-4685-be1f-d57550cc96cc" xsi:nil="true"/>
+    <BusinessGroup xmlns="4873beb7-5857-4685-be1f-d57550cc96cc" xsi:nil="true"/>
+    <BlockPublish xmlns="4873beb7-5857-4685-be1f-d57550cc96cc">false</BlockPublish>
+    <TPFriendlyName xmlns="4873beb7-5857-4685-be1f-d57550cc96cc" xsi:nil="true"/>
+    <LocOverallPublishStatusLookup xmlns="4873beb7-5857-4685-be1f-d57550cc96cc" xsi:nil="true"/>
+    <NumericId xmlns="4873beb7-5857-4685-be1f-d57550cc96cc" xsi:nil="true"/>
+    <APEditor xmlns="4873beb7-5857-4685-be1f-d57550cc96cc">
+      <UserInfo>
+        <DisplayName/>
+        <AccountId xsi:nil="true"/>
+        <AccountType/>
+      </UserInfo>
+    </APEditor>
+    <SourceTitle xmlns="4873beb7-5857-4685-be1f-d57550cc96cc" xsi:nil="true"/>
+    <OpenTemplate xmlns="4873beb7-5857-4685-be1f-d57550cc96cc">true</OpenTemplate>
+    <LocOverallLocStatusLookup xmlns="4873beb7-5857-4685-be1f-d57550cc96cc" xsi:nil="true"/>
+    <UALocComments xmlns="4873beb7-5857-4685-be1f-d57550cc96cc" xsi:nil="true"/>
+    <ParentAssetId xmlns="4873beb7-5857-4685-be1f-d57550cc96cc" xsi:nil="true"/>
+    <IntlLangReviewDate xmlns="4873beb7-5857-4685-be1f-d57550cc96cc" xsi:nil="true"/>
+    <FeatureTagsTaxHTField0 xmlns="4873beb7-5857-4685-be1f-d57550cc96cc">
+      <Terms xmlns="http://schemas.microsoft.com/office/infopath/2007/PartnerControls"/>
+    </FeatureTagsTaxHTField0>
+    <PublishStatusLookup xmlns="4873beb7-5857-4685-be1f-d57550cc96cc">
+      <Value>1345093</Value>
+    </PublishStatusLookup>
+    <Providers xmlns="4873beb7-5857-4685-be1f-d57550cc96cc" xsi:nil="true"/>
+    <MachineTranslated xmlns="4873beb7-5857-4685-be1f-d57550cc96cc">false</MachineTranslated>
+    <OriginalSourceMarket xmlns="4873beb7-5857-4685-be1f-d57550cc96cc" xsi:nil="true"/>
+    <APDescription xmlns="4873beb7-5857-4685-be1f-d57550cc96cc">This simple template design works for technology and  businesses, but it's versatile enough to use in other contexts.  It features multiple slide layouts designed for widescreen (16x9 resolution) and includes a sample SmartArt list and chart that are easily editable.</APDescription>
+    <ClipArtFilename xmlns="4873beb7-5857-4685-be1f-d57550cc96cc" xsi:nil="true"/>
+    <ContentItem xmlns="4873beb7-5857-4685-be1f-d57550cc96cc" xsi:nil="true"/>
+    <TPInstallLocation xmlns="4873beb7-5857-4685-be1f-d57550cc96cc" xsi:nil="true"/>
+    <PublishTargets xmlns="4873beb7-5857-4685-be1f-d57550cc96cc">OfficeOnlineVNext</PublishTargets>
+    <TimesCloned xmlns="4873beb7-5857-4685-be1f-d57550cc96cc" xsi:nil="true"/>
+    <AssetStart xmlns="4873beb7-5857-4685-be1f-d57550cc96cc">2011-11-26T00:30:00+00:00</AssetStart>
+    <Provider xmlns="4873beb7-5857-4685-be1f-d57550cc96cc" xsi:nil="true"/>
+    <AcquiredFrom xmlns="4873beb7-5857-4685-be1f-d57550cc96cc">Internal MS</AcquiredFrom>
+    <FriendlyTitle xmlns="4873beb7-5857-4685-be1f-d57550cc96cc" xsi:nil="true"/>
+    <LastHandOff xmlns="4873beb7-5857-4685-be1f-d57550cc96cc" xsi:nil="true"/>
+    <TPClientViewer xmlns="4873beb7-5857-4685-be1f-d57550cc96cc" xsi:nil="true"/>
+    <TemplateStatus xmlns="4873beb7-5857-4685-be1f-d57550cc96cc">Complete</TemplateStatus>
+    <Downloads xmlns="4873beb7-5857-4685-be1f-d57550cc96cc">0</Downloads>
+    <OOCacheId xmlns="4873beb7-5857-4685-be1f-d57550cc96cc" xsi:nil="true"/>
+    <IsDeleted xmlns="4873beb7-5857-4685-be1f-d57550cc96cc">false</IsDeleted>
+    <LocPublishedDependentAssetsLookup xmlns="4873beb7-5857-4685-be1f-d57550cc96cc" xsi:nil="true"/>
+    <TPExecutable xmlns="4873beb7-5857-4685-be1f-d57550cc96cc" xsi:nil="true"/>
+    <EditorialTags xmlns="4873beb7-5857-4685-be1f-d57550cc96cc" xsi:nil="true"/>
+    <SubmitterId xmlns="4873beb7-5857-4685-be1f-d57550cc96cc" xsi:nil="true"/>
+    <ApprovalLog xmlns="4873beb7-5857-4685-be1f-d57550cc96cc" xsi:nil="true"/>
+    <AssetType xmlns="4873beb7-5857-4685-be1f-d57550cc96cc">TP</AssetType>
+    <BugNumber xmlns="4873beb7-5857-4685-be1f-d57550cc96cc" xsi:nil="true"/>
+    <CSXSubmissionDate xmlns="4873beb7-5857-4685-be1f-d57550cc96cc" xsi:nil="true"/>
+    <CSXUpdate xmlns="4873beb7-5857-4685-be1f-d57550cc96cc">false</CSXUpdate>
+    <Milestone xmlns="4873beb7-5857-4685-be1f-d57550cc96cc" xsi:nil="true"/>
+    <RecommendationsModifier xmlns="4873beb7-5857-4685-be1f-d57550cc96cc" xsi:nil="true"/>
+    <OriginAsset xmlns="4873beb7-5857-4685-be1f-d57550cc96cc" xsi:nil="true"/>
+    <TPComponent xmlns="4873beb7-5857-4685-be1f-d57550cc96cc" xsi:nil="true"/>
+    <AssetId xmlns="4873beb7-5857-4685-be1f-d57550cc96cc">TP102787989</AssetId>
+    <IntlLocPriority xmlns="4873beb7-5857-4685-be1f-d57550cc96cc" xsi:nil="true"/>
+    <PolicheckWords xmlns="4873beb7-5857-4685-be1f-d57550cc96cc" xsi:nil="true"/>
+    <TPLaunchHelpLink xmlns="4873beb7-5857-4685-be1f-d57550cc96cc" xsi:nil="true"/>
+    <TPApplication xmlns="4873beb7-5857-4685-be1f-d57550cc96cc" xsi:nil="true"/>
+    <CrawlForDependencies xmlns="4873beb7-5857-4685-be1f-d57550cc96cc">false</CrawlForDependencies>
+    <HandoffToMSDN xmlns="4873beb7-5857-4685-be1f-d57550cc96cc" xsi:nil="true"/>
+    <PlannedPubDate xmlns="4873beb7-5857-4685-be1f-d57550cc96cc" xsi:nil="true"/>
+    <IntlLangReviewer xmlns="4873beb7-5857-4685-be1f-d57550cc96cc" xsi:nil="true"/>
+    <TrustLevel xmlns="4873beb7-5857-4685-be1f-d57550cc96cc">1 Microsoft Managed Content</TrustLevel>
+    <LocLastLocAttemptVersionLookup xmlns="4873beb7-5857-4685-be1f-d57550cc96cc">694266</LocLastLocAttemptVersionLookup>
+    <LocProcessedForHandoffsLookup xmlns="4873beb7-5857-4685-be1f-d57550cc96cc" xsi:nil="true"/>
+    <IsSearchable xmlns="4873beb7-5857-4685-be1f-d57550cc96cc">true</IsSearchable>
+    <TemplateTemplateType xmlns="4873beb7-5857-4685-be1f-d57550cc96cc">PowerPoint Presentation Template</TemplateTemplateType>
+    <CampaignTagsTaxHTField0 xmlns="4873beb7-5857-4685-be1f-d57550cc96cc">
+      <Terms xmlns="http://schemas.microsoft.com/office/infopath/2007/PartnerControls"/>
+    </CampaignTagsTaxHTField0>
+    <TPNamespace xmlns="4873beb7-5857-4685-be1f-d57550cc96cc" xsi:nil="true"/>
+    <LocOverallPreviewStatusLookup xmlns="4873beb7-5857-4685-be1f-d57550cc96cc" xsi:nil="true"/>
+    <TaxCatchAll xmlns="4873beb7-5857-4685-be1f-d57550cc96cc"/>
+    <Markets xmlns="4873beb7-5857-4685-be1f-d57550cc96cc"/>
+    <UAProjectedTotalWords xmlns="4873beb7-5857-4685-be1f-d57550cc96cc" xsi:nil="true"/>
+    <IntlLangReview xmlns="4873beb7-5857-4685-be1f-d57550cc96cc" xsi:nil="true"/>
+    <OutputCachingOn xmlns="4873beb7-5857-4685-be1f-d57550cc96cc">false</OutputCachingOn>
+    <AverageRating xmlns="4873beb7-5857-4685-be1f-d57550cc96cc" xsi:nil="true"/>
+    <APAuthor xmlns="4873beb7-5857-4685-be1f-d57550cc96cc">
+      <UserInfo>
+        <DisplayName>REDMOND\kristaa</DisplayName>
+        <AccountId>136</AccountId>
+        <AccountType/>
+      </UserInfo>
+    </APAuthor>
+    <LocManualTestRequired xmlns="4873beb7-5857-4685-be1f-d57550cc96cc">false</LocManualTestRequired>
+    <TPCommandLine xmlns="4873beb7-5857-4685-be1f-d57550cc96cc" xsi:nil="true"/>
+    <TPAppVersion xmlns="4873beb7-5857-4685-be1f-d57550cc96cc" xsi:nil="true"/>
+    <EditorialStatus xmlns="4873beb7-5857-4685-be1f-d57550cc96cc">Complete</EditorialStatus>
+    <LastModifiedDateTime xmlns="4873beb7-5857-4685-be1f-d57550cc96cc" xsi:nil="true"/>
+    <ScenarioTagsTaxHTField0 xmlns="4873beb7-5857-4685-be1f-d57550cc96cc">
+      <Terms xmlns="http://schemas.microsoft.com/office/infopath/2007/PartnerControls"/>
+    </ScenarioTagsTaxHTField0>
+    <LocProcessedForMarketsLookup xmlns="4873beb7-5857-4685-be1f-d57550cc96cc" xsi:nil="true"/>
+    <TPLaunchHelpLinkType xmlns="4873beb7-5857-4685-be1f-d57550cc96cc">Template</TPLaunchHelpLinkType>
+    <OriginalRelease xmlns="4873beb7-5857-4685-be1f-d57550cc96cc">15</OriginalRelease>
+    <LocalizationTagsTaxHTField0 xmlns="4873beb7-5857-4685-be1f-d57550cc96cc">
+      <Terms xmlns="http://schemas.microsoft.com/office/infopath/2007/PartnerControls"/>
+    </LocalizationTagsTaxHTField0>
+    <UACurrentWords xmlns="4873beb7-5857-4685-be1f-d57550cc96cc" xsi:nil="true"/>
+    <ArtSampleDocs xmlns="4873beb7-5857-4685-be1f-d57550cc96cc" xsi:nil="true"/>
+    <UALocRecommendation xmlns="4873beb7-5857-4685-be1f-d57550cc96cc">Localize</UALocRecommendation>
+    <Manager xmlns="4873beb7-5857-4685-be1f-d57550cc96cc" xsi:nil="true"/>
+    <LocOverallHandbackStatusLookup xmlns="4873beb7-5857-4685-be1f-d57550cc96cc" xsi:nil="true"/>
+    <ShowIn xmlns="4873beb7-5857-4685-be1f-d57550cc96cc">Show everywhere</ShowIn>
+    <UANotes xmlns="4873beb7-5857-4685-be1f-d57550cc96cc" xsi:nil="true"/>
+    <InternalTagsTaxHTField0 xmlns="4873beb7-5857-4685-be1f-d57550cc96cc">
+      <Terms xmlns="http://schemas.microsoft.com/office/infopath/2007/PartnerControls"/>
+    </InternalTagsTaxHTField0>
+    <CSXHash xmlns="4873beb7-5857-4685-be1f-d57550cc96cc" xsi:nil="true"/>
+    <VoteCount xmlns="4873beb7-5857-4685-be1f-d57550cc96cc" xsi:nil="true"/>
+    <AssetExpire xmlns="4873beb7-5857-4685-be1f-d57550cc96cc">2029-05-12T07:00:00+00:00</AssetExpire>
+    <DSATActionTaken xmlns="4873beb7-5857-4685-be1f-d57550cc96cc" xsi:nil="true"/>
+    <CSXSubmissionMarket xmlns="4873beb7-5857-4685-be1f-d57550cc96cc" xsi:nil="true"/>
+    <LocMarketGroupTiers2 xmlns="4873beb7-5857-4685-be1f-d57550cc96cc" xsi:nil="true"/>
+  </documentManagement>
+</p:properties>
+</file>
+
+<file path=customXml/item2.xml><?xml version="1.0" encoding="utf-8"?>
+<?mso-contentType ?>
+<FormTemplates xmlns="http://schemas.microsoft.com/sharepoint/v3/contenttype/forms">
+  <Display>DocumentLibraryForm</Display>
+  <Edit>AssetEditForm</Edit>
+  <New>DocumentLibraryForm</New>
+</FormTemplates>
+</file>
+
+<file path=customXml/item3.xml><?xml version="1.0" encoding="utf-8"?>
 <ct:contentTypeSchema xmlns:ct="http://schemas.microsoft.com/office/2006/metadata/contentType" xmlns:ma="http://schemas.microsoft.com/office/2006/metadata/properties/metaAttributes" ct:_="" ma:_="" ma:contentTypeName="TemplateFile" ma:contentTypeID="0x0101006EDDDB5EE6D98C44930B742096920B300400F5B6D36B3EF94B4E9A635CDF2A18F5B8" ma:contentTypeVersion="72" ma:contentTypeDescription="Create a new document." ma:contentTypeScope="" ma:versionID="a23e56308344d904b51738559c3d67c9">
   <xsd:schema xmlns:xsd="http://www.w3.org/2001/XMLSchema" xmlns:xs="http://www.w3.org/2001/XMLSchema" xmlns:p="http://schemas.microsoft.com/office/2006/metadata/properties" xmlns:ns2="4873beb7-5857-4685-be1f-d57550cc96cc" targetNamespace="http://schemas.microsoft.com/office/2006/metadata/properties" ma:root="true" ma:fieldsID="cd0908cc4600e77bf5da051303e00c8d" ns2:_="">
     <xsd:import namespace="4873beb7-5857-4685-be1f-d57550cc96cc"/>
@@ -17534,152 +18045,31 @@
 </ct:contentTypeSchema>
 </file>
 
-<file path=customXml/item2.xml><?xml version="1.0" encoding="utf-8"?>
-<p:properties xmlns:p="http://schemas.microsoft.com/office/2006/metadata/properties" xmlns:xsi="http://www.w3.org/2001/XMLSchema-instance" xmlns:pc="http://schemas.microsoft.com/office/infopath/2007/PartnerControls">
-  <documentManagement>
-    <LocPublishedLinkedAssetsLookup xmlns="4873beb7-5857-4685-be1f-d57550cc96cc" xsi:nil="true"/>
-    <ApprovalStatus xmlns="4873beb7-5857-4685-be1f-d57550cc96cc">InProgress</ApprovalStatus>
-    <MarketSpecific xmlns="4873beb7-5857-4685-be1f-d57550cc96cc">false</MarketSpecific>
-    <LocComments xmlns="4873beb7-5857-4685-be1f-d57550cc96cc" xsi:nil="true"/>
-    <LocLastLocAttemptVersionTypeLookup xmlns="4873beb7-5857-4685-be1f-d57550cc96cc" xsi:nil="true"/>
-    <DirectSourceMarket xmlns="4873beb7-5857-4685-be1f-d57550cc96cc" xsi:nil="true"/>
-    <ThumbnailAssetId xmlns="4873beb7-5857-4685-be1f-d57550cc96cc" xsi:nil="true"/>
-    <PrimaryImageGen xmlns="4873beb7-5857-4685-be1f-d57550cc96cc">false</PrimaryImageGen>
-    <LocNewPublishedVersionLookup xmlns="4873beb7-5857-4685-be1f-d57550cc96cc" xsi:nil="true"/>
-    <LegacyData xmlns="4873beb7-5857-4685-be1f-d57550cc96cc" xsi:nil="true"/>
-    <LocRecommendedHandoff xmlns="4873beb7-5857-4685-be1f-d57550cc96cc" xsi:nil="true"/>
-    <BusinessGroup xmlns="4873beb7-5857-4685-be1f-d57550cc96cc" xsi:nil="true"/>
-    <BlockPublish xmlns="4873beb7-5857-4685-be1f-d57550cc96cc">false</BlockPublish>
-    <TPFriendlyName xmlns="4873beb7-5857-4685-be1f-d57550cc96cc" xsi:nil="true"/>
-    <LocOverallPublishStatusLookup xmlns="4873beb7-5857-4685-be1f-d57550cc96cc" xsi:nil="true"/>
-    <NumericId xmlns="4873beb7-5857-4685-be1f-d57550cc96cc" xsi:nil="true"/>
-    <APEditor xmlns="4873beb7-5857-4685-be1f-d57550cc96cc">
-      <UserInfo>
-        <DisplayName/>
-        <AccountId xsi:nil="true"/>
-        <AccountType/>
-      </UserInfo>
-    </APEditor>
-    <SourceTitle xmlns="4873beb7-5857-4685-be1f-d57550cc96cc" xsi:nil="true"/>
-    <OpenTemplate xmlns="4873beb7-5857-4685-be1f-d57550cc96cc">true</OpenTemplate>
-    <LocOverallLocStatusLookup xmlns="4873beb7-5857-4685-be1f-d57550cc96cc" xsi:nil="true"/>
-    <UALocComments xmlns="4873beb7-5857-4685-be1f-d57550cc96cc" xsi:nil="true"/>
-    <ParentAssetId xmlns="4873beb7-5857-4685-be1f-d57550cc96cc" xsi:nil="true"/>
-    <IntlLangReviewDate xmlns="4873beb7-5857-4685-be1f-d57550cc96cc" xsi:nil="true"/>
-    <FeatureTagsTaxHTField0 xmlns="4873beb7-5857-4685-be1f-d57550cc96cc">
-      <Terms xmlns="http://schemas.microsoft.com/office/infopath/2007/PartnerControls"/>
-    </FeatureTagsTaxHTField0>
-    <PublishStatusLookup xmlns="4873beb7-5857-4685-be1f-d57550cc96cc">
-      <Value>1345093</Value>
-    </PublishStatusLookup>
-    <Providers xmlns="4873beb7-5857-4685-be1f-d57550cc96cc" xsi:nil="true"/>
-    <MachineTranslated xmlns="4873beb7-5857-4685-be1f-d57550cc96cc">false</MachineTranslated>
-    <OriginalSourceMarket xmlns="4873beb7-5857-4685-be1f-d57550cc96cc" xsi:nil="true"/>
-    <APDescription xmlns="4873beb7-5857-4685-be1f-d57550cc96cc">This simple template design works for technology and  businesses, but it's versatile enough to use in other contexts.  It features multiple slide layouts designed for widescreen (16x9 resolution) and includes a sample SmartArt list and chart that are easily editable.</APDescription>
-    <ClipArtFilename xmlns="4873beb7-5857-4685-be1f-d57550cc96cc" xsi:nil="true"/>
-    <ContentItem xmlns="4873beb7-5857-4685-be1f-d57550cc96cc" xsi:nil="true"/>
-    <TPInstallLocation xmlns="4873beb7-5857-4685-be1f-d57550cc96cc" xsi:nil="true"/>
-    <PublishTargets xmlns="4873beb7-5857-4685-be1f-d57550cc96cc">OfficeOnlineVNext</PublishTargets>
-    <TimesCloned xmlns="4873beb7-5857-4685-be1f-d57550cc96cc" xsi:nil="true"/>
-    <AssetStart xmlns="4873beb7-5857-4685-be1f-d57550cc96cc">2011-11-26T00:30:00+00:00</AssetStart>
-    <Provider xmlns="4873beb7-5857-4685-be1f-d57550cc96cc" xsi:nil="true"/>
-    <AcquiredFrom xmlns="4873beb7-5857-4685-be1f-d57550cc96cc">Internal MS</AcquiredFrom>
-    <FriendlyTitle xmlns="4873beb7-5857-4685-be1f-d57550cc96cc" xsi:nil="true"/>
-    <LastHandOff xmlns="4873beb7-5857-4685-be1f-d57550cc96cc" xsi:nil="true"/>
-    <TPClientViewer xmlns="4873beb7-5857-4685-be1f-d57550cc96cc" xsi:nil="true"/>
-    <TemplateStatus xmlns="4873beb7-5857-4685-be1f-d57550cc96cc">Complete</TemplateStatus>
-    <Downloads xmlns="4873beb7-5857-4685-be1f-d57550cc96cc">0</Downloads>
-    <OOCacheId xmlns="4873beb7-5857-4685-be1f-d57550cc96cc" xsi:nil="true"/>
-    <IsDeleted xmlns="4873beb7-5857-4685-be1f-d57550cc96cc">false</IsDeleted>
-    <LocPublishedDependentAssetsLookup xmlns="4873beb7-5857-4685-be1f-d57550cc96cc" xsi:nil="true"/>
-    <TPExecutable xmlns="4873beb7-5857-4685-be1f-d57550cc96cc" xsi:nil="true"/>
-    <EditorialTags xmlns="4873beb7-5857-4685-be1f-d57550cc96cc" xsi:nil="true"/>
-    <SubmitterId xmlns="4873beb7-5857-4685-be1f-d57550cc96cc" xsi:nil="true"/>
-    <ApprovalLog xmlns="4873beb7-5857-4685-be1f-d57550cc96cc" xsi:nil="true"/>
-    <AssetType xmlns="4873beb7-5857-4685-be1f-d57550cc96cc">TP</AssetType>
-    <BugNumber xmlns="4873beb7-5857-4685-be1f-d57550cc96cc" xsi:nil="true"/>
-    <CSXSubmissionDate xmlns="4873beb7-5857-4685-be1f-d57550cc96cc" xsi:nil="true"/>
-    <CSXUpdate xmlns="4873beb7-5857-4685-be1f-d57550cc96cc">false</CSXUpdate>
-    <Milestone xmlns="4873beb7-5857-4685-be1f-d57550cc96cc" xsi:nil="true"/>
-    <RecommendationsModifier xmlns="4873beb7-5857-4685-be1f-d57550cc96cc" xsi:nil="true"/>
-    <OriginAsset xmlns="4873beb7-5857-4685-be1f-d57550cc96cc" xsi:nil="true"/>
-    <TPComponent xmlns="4873beb7-5857-4685-be1f-d57550cc96cc" xsi:nil="true"/>
-    <AssetId xmlns="4873beb7-5857-4685-be1f-d57550cc96cc">TP102787989</AssetId>
-    <IntlLocPriority xmlns="4873beb7-5857-4685-be1f-d57550cc96cc" xsi:nil="true"/>
-    <PolicheckWords xmlns="4873beb7-5857-4685-be1f-d57550cc96cc" xsi:nil="true"/>
-    <TPLaunchHelpLink xmlns="4873beb7-5857-4685-be1f-d57550cc96cc" xsi:nil="true"/>
-    <TPApplication xmlns="4873beb7-5857-4685-be1f-d57550cc96cc" xsi:nil="true"/>
-    <CrawlForDependencies xmlns="4873beb7-5857-4685-be1f-d57550cc96cc">false</CrawlForDependencies>
-    <HandoffToMSDN xmlns="4873beb7-5857-4685-be1f-d57550cc96cc" xsi:nil="true"/>
-    <PlannedPubDate xmlns="4873beb7-5857-4685-be1f-d57550cc96cc" xsi:nil="true"/>
-    <IntlLangReviewer xmlns="4873beb7-5857-4685-be1f-d57550cc96cc" xsi:nil="true"/>
-    <TrustLevel xmlns="4873beb7-5857-4685-be1f-d57550cc96cc">1 Microsoft Managed Content</TrustLevel>
-    <LocLastLocAttemptVersionLookup xmlns="4873beb7-5857-4685-be1f-d57550cc96cc">694266</LocLastLocAttemptVersionLookup>
-    <LocProcessedForHandoffsLookup xmlns="4873beb7-5857-4685-be1f-d57550cc96cc" xsi:nil="true"/>
-    <IsSearchable xmlns="4873beb7-5857-4685-be1f-d57550cc96cc">true</IsSearchable>
-    <TemplateTemplateType xmlns="4873beb7-5857-4685-be1f-d57550cc96cc">PowerPoint Presentation Template</TemplateTemplateType>
-    <CampaignTagsTaxHTField0 xmlns="4873beb7-5857-4685-be1f-d57550cc96cc">
-      <Terms xmlns="http://schemas.microsoft.com/office/infopath/2007/PartnerControls"/>
-    </CampaignTagsTaxHTField0>
-    <TPNamespace xmlns="4873beb7-5857-4685-be1f-d57550cc96cc" xsi:nil="true"/>
-    <LocOverallPreviewStatusLookup xmlns="4873beb7-5857-4685-be1f-d57550cc96cc" xsi:nil="true"/>
-    <TaxCatchAll xmlns="4873beb7-5857-4685-be1f-d57550cc96cc"/>
-    <Markets xmlns="4873beb7-5857-4685-be1f-d57550cc96cc"/>
-    <UAProjectedTotalWords xmlns="4873beb7-5857-4685-be1f-d57550cc96cc" xsi:nil="true"/>
-    <IntlLangReview xmlns="4873beb7-5857-4685-be1f-d57550cc96cc" xsi:nil="true"/>
-    <OutputCachingOn xmlns="4873beb7-5857-4685-be1f-d57550cc96cc">false</OutputCachingOn>
-    <AverageRating xmlns="4873beb7-5857-4685-be1f-d57550cc96cc" xsi:nil="true"/>
-    <APAuthor xmlns="4873beb7-5857-4685-be1f-d57550cc96cc">
-      <UserInfo>
-        <DisplayName>REDMOND\kristaa</DisplayName>
-        <AccountId>136</AccountId>
-        <AccountType/>
-      </UserInfo>
-    </APAuthor>
-    <LocManualTestRequired xmlns="4873beb7-5857-4685-be1f-d57550cc96cc">false</LocManualTestRequired>
-    <TPCommandLine xmlns="4873beb7-5857-4685-be1f-d57550cc96cc" xsi:nil="true"/>
-    <TPAppVersion xmlns="4873beb7-5857-4685-be1f-d57550cc96cc" xsi:nil="true"/>
-    <EditorialStatus xmlns="4873beb7-5857-4685-be1f-d57550cc96cc">Complete</EditorialStatus>
-    <LastModifiedDateTime xmlns="4873beb7-5857-4685-be1f-d57550cc96cc" xsi:nil="true"/>
-    <ScenarioTagsTaxHTField0 xmlns="4873beb7-5857-4685-be1f-d57550cc96cc">
-      <Terms xmlns="http://schemas.microsoft.com/office/infopath/2007/PartnerControls"/>
-    </ScenarioTagsTaxHTField0>
-    <LocProcessedForMarketsLookup xmlns="4873beb7-5857-4685-be1f-d57550cc96cc" xsi:nil="true"/>
-    <TPLaunchHelpLinkType xmlns="4873beb7-5857-4685-be1f-d57550cc96cc">Template</TPLaunchHelpLinkType>
-    <OriginalRelease xmlns="4873beb7-5857-4685-be1f-d57550cc96cc">15</OriginalRelease>
-    <LocalizationTagsTaxHTField0 xmlns="4873beb7-5857-4685-be1f-d57550cc96cc">
-      <Terms xmlns="http://schemas.microsoft.com/office/infopath/2007/PartnerControls"/>
-    </LocalizationTagsTaxHTField0>
-    <UACurrentWords xmlns="4873beb7-5857-4685-be1f-d57550cc96cc" xsi:nil="true"/>
-    <ArtSampleDocs xmlns="4873beb7-5857-4685-be1f-d57550cc96cc" xsi:nil="true"/>
-    <UALocRecommendation xmlns="4873beb7-5857-4685-be1f-d57550cc96cc">Localize</UALocRecommendation>
-    <Manager xmlns="4873beb7-5857-4685-be1f-d57550cc96cc" xsi:nil="true"/>
-    <LocOverallHandbackStatusLookup xmlns="4873beb7-5857-4685-be1f-d57550cc96cc" xsi:nil="true"/>
-    <ShowIn xmlns="4873beb7-5857-4685-be1f-d57550cc96cc">Show everywhere</ShowIn>
-    <UANotes xmlns="4873beb7-5857-4685-be1f-d57550cc96cc" xsi:nil="true"/>
-    <InternalTagsTaxHTField0 xmlns="4873beb7-5857-4685-be1f-d57550cc96cc">
-      <Terms xmlns="http://schemas.microsoft.com/office/infopath/2007/PartnerControls"/>
-    </InternalTagsTaxHTField0>
-    <CSXHash xmlns="4873beb7-5857-4685-be1f-d57550cc96cc" xsi:nil="true"/>
-    <VoteCount xmlns="4873beb7-5857-4685-be1f-d57550cc96cc" xsi:nil="true"/>
-    <AssetExpire xmlns="4873beb7-5857-4685-be1f-d57550cc96cc">2029-05-12T07:00:00+00:00</AssetExpire>
-    <DSATActionTaken xmlns="4873beb7-5857-4685-be1f-d57550cc96cc" xsi:nil="true"/>
-    <CSXSubmissionMarket xmlns="4873beb7-5857-4685-be1f-d57550cc96cc" xsi:nil="true"/>
-    <LocMarketGroupTiers2 xmlns="4873beb7-5857-4685-be1f-d57550cc96cc" xsi:nil="true"/>
-  </documentManagement>
-</p:properties>
+<file path=customXml/itemProps1.xml><?xml version="1.0" encoding="utf-8"?>
+<ds:datastoreItem xmlns:ds="http://schemas.openxmlformats.org/officeDocument/2006/customXml" ds:itemID="{60C67BEE-D13F-4BD2-98A5-34D8A0977F68}">
+  <ds:schemaRefs>
+    <ds:schemaRef ds:uri="http://schemas.openxmlformats.org/package/2006/metadata/core-properties"/>
+    <ds:schemaRef ds:uri="http://schemas.microsoft.com/office/2006/metadata/properties"/>
+    <ds:schemaRef ds:uri="http://schemas.microsoft.com/office/2006/documentManagement/types"/>
+    <ds:schemaRef ds:uri="http://purl.org/dc/dcmitype/"/>
+    <ds:schemaRef ds:uri="http://purl.org/dc/elements/1.1/"/>
+    <ds:schemaRef ds:uri="4873beb7-5857-4685-be1f-d57550cc96cc"/>
+    <ds:schemaRef ds:uri="http://purl.org/dc/terms/"/>
+    <ds:schemaRef ds:uri="http://www.w3.org/XML/1998/namespace"/>
+    <ds:schemaRef ds:uri="http://schemas.microsoft.com/office/infopath/2007/PartnerControls"/>
+  </ds:schemaRefs>
+</ds:datastoreItem>
 </file>
 
-<file path=customXml/item3.xml><?xml version="1.0" encoding="utf-8"?>
-<?mso-contentType ?>
-<FormTemplates xmlns="http://schemas.microsoft.com/sharepoint/v3/contenttype/forms">
-  <Display>DocumentLibraryForm</Display>
-  <Edit>AssetEditForm</Edit>
-  <New>DocumentLibraryForm</New>
-</FormTemplates>
+<file path=customXml/itemProps2.xml><?xml version="1.0" encoding="utf-8"?>
+<ds:datastoreItem xmlns:ds="http://schemas.openxmlformats.org/officeDocument/2006/customXml" ds:itemID="{3836F65B-1B07-41EE-A0E8-BC6EF3855225}">
+  <ds:schemaRefs>
+    <ds:schemaRef ds:uri="http://schemas.microsoft.com/sharepoint/v3/contenttype/forms"/>
+  </ds:schemaRefs>
+</ds:datastoreItem>
 </file>
 
-<file path=customXml/itemProps1.xml><?xml version="1.0" encoding="utf-8"?>
+<file path=customXml/itemProps3.xml><?xml version="1.0" encoding="utf-8"?>
 <ds:datastoreItem xmlns:ds="http://schemas.openxmlformats.org/officeDocument/2006/customXml" ds:itemID="{A09BF4D4-EF60-4196-BFC3-9462D607978C}">
   <ds:schemaRefs>
     <ds:schemaRef ds:uri="http://schemas.microsoft.com/office/2006/metadata/contentType"/>
@@ -17695,28 +18085,4 @@
     <ds:schemaRef ds:uri="http://schemas.microsoft.com/internal/obd"/>
   </ds:schemaRefs>
 </ds:datastoreItem>
-</file>
-
-<file path=customXml/itemProps2.xml><?xml version="1.0" encoding="utf-8"?>
-<ds:datastoreItem xmlns:ds="http://schemas.openxmlformats.org/officeDocument/2006/customXml" ds:itemID="{60C67BEE-D13F-4BD2-98A5-34D8A0977F68}">
-  <ds:schemaRefs>
-    <ds:schemaRef ds:uri="http://schemas.openxmlformats.org/package/2006/metadata/core-properties"/>
-    <ds:schemaRef ds:uri="http://schemas.microsoft.com/office/2006/metadata/properties"/>
-    <ds:schemaRef ds:uri="http://schemas.microsoft.com/office/2006/documentManagement/types"/>
-    <ds:schemaRef ds:uri="http://purl.org/dc/dcmitype/"/>
-    <ds:schemaRef ds:uri="http://purl.org/dc/elements/1.1/"/>
-    <ds:schemaRef ds:uri="4873beb7-5857-4685-be1f-d57550cc96cc"/>
-    <ds:schemaRef ds:uri="http://purl.org/dc/terms/"/>
-    <ds:schemaRef ds:uri="http://www.w3.org/XML/1998/namespace"/>
-    <ds:schemaRef ds:uri="http://schemas.microsoft.com/office/infopath/2007/PartnerControls"/>
-  </ds:schemaRefs>
-</ds:datastoreItem>
-</file>
-
-<file path=customXml/itemProps3.xml><?xml version="1.0" encoding="utf-8"?>
-<ds:datastoreItem xmlns:ds="http://schemas.openxmlformats.org/officeDocument/2006/customXml" ds:itemID="{3836F65B-1B07-41EE-A0E8-BC6EF3855225}">
-  <ds:schemaRefs>
-    <ds:schemaRef ds:uri="http://schemas.microsoft.com/sharepoint/v3/contenttype/forms"/>
-  </ds:schemaRefs>
-</ds:datastoreItem>
 </file>
</xml_diff>

<commit_message>
Dia 5- Servicios, modulos, navegacion, backend
</commit_message>
<xml_diff>
--- a/Angular.pptx
+++ b/Angular.pptx
@@ -5,10 +5,10 @@
     <p:sldMasterId id="2147483660" r:id="rId4"/>
   </p:sldMasterIdLst>
   <p:notesMasterIdLst>
-    <p:notesMasterId r:id="rId49"/>
+    <p:notesMasterId r:id="rId54"/>
   </p:notesMasterIdLst>
   <p:handoutMasterIdLst>
-    <p:handoutMasterId r:id="rId50"/>
+    <p:handoutMasterId r:id="rId55"/>
   </p:handoutMasterIdLst>
   <p:sldIdLst>
     <p:sldId id="257" r:id="rId5"/>
@@ -55,6 +55,11 @@
     <p:sldId id="317" r:id="rId46"/>
     <p:sldId id="318" r:id="rId47"/>
     <p:sldId id="319" r:id="rId48"/>
+    <p:sldId id="320" r:id="rId49"/>
+    <p:sldId id="321" r:id="rId50"/>
+    <p:sldId id="322" r:id="rId51"/>
+    <p:sldId id="323" r:id="rId52"/>
+    <p:sldId id="324" r:id="rId53"/>
   </p:sldIdLst>
   <p:sldSz cx="12188825" cy="6858000"/>
   <p:notesSz cx="6858000" cy="9144000"/>
@@ -3425,7 +3430,7 @@
             <a:pPr algn="r" rtl="0"/>
             <a:fld id="{C8F1D84B-F747-4821-8617-FBD61E8F4308}" type="datetime1">
               <a:rPr lang="es-ES" smtClean="0"/>
-              <a:t>20/12/2018</a:t>
+              <a:t>21/12/2018</a:t>
             </a:fld>
             <a:endParaRPr lang="es-ES" dirty="0"/>
           </a:p>
@@ -3595,7 +3600,7 @@
             <a:fld id="{DA87C823-BB9F-45DA-99AB-416A32E1B948}" type="datetime1">
               <a:rPr lang="es-ES" noProof="0" smtClean="0"/>
               <a:pPr/>
-              <a:t>20/12/2018</a:t>
+              <a:t>21/12/2018</a:t>
             </a:fld>
             <a:endParaRPr lang="es-ES" noProof="0" dirty="0"/>
           </a:p>
@@ -5223,7 +5228,7 @@
             <a:fld id="{A042E67D-14C0-4ED9-A218-9C14494A6A84}" type="datetime1">
               <a:rPr lang="es-ES" noProof="0" smtClean="0"/>
               <a:pPr/>
-              <a:t>20/12/2018</a:t>
+              <a:t>21/12/2018</a:t>
             </a:fld>
             <a:endParaRPr lang="es-ES" noProof="0" dirty="0"/>
           </a:p>
@@ -5433,7 +5438,7 @@
             <a:fld id="{40A1DB83-C382-4684-8887-65A03EA4FFF0}" type="datetime1">
               <a:rPr lang="es-ES" noProof="0" smtClean="0"/>
               <a:pPr/>
-              <a:t>20/12/2018</a:t>
+              <a:t>21/12/2018</a:t>
             </a:fld>
             <a:endParaRPr lang="es-ES" noProof="0" dirty="0"/>
           </a:p>
@@ -5649,7 +5654,7 @@
             <a:fld id="{C60E81D3-9B82-44CA-B1F9-FCEFDC87935B}" type="datetime1">
               <a:rPr lang="es-ES" noProof="0" smtClean="0"/>
               <a:pPr/>
-              <a:t>20/12/2018</a:t>
+              <a:t>21/12/2018</a:t>
             </a:fld>
             <a:endParaRPr lang="es-ES" noProof="0" dirty="0"/>
           </a:p>
@@ -5855,7 +5860,7 @@
             <a:fld id="{82E48AAE-5AE8-418A-A225-B506C222F2F9}" type="datetime1">
               <a:rPr lang="es-ES" noProof="0" smtClean="0"/>
               <a:pPr/>
-              <a:t>20/12/2018</a:t>
+              <a:t>21/12/2018</a:t>
             </a:fld>
             <a:endParaRPr lang="es-ES" noProof="0" dirty="0"/>
           </a:p>
@@ -6295,7 +6300,7 @@
             <a:fld id="{AA1D35CA-82F5-4AD4-B9EC-66E805B73542}" type="datetime1">
               <a:rPr lang="es-ES" noProof="0" smtClean="0"/>
               <a:pPr/>
-              <a:t>20/12/2018</a:t>
+              <a:t>21/12/2018</a:t>
             </a:fld>
             <a:endParaRPr lang="es-ES" noProof="0" dirty="0"/>
           </a:p>
@@ -6607,7 +6612,7 @@
             <a:fld id="{834CCE92-710B-4678-B1B1-EFCAA5CDF075}" type="datetime1">
               <a:rPr lang="es-ES" noProof="0" smtClean="0"/>
               <a:pPr/>
-              <a:t>20/12/2018</a:t>
+              <a:t>21/12/2018</a:t>
             </a:fld>
             <a:endParaRPr lang="es-ES" noProof="0" dirty="0"/>
           </a:p>
@@ -7071,7 +7076,7 @@
             <a:fld id="{83FB0F2C-25D9-4D7E-B43A-29A2E16C960D}" type="datetime1">
               <a:rPr lang="es-ES" noProof="0" smtClean="0"/>
               <a:pPr/>
-              <a:t>20/12/2018</a:t>
+              <a:t>21/12/2018</a:t>
             </a:fld>
             <a:endParaRPr lang="es-ES" noProof="0" dirty="0"/>
           </a:p>
@@ -7209,7 +7214,7 @@
             <a:fld id="{FD34687D-B11B-47A5-95F6-B79DA932A6DF}" type="datetime1">
               <a:rPr lang="es-ES" noProof="0" smtClean="0"/>
               <a:pPr/>
-              <a:t>20/12/2018</a:t>
+              <a:t>21/12/2018</a:t>
             </a:fld>
             <a:endParaRPr lang="es-ES" noProof="0" dirty="0"/>
           </a:p>
@@ -7323,7 +7328,7 @@
             <a:fld id="{93C656DE-1E46-4450-9484-A739B4FADFBC}" type="datetime1">
               <a:rPr lang="es-ES" noProof="0" smtClean="0"/>
               <a:pPr/>
-              <a:t>20/12/2018</a:t>
+              <a:t>21/12/2018</a:t>
             </a:fld>
             <a:endParaRPr lang="es-ES" noProof="0" dirty="0"/>
           </a:p>
@@ -7630,7 +7635,7 @@
             <a:fld id="{EEA77F8B-D469-4ECD-B91E-3B01AD692331}" type="datetime1">
               <a:rPr lang="es-ES" noProof="0" smtClean="0"/>
               <a:pPr/>
-              <a:t>20/12/2018</a:t>
+              <a:t>21/12/2018</a:t>
             </a:fld>
             <a:endParaRPr lang="es-ES" noProof="0" dirty="0"/>
           </a:p>
@@ -7927,7 +7932,7 @@
             <a:fld id="{49BA7B1C-709E-4257-93A5-EC2F0807D42F}" type="datetime1">
               <a:rPr lang="es-ES" noProof="0" smtClean="0"/>
               <a:pPr/>
-              <a:t>20/12/2018</a:t>
+              <a:t>21/12/2018</a:t>
             </a:fld>
             <a:endParaRPr lang="es-ES" noProof="0" dirty="0"/>
           </a:p>
@@ -8551,7 +8556,7 @@
             <a:fld id="{35C83AD5-F5AF-4BDC-901E-85A05CCFFAAA}" type="datetime1">
               <a:rPr lang="es-ES" noProof="0" smtClean="0"/>
               <a:pPr/>
-              <a:t>20/12/2018</a:t>
+              <a:t>21/12/2018</a:t>
             </a:fld>
             <a:endParaRPr lang="es-ES" noProof="0" dirty="0"/>
           </a:p>
@@ -14581,7 +14586,7 @@
         </p:spPr>
         <p:txBody>
           <a:bodyPr>
-            <a:normAutofit lnSpcReduction="10000"/>
+            <a:normAutofit fontScale="92500"/>
           </a:bodyPr>
           <a:lstStyle/>
           <a:p>
@@ -14608,6 +14613,21 @@
             <a:r>
               <a:rPr lang="es-ES" dirty="0"/>
               <a:t>Para utilizar un servicio Angular nos ofrece la inyección de dependencia en los constructores de una clase.</a:t>
+            </a:r>
+          </a:p>
+          <a:p>
+            <a:pPr algn="just"/>
+            <a:r>
+              <a:rPr lang="es-ES" dirty="0"/>
+              <a:t>Por defecto un servicio es </a:t>
+            </a:r>
+            <a:r>
+              <a:rPr lang="es-ES" dirty="0" err="1"/>
+              <a:t>Singleton</a:t>
+            </a:r>
+            <a:r>
+              <a:rPr lang="es-ES" dirty="0"/>
+              <a:t>.</a:t>
             </a:r>
           </a:p>
         </p:txBody>
@@ -14855,6 +14875,612 @@
     <p:extLst>
       <p:ext uri="{BB962C8B-B14F-4D97-AF65-F5344CB8AC3E}">
         <p14:creationId xmlns:p14="http://schemas.microsoft.com/office/powerpoint/2010/main" val="3687435352"/>
+      </p:ext>
+    </p:extLst>
+  </p:cSld>
+  <p:clrMapOvr>
+    <a:masterClrMapping/>
+  </p:clrMapOvr>
+  <mc:AlternateContent xmlns:mc="http://schemas.openxmlformats.org/markup-compatibility/2006" xmlns:p14="http://schemas.microsoft.com/office/powerpoint/2010/main">
+    <mc:Choice Requires="p14">
+      <p:transition spd="med" p14:dur="700">
+        <p:fade/>
+      </p:transition>
+    </mc:Choice>
+    <mc:Fallback xmlns="">
+      <p:transition spd="med">
+        <p:fade/>
+      </p:transition>
+    </mc:Fallback>
+  </mc:AlternateContent>
+</p:sld>
+</file>
+
+<file path=ppt/slides/slide45.xml><?xml version="1.0" encoding="utf-8"?>
+<p:sld xmlns:a="http://schemas.openxmlformats.org/drawingml/2006/main" xmlns:r="http://schemas.openxmlformats.org/officeDocument/2006/relationships" xmlns:p="http://schemas.openxmlformats.org/presentationml/2006/main">
+  <p:cSld>
+    <p:spTree>
+      <p:nvGrpSpPr>
+        <p:cNvPr id="1" name=""/>
+        <p:cNvGrpSpPr/>
+        <p:nvPr/>
+      </p:nvGrpSpPr>
+      <p:grpSpPr>
+        <a:xfrm>
+          <a:off x="0" y="0"/>
+          <a:ext cx="0" cy="0"/>
+          <a:chOff x="0" y="0"/>
+          <a:chExt cx="0" cy="0"/>
+        </a:xfrm>
+      </p:grpSpPr>
+      <p:sp>
+        <p:nvSpPr>
+          <p:cNvPr id="2" name="Título 1">
+            <a:extLst>
+              <a:ext uri="{FF2B5EF4-FFF2-40B4-BE49-F238E27FC236}">
+                <a16:creationId xmlns:a16="http://schemas.microsoft.com/office/drawing/2014/main" id="{319A57F6-7C14-4A47-9E5D-DA3A7A8F6469}"/>
+              </a:ext>
+            </a:extLst>
+          </p:cNvPr>
+          <p:cNvSpPr>
+            <a:spLocks noGrp="1"/>
+          </p:cNvSpPr>
+          <p:nvPr>
+            <p:ph type="title"/>
+          </p:nvPr>
+        </p:nvSpPr>
+        <p:spPr>
+          <a:xfrm>
+            <a:off x="814957" y="-13658"/>
+            <a:ext cx="10558909" cy="6858000"/>
+          </a:xfrm>
+        </p:spPr>
+        <p:txBody>
+          <a:bodyPr anchor="ctr">
+            <a:normAutofit/>
+          </a:bodyPr>
+          <a:lstStyle/>
+          <a:p>
+            <a:pPr algn="ctr"/>
+            <a:r>
+              <a:rPr lang="es-ES" sz="6000" dirty="0"/>
+              <a:t>Comunicación con servicios </a:t>
+            </a:r>
+            <a:r>
+              <a:rPr lang="es-ES" sz="6000" dirty="0" err="1"/>
+              <a:t>REST</a:t>
+            </a:r>
+            <a:endParaRPr lang="es-ES" sz="6000" dirty="0"/>
+          </a:p>
+        </p:txBody>
+      </p:sp>
+    </p:spTree>
+    <p:extLst>
+      <p:ext uri="{BB962C8B-B14F-4D97-AF65-F5344CB8AC3E}">
+        <p14:creationId xmlns:p14="http://schemas.microsoft.com/office/powerpoint/2010/main" val="4029710701"/>
+      </p:ext>
+    </p:extLst>
+  </p:cSld>
+  <p:clrMapOvr>
+    <a:masterClrMapping/>
+  </p:clrMapOvr>
+  <mc:AlternateContent xmlns:mc="http://schemas.openxmlformats.org/markup-compatibility/2006" xmlns:p14="http://schemas.microsoft.com/office/powerpoint/2010/main">
+    <mc:Choice Requires="p14">
+      <p:transition spd="med" p14:dur="700">
+        <p:fade/>
+      </p:transition>
+    </mc:Choice>
+    <mc:Fallback xmlns="">
+      <p:transition spd="med">
+        <p:fade/>
+      </p:transition>
+    </mc:Fallback>
+  </mc:AlternateContent>
+</p:sld>
+</file>
+
+<file path=ppt/slides/slide46.xml><?xml version="1.0" encoding="utf-8"?>
+<p:sld xmlns:a="http://schemas.openxmlformats.org/drawingml/2006/main" xmlns:r="http://schemas.openxmlformats.org/officeDocument/2006/relationships" xmlns:p="http://schemas.openxmlformats.org/presentationml/2006/main">
+  <p:cSld>
+    <p:spTree>
+      <p:nvGrpSpPr>
+        <p:cNvPr id="1" name=""/>
+        <p:cNvGrpSpPr/>
+        <p:nvPr/>
+      </p:nvGrpSpPr>
+      <p:grpSpPr>
+        <a:xfrm>
+          <a:off x="0" y="0"/>
+          <a:ext cx="0" cy="0"/>
+          <a:chOff x="0" y="0"/>
+          <a:chExt cx="0" cy="0"/>
+        </a:xfrm>
+      </p:grpSpPr>
+      <p:sp>
+        <p:nvSpPr>
+          <p:cNvPr id="2" name="Título 1">
+            <a:extLst>
+              <a:ext uri="{FF2B5EF4-FFF2-40B4-BE49-F238E27FC236}">
+                <a16:creationId xmlns:a16="http://schemas.microsoft.com/office/drawing/2014/main" id="{75E1D69F-D374-48DB-89AA-5C4249D76385}"/>
+              </a:ext>
+            </a:extLst>
+          </p:cNvPr>
+          <p:cNvSpPr>
+            <a:spLocks noGrp="1"/>
+          </p:cNvSpPr>
+          <p:nvPr>
+            <p:ph type="title"/>
+          </p:nvPr>
+        </p:nvSpPr>
+        <p:spPr/>
+        <p:txBody>
+          <a:bodyPr/>
+          <a:lstStyle/>
+          <a:p>
+            <a:r>
+              <a:rPr lang="es-ES" dirty="0" err="1"/>
+              <a:t>Modulos</a:t>
+            </a:r>
+            <a:endParaRPr lang="es-ES" dirty="0"/>
+          </a:p>
+        </p:txBody>
+      </p:sp>
+      <p:sp>
+        <p:nvSpPr>
+          <p:cNvPr id="3" name="Marcador de contenido 2">
+            <a:extLst>
+              <a:ext uri="{FF2B5EF4-FFF2-40B4-BE49-F238E27FC236}">
+                <a16:creationId xmlns:a16="http://schemas.microsoft.com/office/drawing/2014/main" id="{14F95FD3-F90A-4611-A951-C8A6B763398C}"/>
+              </a:ext>
+            </a:extLst>
+          </p:cNvPr>
+          <p:cNvSpPr>
+            <a:spLocks noGrp="1"/>
+          </p:cNvSpPr>
+          <p:nvPr>
+            <p:ph idx="1"/>
+          </p:nvPr>
+        </p:nvSpPr>
+        <p:spPr>
+          <a:xfrm>
+            <a:off x="1218883" y="1701797"/>
+            <a:ext cx="4875529" cy="4462272"/>
+          </a:xfrm>
+        </p:spPr>
+        <p:txBody>
+          <a:bodyPr>
+            <a:normAutofit fontScale="92500" lnSpcReduction="10000"/>
+          </a:bodyPr>
+          <a:lstStyle/>
+          <a:p>
+            <a:pPr algn="just"/>
+            <a:r>
+              <a:rPr lang="es-ES" dirty="0"/>
+              <a:t>Encapsula los componentes, directivas y pipes que se encuentran dentro de un mismo paquete.</a:t>
+            </a:r>
+          </a:p>
+          <a:p>
+            <a:pPr algn="just"/>
+            <a:r>
+              <a:rPr lang="es-ES" dirty="0"/>
+              <a:t>Utiliza el decorador @</a:t>
+            </a:r>
+            <a:r>
+              <a:rPr lang="es-ES" dirty="0" err="1"/>
+              <a:t>NgModule</a:t>
+            </a:r>
+            <a:endParaRPr lang="es-ES" dirty="0"/>
+          </a:p>
+          <a:p>
+            <a:pPr algn="just"/>
+            <a:r>
+              <a:rPr lang="es-ES" dirty="0"/>
+              <a:t>Permite modularizar una aplicación basada en el dominio.</a:t>
+            </a:r>
+          </a:p>
+          <a:p>
+            <a:pPr algn="just"/>
+            <a:r>
+              <a:rPr lang="es-ES" dirty="0"/>
+              <a:t>Es necesario para el </a:t>
+            </a:r>
+            <a:r>
+              <a:rPr lang="es-ES" dirty="0" err="1"/>
+              <a:t>Lazy</a:t>
+            </a:r>
+            <a:r>
+              <a:rPr lang="es-ES" dirty="0"/>
+              <a:t> </a:t>
+            </a:r>
+            <a:r>
+              <a:rPr lang="es-ES" dirty="0" err="1"/>
+              <a:t>Loading</a:t>
+            </a:r>
+            <a:endParaRPr lang="es-ES" dirty="0"/>
+          </a:p>
+        </p:txBody>
+      </p:sp>
+      <p:pic>
+        <p:nvPicPr>
+          <p:cNvPr id="4" name="Imagen 3">
+            <a:extLst>
+              <a:ext uri="{FF2B5EF4-FFF2-40B4-BE49-F238E27FC236}">
+                <a16:creationId xmlns:a16="http://schemas.microsoft.com/office/drawing/2014/main" id="{A4634B11-F6FE-4448-A335-30844831B934}"/>
+              </a:ext>
+            </a:extLst>
+          </p:cNvPr>
+          <p:cNvPicPr>
+            <a:picLocks noChangeAspect="1"/>
+          </p:cNvPicPr>
+          <p:nvPr/>
+        </p:nvPicPr>
+        <p:blipFill>
+          <a:blip r:embed="rId2"/>
+          <a:stretch>
+            <a:fillRect/>
+          </a:stretch>
+        </p:blipFill>
+        <p:spPr>
+          <a:xfrm>
+            <a:off x="7688955" y="962048"/>
+            <a:ext cx="3312368" cy="4933904"/>
+          </a:xfrm>
+          <a:prstGeom prst="rect">
+            <a:avLst/>
+          </a:prstGeom>
+        </p:spPr>
+      </p:pic>
+    </p:spTree>
+    <p:extLst>
+      <p:ext uri="{BB962C8B-B14F-4D97-AF65-F5344CB8AC3E}">
+        <p14:creationId xmlns:p14="http://schemas.microsoft.com/office/powerpoint/2010/main" val="1856460736"/>
+      </p:ext>
+    </p:extLst>
+  </p:cSld>
+  <p:clrMapOvr>
+    <a:masterClrMapping/>
+  </p:clrMapOvr>
+  <mc:AlternateContent xmlns:mc="http://schemas.openxmlformats.org/markup-compatibility/2006" xmlns:p14="http://schemas.microsoft.com/office/powerpoint/2010/main">
+    <mc:Choice Requires="p14">
+      <p:transition spd="med" p14:dur="700">
+        <p:fade/>
+      </p:transition>
+    </mc:Choice>
+    <mc:Fallback xmlns="">
+      <p:transition spd="med">
+        <p:fade/>
+      </p:transition>
+    </mc:Fallback>
+  </mc:AlternateContent>
+</p:sld>
+</file>
+
+<file path=ppt/slides/slide47.xml><?xml version="1.0" encoding="utf-8"?>
+<p:sld xmlns:a="http://schemas.openxmlformats.org/drawingml/2006/main" xmlns:r="http://schemas.openxmlformats.org/officeDocument/2006/relationships" xmlns:p="http://schemas.openxmlformats.org/presentationml/2006/main">
+  <p:cSld>
+    <p:spTree>
+      <p:nvGrpSpPr>
+        <p:cNvPr id="1" name=""/>
+        <p:cNvGrpSpPr/>
+        <p:nvPr/>
+      </p:nvGrpSpPr>
+      <p:grpSpPr>
+        <a:xfrm>
+          <a:off x="0" y="0"/>
+          <a:ext cx="0" cy="0"/>
+          <a:chOff x="0" y="0"/>
+          <a:chExt cx="0" cy="0"/>
+        </a:xfrm>
+      </p:grpSpPr>
+      <p:sp>
+        <p:nvSpPr>
+          <p:cNvPr id="2" name="Título 1">
+            <a:extLst>
+              <a:ext uri="{FF2B5EF4-FFF2-40B4-BE49-F238E27FC236}">
+                <a16:creationId xmlns:a16="http://schemas.microsoft.com/office/drawing/2014/main" id="{B6EB2C4C-4792-44A5-B8B8-E138C8579352}"/>
+              </a:ext>
+            </a:extLst>
+          </p:cNvPr>
+          <p:cNvSpPr>
+            <a:spLocks noGrp="1"/>
+          </p:cNvSpPr>
+          <p:nvPr>
+            <p:ph type="title"/>
+          </p:nvPr>
+        </p:nvSpPr>
+        <p:spPr/>
+        <p:txBody>
+          <a:bodyPr/>
+          <a:lstStyle/>
+          <a:p>
+            <a:r>
+              <a:rPr lang="es-ES" dirty="0" err="1"/>
+              <a:t>Lazy</a:t>
+            </a:r>
+            <a:r>
+              <a:rPr lang="es-ES" dirty="0"/>
+              <a:t> </a:t>
+            </a:r>
+            <a:r>
+              <a:rPr lang="es-ES" dirty="0" err="1"/>
+              <a:t>Loading</a:t>
+            </a:r>
+            <a:endParaRPr lang="es-ES" dirty="0"/>
+          </a:p>
+        </p:txBody>
+      </p:sp>
+      <p:sp>
+        <p:nvSpPr>
+          <p:cNvPr id="3" name="Marcador de contenido 2">
+            <a:extLst>
+              <a:ext uri="{FF2B5EF4-FFF2-40B4-BE49-F238E27FC236}">
+                <a16:creationId xmlns:a16="http://schemas.microsoft.com/office/drawing/2014/main" id="{7EC68557-B06F-492F-A188-A9CB8F6E0FC7}"/>
+              </a:ext>
+            </a:extLst>
+          </p:cNvPr>
+          <p:cNvSpPr>
+            <a:spLocks noGrp="1"/>
+          </p:cNvSpPr>
+          <p:nvPr>
+            <p:ph idx="1"/>
+          </p:nvPr>
+        </p:nvSpPr>
+        <p:spPr/>
+        <p:txBody>
+          <a:bodyPr/>
+          <a:lstStyle/>
+          <a:p>
+            <a:r>
+              <a:rPr lang="es-ES" dirty="0"/>
+              <a:t>También conocido como carga perezosa.</a:t>
+            </a:r>
+          </a:p>
+          <a:p>
+            <a:r>
+              <a:rPr lang="es-ES" dirty="0"/>
+              <a:t>Permite cargar los componentes solo cuando verdaderamente se necesitan.</a:t>
+            </a:r>
+          </a:p>
+          <a:p>
+            <a:r>
+              <a:rPr lang="es-ES" dirty="0"/>
+              <a:t>Evita la sobrecarga inicial de la aplicación web.</a:t>
+            </a:r>
+          </a:p>
+          <a:p>
+            <a:endParaRPr lang="es-ES" dirty="0"/>
+          </a:p>
+        </p:txBody>
+      </p:sp>
+    </p:spTree>
+    <p:extLst>
+      <p:ext uri="{BB962C8B-B14F-4D97-AF65-F5344CB8AC3E}">
+        <p14:creationId xmlns:p14="http://schemas.microsoft.com/office/powerpoint/2010/main" val="17530134"/>
+      </p:ext>
+    </p:extLst>
+  </p:cSld>
+  <p:clrMapOvr>
+    <a:masterClrMapping/>
+  </p:clrMapOvr>
+  <mc:AlternateContent xmlns:mc="http://schemas.openxmlformats.org/markup-compatibility/2006" xmlns:p14="http://schemas.microsoft.com/office/powerpoint/2010/main">
+    <mc:Choice Requires="p14">
+      <p:transition spd="med" p14:dur="700">
+        <p:fade/>
+      </p:transition>
+    </mc:Choice>
+    <mc:Fallback xmlns="">
+      <p:transition spd="med">
+        <p:fade/>
+      </p:transition>
+    </mc:Fallback>
+  </mc:AlternateContent>
+</p:sld>
+</file>
+
+<file path=ppt/slides/slide48.xml><?xml version="1.0" encoding="utf-8"?>
+<p:sld xmlns:a="http://schemas.openxmlformats.org/drawingml/2006/main" xmlns:r="http://schemas.openxmlformats.org/officeDocument/2006/relationships" xmlns:p="http://schemas.openxmlformats.org/presentationml/2006/main">
+  <p:cSld>
+    <p:spTree>
+      <p:nvGrpSpPr>
+        <p:cNvPr id="1" name=""/>
+        <p:cNvGrpSpPr/>
+        <p:nvPr/>
+      </p:nvGrpSpPr>
+      <p:grpSpPr>
+        <a:xfrm>
+          <a:off x="0" y="0"/>
+          <a:ext cx="0" cy="0"/>
+          <a:chOff x="0" y="0"/>
+          <a:chExt cx="0" cy="0"/>
+        </a:xfrm>
+      </p:grpSpPr>
+      <p:sp>
+        <p:nvSpPr>
+          <p:cNvPr id="2" name="Título 1">
+            <a:extLst>
+              <a:ext uri="{FF2B5EF4-FFF2-40B4-BE49-F238E27FC236}">
+                <a16:creationId xmlns:a16="http://schemas.microsoft.com/office/drawing/2014/main" id="{319A57F6-7C14-4A47-9E5D-DA3A7A8F6469}"/>
+              </a:ext>
+            </a:extLst>
+          </p:cNvPr>
+          <p:cNvSpPr>
+            <a:spLocks noGrp="1"/>
+          </p:cNvSpPr>
+          <p:nvPr>
+            <p:ph type="title"/>
+          </p:nvPr>
+        </p:nvSpPr>
+        <p:spPr>
+          <a:xfrm>
+            <a:off x="814957" y="-13658"/>
+            <a:ext cx="10558909" cy="6250970"/>
+          </a:xfrm>
+        </p:spPr>
+        <p:txBody>
+          <a:bodyPr anchor="ctr">
+            <a:normAutofit/>
+          </a:bodyPr>
+          <a:lstStyle/>
+          <a:p>
+            <a:pPr algn="ctr"/>
+            <a:r>
+              <a:rPr lang="es-ES" sz="6000" dirty="0"/>
+              <a:t>Navegación entre paginas</a:t>
+            </a:r>
+          </a:p>
+        </p:txBody>
+      </p:sp>
+      <p:sp>
+        <p:nvSpPr>
+          <p:cNvPr id="3" name="Rectángulo 2">
+            <a:extLst>
+              <a:ext uri="{FF2B5EF4-FFF2-40B4-BE49-F238E27FC236}">
+                <a16:creationId xmlns:a16="http://schemas.microsoft.com/office/drawing/2014/main" id="{17A19800-1550-4F76-8686-E23E33889F45}"/>
+              </a:ext>
+            </a:extLst>
+          </p:cNvPr>
+          <p:cNvSpPr/>
+          <p:nvPr/>
+        </p:nvSpPr>
+        <p:spPr>
+          <a:xfrm>
+            <a:off x="2761704" y="4365104"/>
+            <a:ext cx="6665414" cy="707886"/>
+          </a:xfrm>
+          <a:prstGeom prst="rect">
+            <a:avLst/>
+          </a:prstGeom>
+        </p:spPr>
+        <p:txBody>
+          <a:bodyPr wrap="none">
+            <a:spAutoFit/>
+          </a:bodyPr>
+          <a:lstStyle/>
+          <a:p>
+            <a:r>
+              <a:rPr lang="es-ES" sz="4000" dirty="0"/>
+              <a:t>https://angular.io/guide/router</a:t>
+            </a:r>
+          </a:p>
+        </p:txBody>
+      </p:sp>
+    </p:spTree>
+    <p:extLst>
+      <p:ext uri="{BB962C8B-B14F-4D97-AF65-F5344CB8AC3E}">
+        <p14:creationId xmlns:p14="http://schemas.microsoft.com/office/powerpoint/2010/main" val="775667321"/>
+      </p:ext>
+    </p:extLst>
+  </p:cSld>
+  <p:clrMapOvr>
+    <a:masterClrMapping/>
+  </p:clrMapOvr>
+  <mc:AlternateContent xmlns:mc="http://schemas.openxmlformats.org/markup-compatibility/2006" xmlns:p14="http://schemas.microsoft.com/office/powerpoint/2010/main">
+    <mc:Choice Requires="p14">
+      <p:transition spd="med" p14:dur="700">
+        <p:fade/>
+      </p:transition>
+    </mc:Choice>
+    <mc:Fallback xmlns="">
+      <p:transition spd="med">
+        <p:fade/>
+      </p:transition>
+    </mc:Fallback>
+  </mc:AlternateContent>
+</p:sld>
+</file>
+
+<file path=ppt/slides/slide49.xml><?xml version="1.0" encoding="utf-8"?>
+<p:sld xmlns:a="http://schemas.openxmlformats.org/drawingml/2006/main" xmlns:r="http://schemas.openxmlformats.org/officeDocument/2006/relationships" xmlns:p="http://schemas.openxmlformats.org/presentationml/2006/main">
+  <p:cSld>
+    <p:spTree>
+      <p:nvGrpSpPr>
+        <p:cNvPr id="1" name=""/>
+        <p:cNvGrpSpPr/>
+        <p:nvPr/>
+      </p:nvGrpSpPr>
+      <p:grpSpPr>
+        <a:xfrm>
+          <a:off x="0" y="0"/>
+          <a:ext cx="0" cy="0"/>
+          <a:chOff x="0" y="0"/>
+          <a:chExt cx="0" cy="0"/>
+        </a:xfrm>
+      </p:grpSpPr>
+      <p:sp>
+        <p:nvSpPr>
+          <p:cNvPr id="2" name="Título 1">
+            <a:extLst>
+              <a:ext uri="{FF2B5EF4-FFF2-40B4-BE49-F238E27FC236}">
+                <a16:creationId xmlns:a16="http://schemas.microsoft.com/office/drawing/2014/main" id="{319A57F6-7C14-4A47-9E5D-DA3A7A8F6469}"/>
+              </a:ext>
+            </a:extLst>
+          </p:cNvPr>
+          <p:cNvSpPr>
+            <a:spLocks noGrp="1"/>
+          </p:cNvSpPr>
+          <p:nvPr>
+            <p:ph type="title"/>
+          </p:nvPr>
+        </p:nvSpPr>
+        <p:spPr>
+          <a:xfrm>
+            <a:off x="0" y="-13658"/>
+            <a:ext cx="12188825" cy="6250970"/>
+          </a:xfrm>
+        </p:spPr>
+        <p:txBody>
+          <a:bodyPr anchor="ctr">
+            <a:normAutofit/>
+          </a:bodyPr>
+          <a:lstStyle/>
+          <a:p>
+            <a:pPr algn="ctr"/>
+            <a:r>
+              <a:rPr lang="es-ES" sz="6000" dirty="0"/>
+              <a:t>Formularios Reactivos</a:t>
+            </a:r>
+          </a:p>
+        </p:txBody>
+      </p:sp>
+      <p:sp>
+        <p:nvSpPr>
+          <p:cNvPr id="3" name="Rectángulo 2">
+            <a:extLst>
+              <a:ext uri="{FF2B5EF4-FFF2-40B4-BE49-F238E27FC236}">
+                <a16:creationId xmlns:a16="http://schemas.microsoft.com/office/drawing/2014/main" id="{17A19800-1550-4F76-8686-E23E33889F45}"/>
+              </a:ext>
+            </a:extLst>
+          </p:cNvPr>
+          <p:cNvSpPr/>
+          <p:nvPr/>
+        </p:nvSpPr>
+        <p:spPr>
+          <a:xfrm>
+            <a:off x="0" y="4293096"/>
+            <a:ext cx="12188825" cy="707886"/>
+          </a:xfrm>
+          <a:prstGeom prst="rect">
+            <a:avLst/>
+          </a:prstGeom>
+        </p:spPr>
+        <p:txBody>
+          <a:bodyPr wrap="square">
+            <a:spAutoFit/>
+          </a:bodyPr>
+          <a:lstStyle/>
+          <a:p>
+            <a:pPr algn="ctr"/>
+            <a:r>
+              <a:rPr lang="es-ES" sz="4000" dirty="0"/>
+              <a:t>https://angular.io/guide/reactive-forms</a:t>
+            </a:r>
+          </a:p>
+        </p:txBody>
+      </p:sp>
+    </p:spTree>
+    <p:extLst>
+      <p:ext uri="{BB962C8B-B14F-4D97-AF65-F5344CB8AC3E}">
+        <p14:creationId xmlns:p14="http://schemas.microsoft.com/office/powerpoint/2010/main" val="2180416656"/>
       </p:ext>
     </p:extLst>
   </p:cSld>
@@ -16861,142 +17487,6 @@
 </file>
 
 <file path=customXml/item1.xml><?xml version="1.0" encoding="utf-8"?>
-<p:properties xmlns:p="http://schemas.microsoft.com/office/2006/metadata/properties" xmlns:xsi="http://www.w3.org/2001/XMLSchema-instance" xmlns:pc="http://schemas.microsoft.com/office/infopath/2007/PartnerControls">
-  <documentManagement>
-    <LocPublishedLinkedAssetsLookup xmlns="4873beb7-5857-4685-be1f-d57550cc96cc" xsi:nil="true"/>
-    <ApprovalStatus xmlns="4873beb7-5857-4685-be1f-d57550cc96cc">InProgress</ApprovalStatus>
-    <MarketSpecific xmlns="4873beb7-5857-4685-be1f-d57550cc96cc">false</MarketSpecific>
-    <LocComments xmlns="4873beb7-5857-4685-be1f-d57550cc96cc" xsi:nil="true"/>
-    <LocLastLocAttemptVersionTypeLookup xmlns="4873beb7-5857-4685-be1f-d57550cc96cc" xsi:nil="true"/>
-    <DirectSourceMarket xmlns="4873beb7-5857-4685-be1f-d57550cc96cc" xsi:nil="true"/>
-    <ThumbnailAssetId xmlns="4873beb7-5857-4685-be1f-d57550cc96cc" xsi:nil="true"/>
-    <PrimaryImageGen xmlns="4873beb7-5857-4685-be1f-d57550cc96cc">false</PrimaryImageGen>
-    <LocNewPublishedVersionLookup xmlns="4873beb7-5857-4685-be1f-d57550cc96cc" xsi:nil="true"/>
-    <LegacyData xmlns="4873beb7-5857-4685-be1f-d57550cc96cc" xsi:nil="true"/>
-    <LocRecommendedHandoff xmlns="4873beb7-5857-4685-be1f-d57550cc96cc" xsi:nil="true"/>
-    <BusinessGroup xmlns="4873beb7-5857-4685-be1f-d57550cc96cc" xsi:nil="true"/>
-    <BlockPublish xmlns="4873beb7-5857-4685-be1f-d57550cc96cc">false</BlockPublish>
-    <TPFriendlyName xmlns="4873beb7-5857-4685-be1f-d57550cc96cc" xsi:nil="true"/>
-    <LocOverallPublishStatusLookup xmlns="4873beb7-5857-4685-be1f-d57550cc96cc" xsi:nil="true"/>
-    <NumericId xmlns="4873beb7-5857-4685-be1f-d57550cc96cc" xsi:nil="true"/>
-    <APEditor xmlns="4873beb7-5857-4685-be1f-d57550cc96cc">
-      <UserInfo>
-        <DisplayName/>
-        <AccountId xsi:nil="true"/>
-        <AccountType/>
-      </UserInfo>
-    </APEditor>
-    <SourceTitle xmlns="4873beb7-5857-4685-be1f-d57550cc96cc" xsi:nil="true"/>
-    <OpenTemplate xmlns="4873beb7-5857-4685-be1f-d57550cc96cc">true</OpenTemplate>
-    <LocOverallLocStatusLookup xmlns="4873beb7-5857-4685-be1f-d57550cc96cc" xsi:nil="true"/>
-    <UALocComments xmlns="4873beb7-5857-4685-be1f-d57550cc96cc" xsi:nil="true"/>
-    <ParentAssetId xmlns="4873beb7-5857-4685-be1f-d57550cc96cc" xsi:nil="true"/>
-    <IntlLangReviewDate xmlns="4873beb7-5857-4685-be1f-d57550cc96cc" xsi:nil="true"/>
-    <FeatureTagsTaxHTField0 xmlns="4873beb7-5857-4685-be1f-d57550cc96cc">
-      <Terms xmlns="http://schemas.microsoft.com/office/infopath/2007/PartnerControls"/>
-    </FeatureTagsTaxHTField0>
-    <PublishStatusLookup xmlns="4873beb7-5857-4685-be1f-d57550cc96cc">
-      <Value>1345093</Value>
-    </PublishStatusLookup>
-    <Providers xmlns="4873beb7-5857-4685-be1f-d57550cc96cc" xsi:nil="true"/>
-    <MachineTranslated xmlns="4873beb7-5857-4685-be1f-d57550cc96cc">false</MachineTranslated>
-    <OriginalSourceMarket xmlns="4873beb7-5857-4685-be1f-d57550cc96cc" xsi:nil="true"/>
-    <APDescription xmlns="4873beb7-5857-4685-be1f-d57550cc96cc">This simple template design works for technology and  businesses, but it's versatile enough to use in other contexts.  It features multiple slide layouts designed for widescreen (16x9 resolution) and includes a sample SmartArt list and chart that are easily editable.</APDescription>
-    <ClipArtFilename xmlns="4873beb7-5857-4685-be1f-d57550cc96cc" xsi:nil="true"/>
-    <ContentItem xmlns="4873beb7-5857-4685-be1f-d57550cc96cc" xsi:nil="true"/>
-    <TPInstallLocation xmlns="4873beb7-5857-4685-be1f-d57550cc96cc" xsi:nil="true"/>
-    <PublishTargets xmlns="4873beb7-5857-4685-be1f-d57550cc96cc">OfficeOnlineVNext</PublishTargets>
-    <TimesCloned xmlns="4873beb7-5857-4685-be1f-d57550cc96cc" xsi:nil="true"/>
-    <AssetStart xmlns="4873beb7-5857-4685-be1f-d57550cc96cc">2011-11-26T00:30:00+00:00</AssetStart>
-    <Provider xmlns="4873beb7-5857-4685-be1f-d57550cc96cc" xsi:nil="true"/>
-    <AcquiredFrom xmlns="4873beb7-5857-4685-be1f-d57550cc96cc">Internal MS</AcquiredFrom>
-    <FriendlyTitle xmlns="4873beb7-5857-4685-be1f-d57550cc96cc" xsi:nil="true"/>
-    <LastHandOff xmlns="4873beb7-5857-4685-be1f-d57550cc96cc" xsi:nil="true"/>
-    <TPClientViewer xmlns="4873beb7-5857-4685-be1f-d57550cc96cc" xsi:nil="true"/>
-    <TemplateStatus xmlns="4873beb7-5857-4685-be1f-d57550cc96cc">Complete</TemplateStatus>
-    <Downloads xmlns="4873beb7-5857-4685-be1f-d57550cc96cc">0</Downloads>
-    <OOCacheId xmlns="4873beb7-5857-4685-be1f-d57550cc96cc" xsi:nil="true"/>
-    <IsDeleted xmlns="4873beb7-5857-4685-be1f-d57550cc96cc">false</IsDeleted>
-    <LocPublishedDependentAssetsLookup xmlns="4873beb7-5857-4685-be1f-d57550cc96cc" xsi:nil="true"/>
-    <TPExecutable xmlns="4873beb7-5857-4685-be1f-d57550cc96cc" xsi:nil="true"/>
-    <EditorialTags xmlns="4873beb7-5857-4685-be1f-d57550cc96cc" xsi:nil="true"/>
-    <SubmitterId xmlns="4873beb7-5857-4685-be1f-d57550cc96cc" xsi:nil="true"/>
-    <ApprovalLog xmlns="4873beb7-5857-4685-be1f-d57550cc96cc" xsi:nil="true"/>
-    <AssetType xmlns="4873beb7-5857-4685-be1f-d57550cc96cc">TP</AssetType>
-    <BugNumber xmlns="4873beb7-5857-4685-be1f-d57550cc96cc" xsi:nil="true"/>
-    <CSXSubmissionDate xmlns="4873beb7-5857-4685-be1f-d57550cc96cc" xsi:nil="true"/>
-    <CSXUpdate xmlns="4873beb7-5857-4685-be1f-d57550cc96cc">false</CSXUpdate>
-    <Milestone xmlns="4873beb7-5857-4685-be1f-d57550cc96cc" xsi:nil="true"/>
-    <RecommendationsModifier xmlns="4873beb7-5857-4685-be1f-d57550cc96cc" xsi:nil="true"/>
-    <OriginAsset xmlns="4873beb7-5857-4685-be1f-d57550cc96cc" xsi:nil="true"/>
-    <TPComponent xmlns="4873beb7-5857-4685-be1f-d57550cc96cc" xsi:nil="true"/>
-    <AssetId xmlns="4873beb7-5857-4685-be1f-d57550cc96cc">TP102787989</AssetId>
-    <IntlLocPriority xmlns="4873beb7-5857-4685-be1f-d57550cc96cc" xsi:nil="true"/>
-    <PolicheckWords xmlns="4873beb7-5857-4685-be1f-d57550cc96cc" xsi:nil="true"/>
-    <TPLaunchHelpLink xmlns="4873beb7-5857-4685-be1f-d57550cc96cc" xsi:nil="true"/>
-    <TPApplication xmlns="4873beb7-5857-4685-be1f-d57550cc96cc" xsi:nil="true"/>
-    <CrawlForDependencies xmlns="4873beb7-5857-4685-be1f-d57550cc96cc">false</CrawlForDependencies>
-    <HandoffToMSDN xmlns="4873beb7-5857-4685-be1f-d57550cc96cc" xsi:nil="true"/>
-    <PlannedPubDate xmlns="4873beb7-5857-4685-be1f-d57550cc96cc" xsi:nil="true"/>
-    <IntlLangReviewer xmlns="4873beb7-5857-4685-be1f-d57550cc96cc" xsi:nil="true"/>
-    <TrustLevel xmlns="4873beb7-5857-4685-be1f-d57550cc96cc">1 Microsoft Managed Content</TrustLevel>
-    <LocLastLocAttemptVersionLookup xmlns="4873beb7-5857-4685-be1f-d57550cc96cc">694266</LocLastLocAttemptVersionLookup>
-    <LocProcessedForHandoffsLookup xmlns="4873beb7-5857-4685-be1f-d57550cc96cc" xsi:nil="true"/>
-    <IsSearchable xmlns="4873beb7-5857-4685-be1f-d57550cc96cc">true</IsSearchable>
-    <TemplateTemplateType xmlns="4873beb7-5857-4685-be1f-d57550cc96cc">PowerPoint Presentation Template</TemplateTemplateType>
-    <CampaignTagsTaxHTField0 xmlns="4873beb7-5857-4685-be1f-d57550cc96cc">
-      <Terms xmlns="http://schemas.microsoft.com/office/infopath/2007/PartnerControls"/>
-    </CampaignTagsTaxHTField0>
-    <TPNamespace xmlns="4873beb7-5857-4685-be1f-d57550cc96cc" xsi:nil="true"/>
-    <LocOverallPreviewStatusLookup xmlns="4873beb7-5857-4685-be1f-d57550cc96cc" xsi:nil="true"/>
-    <TaxCatchAll xmlns="4873beb7-5857-4685-be1f-d57550cc96cc"/>
-    <Markets xmlns="4873beb7-5857-4685-be1f-d57550cc96cc"/>
-    <UAProjectedTotalWords xmlns="4873beb7-5857-4685-be1f-d57550cc96cc" xsi:nil="true"/>
-    <IntlLangReview xmlns="4873beb7-5857-4685-be1f-d57550cc96cc" xsi:nil="true"/>
-    <OutputCachingOn xmlns="4873beb7-5857-4685-be1f-d57550cc96cc">false</OutputCachingOn>
-    <AverageRating xmlns="4873beb7-5857-4685-be1f-d57550cc96cc" xsi:nil="true"/>
-    <APAuthor xmlns="4873beb7-5857-4685-be1f-d57550cc96cc">
-      <UserInfo>
-        <DisplayName>REDMOND\kristaa</DisplayName>
-        <AccountId>136</AccountId>
-        <AccountType/>
-      </UserInfo>
-    </APAuthor>
-    <LocManualTestRequired xmlns="4873beb7-5857-4685-be1f-d57550cc96cc">false</LocManualTestRequired>
-    <TPCommandLine xmlns="4873beb7-5857-4685-be1f-d57550cc96cc" xsi:nil="true"/>
-    <TPAppVersion xmlns="4873beb7-5857-4685-be1f-d57550cc96cc" xsi:nil="true"/>
-    <EditorialStatus xmlns="4873beb7-5857-4685-be1f-d57550cc96cc">Complete</EditorialStatus>
-    <LastModifiedDateTime xmlns="4873beb7-5857-4685-be1f-d57550cc96cc" xsi:nil="true"/>
-    <ScenarioTagsTaxHTField0 xmlns="4873beb7-5857-4685-be1f-d57550cc96cc">
-      <Terms xmlns="http://schemas.microsoft.com/office/infopath/2007/PartnerControls"/>
-    </ScenarioTagsTaxHTField0>
-    <LocProcessedForMarketsLookup xmlns="4873beb7-5857-4685-be1f-d57550cc96cc" xsi:nil="true"/>
-    <TPLaunchHelpLinkType xmlns="4873beb7-5857-4685-be1f-d57550cc96cc">Template</TPLaunchHelpLinkType>
-    <OriginalRelease xmlns="4873beb7-5857-4685-be1f-d57550cc96cc">15</OriginalRelease>
-    <LocalizationTagsTaxHTField0 xmlns="4873beb7-5857-4685-be1f-d57550cc96cc">
-      <Terms xmlns="http://schemas.microsoft.com/office/infopath/2007/PartnerControls"/>
-    </LocalizationTagsTaxHTField0>
-    <UACurrentWords xmlns="4873beb7-5857-4685-be1f-d57550cc96cc" xsi:nil="true"/>
-    <ArtSampleDocs xmlns="4873beb7-5857-4685-be1f-d57550cc96cc" xsi:nil="true"/>
-    <UALocRecommendation xmlns="4873beb7-5857-4685-be1f-d57550cc96cc">Localize</UALocRecommendation>
-    <Manager xmlns="4873beb7-5857-4685-be1f-d57550cc96cc" xsi:nil="true"/>
-    <LocOverallHandbackStatusLookup xmlns="4873beb7-5857-4685-be1f-d57550cc96cc" xsi:nil="true"/>
-    <ShowIn xmlns="4873beb7-5857-4685-be1f-d57550cc96cc">Show everywhere</ShowIn>
-    <UANotes xmlns="4873beb7-5857-4685-be1f-d57550cc96cc" xsi:nil="true"/>
-    <InternalTagsTaxHTField0 xmlns="4873beb7-5857-4685-be1f-d57550cc96cc">
-      <Terms xmlns="http://schemas.microsoft.com/office/infopath/2007/PartnerControls"/>
-    </InternalTagsTaxHTField0>
-    <CSXHash xmlns="4873beb7-5857-4685-be1f-d57550cc96cc" xsi:nil="true"/>
-    <VoteCount xmlns="4873beb7-5857-4685-be1f-d57550cc96cc" xsi:nil="true"/>
-    <AssetExpire xmlns="4873beb7-5857-4685-be1f-d57550cc96cc">2029-05-12T07:00:00+00:00</AssetExpire>
-    <DSATActionTaken xmlns="4873beb7-5857-4685-be1f-d57550cc96cc" xsi:nil="true"/>
-    <CSXSubmissionMarket xmlns="4873beb7-5857-4685-be1f-d57550cc96cc" xsi:nil="true"/>
-    <LocMarketGroupTiers2 xmlns="4873beb7-5857-4685-be1f-d57550cc96cc" xsi:nil="true"/>
-  </documentManagement>
-</p:properties>
-</file>
-
-<file path=customXml/item2.xml><?xml version="1.0" encoding="utf-8"?>
 <?mso-contentType ?>
 <FormTemplates xmlns="http://schemas.microsoft.com/sharepoint/v3/contenttype/forms">
   <Display>DocumentLibraryForm</Display>
@@ -17005,7 +17495,7 @@
 </FormTemplates>
 </file>
 
-<file path=customXml/item3.xml><?xml version="1.0" encoding="utf-8"?>
+<file path=customXml/item2.xml><?xml version="1.0" encoding="utf-8"?>
 <ct:contentTypeSchema xmlns:ct="http://schemas.microsoft.com/office/2006/metadata/contentType" xmlns:ma="http://schemas.microsoft.com/office/2006/metadata/properties/metaAttributes" ct:_="" ma:_="" ma:contentTypeName="TemplateFile" ma:contentTypeID="0x0101006EDDDB5EE6D98C44930B742096920B300400F5B6D36B3EF94B4E9A635CDF2A18F5B8" ma:contentTypeVersion="72" ma:contentTypeDescription="Create a new document." ma:contentTypeScope="" ma:versionID="a23e56308344d904b51738559c3d67c9">
   <xsd:schema xmlns:xsd="http://www.w3.org/2001/XMLSchema" xmlns:xs="http://www.w3.org/2001/XMLSchema" xmlns:p="http://schemas.microsoft.com/office/2006/metadata/properties" xmlns:ns2="4873beb7-5857-4685-be1f-d57550cc96cc" targetNamespace="http://schemas.microsoft.com/office/2006/metadata/properties" ma:root="true" ma:fieldsID="cd0908cc4600e77bf5da051303e00c8d" ns2:_="">
     <xsd:import namespace="4873beb7-5857-4685-be1f-d57550cc96cc"/>
@@ -18045,23 +18535,143 @@
 </ct:contentTypeSchema>
 </file>
 
-<file path=customXml/itemProps1.xml><?xml version="1.0" encoding="utf-8"?>
-<ds:datastoreItem xmlns:ds="http://schemas.openxmlformats.org/officeDocument/2006/customXml" ds:itemID="{60C67BEE-D13F-4BD2-98A5-34D8A0977F68}">
-  <ds:schemaRefs>
-    <ds:schemaRef ds:uri="http://schemas.openxmlformats.org/package/2006/metadata/core-properties"/>
-    <ds:schemaRef ds:uri="http://schemas.microsoft.com/office/2006/metadata/properties"/>
-    <ds:schemaRef ds:uri="http://schemas.microsoft.com/office/2006/documentManagement/types"/>
-    <ds:schemaRef ds:uri="http://purl.org/dc/dcmitype/"/>
-    <ds:schemaRef ds:uri="http://purl.org/dc/elements/1.1/"/>
-    <ds:schemaRef ds:uri="4873beb7-5857-4685-be1f-d57550cc96cc"/>
-    <ds:schemaRef ds:uri="http://purl.org/dc/terms/"/>
-    <ds:schemaRef ds:uri="http://www.w3.org/XML/1998/namespace"/>
-    <ds:schemaRef ds:uri="http://schemas.microsoft.com/office/infopath/2007/PartnerControls"/>
-  </ds:schemaRefs>
-</ds:datastoreItem>
+<file path=customXml/item3.xml><?xml version="1.0" encoding="utf-8"?>
+<p:properties xmlns:p="http://schemas.microsoft.com/office/2006/metadata/properties" xmlns:xsi="http://www.w3.org/2001/XMLSchema-instance" xmlns:pc="http://schemas.microsoft.com/office/infopath/2007/PartnerControls">
+  <documentManagement>
+    <LocPublishedLinkedAssetsLookup xmlns="4873beb7-5857-4685-be1f-d57550cc96cc" xsi:nil="true"/>
+    <ApprovalStatus xmlns="4873beb7-5857-4685-be1f-d57550cc96cc">InProgress</ApprovalStatus>
+    <MarketSpecific xmlns="4873beb7-5857-4685-be1f-d57550cc96cc">false</MarketSpecific>
+    <LocComments xmlns="4873beb7-5857-4685-be1f-d57550cc96cc" xsi:nil="true"/>
+    <LocLastLocAttemptVersionTypeLookup xmlns="4873beb7-5857-4685-be1f-d57550cc96cc" xsi:nil="true"/>
+    <DirectSourceMarket xmlns="4873beb7-5857-4685-be1f-d57550cc96cc" xsi:nil="true"/>
+    <ThumbnailAssetId xmlns="4873beb7-5857-4685-be1f-d57550cc96cc" xsi:nil="true"/>
+    <PrimaryImageGen xmlns="4873beb7-5857-4685-be1f-d57550cc96cc">false</PrimaryImageGen>
+    <LocNewPublishedVersionLookup xmlns="4873beb7-5857-4685-be1f-d57550cc96cc" xsi:nil="true"/>
+    <LegacyData xmlns="4873beb7-5857-4685-be1f-d57550cc96cc" xsi:nil="true"/>
+    <LocRecommendedHandoff xmlns="4873beb7-5857-4685-be1f-d57550cc96cc" xsi:nil="true"/>
+    <BusinessGroup xmlns="4873beb7-5857-4685-be1f-d57550cc96cc" xsi:nil="true"/>
+    <BlockPublish xmlns="4873beb7-5857-4685-be1f-d57550cc96cc">false</BlockPublish>
+    <TPFriendlyName xmlns="4873beb7-5857-4685-be1f-d57550cc96cc" xsi:nil="true"/>
+    <LocOverallPublishStatusLookup xmlns="4873beb7-5857-4685-be1f-d57550cc96cc" xsi:nil="true"/>
+    <NumericId xmlns="4873beb7-5857-4685-be1f-d57550cc96cc" xsi:nil="true"/>
+    <APEditor xmlns="4873beb7-5857-4685-be1f-d57550cc96cc">
+      <UserInfo>
+        <DisplayName/>
+        <AccountId xsi:nil="true"/>
+        <AccountType/>
+      </UserInfo>
+    </APEditor>
+    <SourceTitle xmlns="4873beb7-5857-4685-be1f-d57550cc96cc" xsi:nil="true"/>
+    <OpenTemplate xmlns="4873beb7-5857-4685-be1f-d57550cc96cc">true</OpenTemplate>
+    <LocOverallLocStatusLookup xmlns="4873beb7-5857-4685-be1f-d57550cc96cc" xsi:nil="true"/>
+    <UALocComments xmlns="4873beb7-5857-4685-be1f-d57550cc96cc" xsi:nil="true"/>
+    <ParentAssetId xmlns="4873beb7-5857-4685-be1f-d57550cc96cc" xsi:nil="true"/>
+    <IntlLangReviewDate xmlns="4873beb7-5857-4685-be1f-d57550cc96cc" xsi:nil="true"/>
+    <FeatureTagsTaxHTField0 xmlns="4873beb7-5857-4685-be1f-d57550cc96cc">
+      <Terms xmlns="http://schemas.microsoft.com/office/infopath/2007/PartnerControls"/>
+    </FeatureTagsTaxHTField0>
+    <PublishStatusLookup xmlns="4873beb7-5857-4685-be1f-d57550cc96cc">
+      <Value>1345093</Value>
+    </PublishStatusLookup>
+    <Providers xmlns="4873beb7-5857-4685-be1f-d57550cc96cc" xsi:nil="true"/>
+    <MachineTranslated xmlns="4873beb7-5857-4685-be1f-d57550cc96cc">false</MachineTranslated>
+    <OriginalSourceMarket xmlns="4873beb7-5857-4685-be1f-d57550cc96cc" xsi:nil="true"/>
+    <APDescription xmlns="4873beb7-5857-4685-be1f-d57550cc96cc">This simple template design works for technology and  businesses, but it's versatile enough to use in other contexts.  It features multiple slide layouts designed for widescreen (16x9 resolution) and includes a sample SmartArt list and chart that are easily editable.</APDescription>
+    <ClipArtFilename xmlns="4873beb7-5857-4685-be1f-d57550cc96cc" xsi:nil="true"/>
+    <ContentItem xmlns="4873beb7-5857-4685-be1f-d57550cc96cc" xsi:nil="true"/>
+    <TPInstallLocation xmlns="4873beb7-5857-4685-be1f-d57550cc96cc" xsi:nil="true"/>
+    <PublishTargets xmlns="4873beb7-5857-4685-be1f-d57550cc96cc">OfficeOnlineVNext</PublishTargets>
+    <TimesCloned xmlns="4873beb7-5857-4685-be1f-d57550cc96cc" xsi:nil="true"/>
+    <AssetStart xmlns="4873beb7-5857-4685-be1f-d57550cc96cc">2011-11-26T00:30:00+00:00</AssetStart>
+    <Provider xmlns="4873beb7-5857-4685-be1f-d57550cc96cc" xsi:nil="true"/>
+    <AcquiredFrom xmlns="4873beb7-5857-4685-be1f-d57550cc96cc">Internal MS</AcquiredFrom>
+    <FriendlyTitle xmlns="4873beb7-5857-4685-be1f-d57550cc96cc" xsi:nil="true"/>
+    <LastHandOff xmlns="4873beb7-5857-4685-be1f-d57550cc96cc" xsi:nil="true"/>
+    <TPClientViewer xmlns="4873beb7-5857-4685-be1f-d57550cc96cc" xsi:nil="true"/>
+    <TemplateStatus xmlns="4873beb7-5857-4685-be1f-d57550cc96cc">Complete</TemplateStatus>
+    <Downloads xmlns="4873beb7-5857-4685-be1f-d57550cc96cc">0</Downloads>
+    <OOCacheId xmlns="4873beb7-5857-4685-be1f-d57550cc96cc" xsi:nil="true"/>
+    <IsDeleted xmlns="4873beb7-5857-4685-be1f-d57550cc96cc">false</IsDeleted>
+    <LocPublishedDependentAssetsLookup xmlns="4873beb7-5857-4685-be1f-d57550cc96cc" xsi:nil="true"/>
+    <TPExecutable xmlns="4873beb7-5857-4685-be1f-d57550cc96cc" xsi:nil="true"/>
+    <EditorialTags xmlns="4873beb7-5857-4685-be1f-d57550cc96cc" xsi:nil="true"/>
+    <SubmitterId xmlns="4873beb7-5857-4685-be1f-d57550cc96cc" xsi:nil="true"/>
+    <ApprovalLog xmlns="4873beb7-5857-4685-be1f-d57550cc96cc" xsi:nil="true"/>
+    <AssetType xmlns="4873beb7-5857-4685-be1f-d57550cc96cc">TP</AssetType>
+    <BugNumber xmlns="4873beb7-5857-4685-be1f-d57550cc96cc" xsi:nil="true"/>
+    <CSXSubmissionDate xmlns="4873beb7-5857-4685-be1f-d57550cc96cc" xsi:nil="true"/>
+    <CSXUpdate xmlns="4873beb7-5857-4685-be1f-d57550cc96cc">false</CSXUpdate>
+    <Milestone xmlns="4873beb7-5857-4685-be1f-d57550cc96cc" xsi:nil="true"/>
+    <RecommendationsModifier xmlns="4873beb7-5857-4685-be1f-d57550cc96cc" xsi:nil="true"/>
+    <OriginAsset xmlns="4873beb7-5857-4685-be1f-d57550cc96cc" xsi:nil="true"/>
+    <TPComponent xmlns="4873beb7-5857-4685-be1f-d57550cc96cc" xsi:nil="true"/>
+    <AssetId xmlns="4873beb7-5857-4685-be1f-d57550cc96cc">TP102787989</AssetId>
+    <IntlLocPriority xmlns="4873beb7-5857-4685-be1f-d57550cc96cc" xsi:nil="true"/>
+    <PolicheckWords xmlns="4873beb7-5857-4685-be1f-d57550cc96cc" xsi:nil="true"/>
+    <TPLaunchHelpLink xmlns="4873beb7-5857-4685-be1f-d57550cc96cc" xsi:nil="true"/>
+    <TPApplication xmlns="4873beb7-5857-4685-be1f-d57550cc96cc" xsi:nil="true"/>
+    <CrawlForDependencies xmlns="4873beb7-5857-4685-be1f-d57550cc96cc">false</CrawlForDependencies>
+    <HandoffToMSDN xmlns="4873beb7-5857-4685-be1f-d57550cc96cc" xsi:nil="true"/>
+    <PlannedPubDate xmlns="4873beb7-5857-4685-be1f-d57550cc96cc" xsi:nil="true"/>
+    <IntlLangReviewer xmlns="4873beb7-5857-4685-be1f-d57550cc96cc" xsi:nil="true"/>
+    <TrustLevel xmlns="4873beb7-5857-4685-be1f-d57550cc96cc">1 Microsoft Managed Content</TrustLevel>
+    <LocLastLocAttemptVersionLookup xmlns="4873beb7-5857-4685-be1f-d57550cc96cc">694266</LocLastLocAttemptVersionLookup>
+    <LocProcessedForHandoffsLookup xmlns="4873beb7-5857-4685-be1f-d57550cc96cc" xsi:nil="true"/>
+    <IsSearchable xmlns="4873beb7-5857-4685-be1f-d57550cc96cc">true</IsSearchable>
+    <TemplateTemplateType xmlns="4873beb7-5857-4685-be1f-d57550cc96cc">PowerPoint Presentation Template</TemplateTemplateType>
+    <CampaignTagsTaxHTField0 xmlns="4873beb7-5857-4685-be1f-d57550cc96cc">
+      <Terms xmlns="http://schemas.microsoft.com/office/infopath/2007/PartnerControls"/>
+    </CampaignTagsTaxHTField0>
+    <TPNamespace xmlns="4873beb7-5857-4685-be1f-d57550cc96cc" xsi:nil="true"/>
+    <LocOverallPreviewStatusLookup xmlns="4873beb7-5857-4685-be1f-d57550cc96cc" xsi:nil="true"/>
+    <TaxCatchAll xmlns="4873beb7-5857-4685-be1f-d57550cc96cc"/>
+    <Markets xmlns="4873beb7-5857-4685-be1f-d57550cc96cc"/>
+    <UAProjectedTotalWords xmlns="4873beb7-5857-4685-be1f-d57550cc96cc" xsi:nil="true"/>
+    <IntlLangReview xmlns="4873beb7-5857-4685-be1f-d57550cc96cc" xsi:nil="true"/>
+    <OutputCachingOn xmlns="4873beb7-5857-4685-be1f-d57550cc96cc">false</OutputCachingOn>
+    <AverageRating xmlns="4873beb7-5857-4685-be1f-d57550cc96cc" xsi:nil="true"/>
+    <APAuthor xmlns="4873beb7-5857-4685-be1f-d57550cc96cc">
+      <UserInfo>
+        <DisplayName>REDMOND\kristaa</DisplayName>
+        <AccountId>136</AccountId>
+        <AccountType/>
+      </UserInfo>
+    </APAuthor>
+    <LocManualTestRequired xmlns="4873beb7-5857-4685-be1f-d57550cc96cc">false</LocManualTestRequired>
+    <TPCommandLine xmlns="4873beb7-5857-4685-be1f-d57550cc96cc" xsi:nil="true"/>
+    <TPAppVersion xmlns="4873beb7-5857-4685-be1f-d57550cc96cc" xsi:nil="true"/>
+    <EditorialStatus xmlns="4873beb7-5857-4685-be1f-d57550cc96cc">Complete</EditorialStatus>
+    <LastModifiedDateTime xmlns="4873beb7-5857-4685-be1f-d57550cc96cc" xsi:nil="true"/>
+    <ScenarioTagsTaxHTField0 xmlns="4873beb7-5857-4685-be1f-d57550cc96cc">
+      <Terms xmlns="http://schemas.microsoft.com/office/infopath/2007/PartnerControls"/>
+    </ScenarioTagsTaxHTField0>
+    <LocProcessedForMarketsLookup xmlns="4873beb7-5857-4685-be1f-d57550cc96cc" xsi:nil="true"/>
+    <TPLaunchHelpLinkType xmlns="4873beb7-5857-4685-be1f-d57550cc96cc">Template</TPLaunchHelpLinkType>
+    <OriginalRelease xmlns="4873beb7-5857-4685-be1f-d57550cc96cc">15</OriginalRelease>
+    <LocalizationTagsTaxHTField0 xmlns="4873beb7-5857-4685-be1f-d57550cc96cc">
+      <Terms xmlns="http://schemas.microsoft.com/office/infopath/2007/PartnerControls"/>
+    </LocalizationTagsTaxHTField0>
+    <UACurrentWords xmlns="4873beb7-5857-4685-be1f-d57550cc96cc" xsi:nil="true"/>
+    <ArtSampleDocs xmlns="4873beb7-5857-4685-be1f-d57550cc96cc" xsi:nil="true"/>
+    <UALocRecommendation xmlns="4873beb7-5857-4685-be1f-d57550cc96cc">Localize</UALocRecommendation>
+    <Manager xmlns="4873beb7-5857-4685-be1f-d57550cc96cc" xsi:nil="true"/>
+    <LocOverallHandbackStatusLookup xmlns="4873beb7-5857-4685-be1f-d57550cc96cc" xsi:nil="true"/>
+    <ShowIn xmlns="4873beb7-5857-4685-be1f-d57550cc96cc">Show everywhere</ShowIn>
+    <UANotes xmlns="4873beb7-5857-4685-be1f-d57550cc96cc" xsi:nil="true"/>
+    <InternalTagsTaxHTField0 xmlns="4873beb7-5857-4685-be1f-d57550cc96cc">
+      <Terms xmlns="http://schemas.microsoft.com/office/infopath/2007/PartnerControls"/>
+    </InternalTagsTaxHTField0>
+    <CSXHash xmlns="4873beb7-5857-4685-be1f-d57550cc96cc" xsi:nil="true"/>
+    <VoteCount xmlns="4873beb7-5857-4685-be1f-d57550cc96cc" xsi:nil="true"/>
+    <AssetExpire xmlns="4873beb7-5857-4685-be1f-d57550cc96cc">2029-05-12T07:00:00+00:00</AssetExpire>
+    <DSATActionTaken xmlns="4873beb7-5857-4685-be1f-d57550cc96cc" xsi:nil="true"/>
+    <CSXSubmissionMarket xmlns="4873beb7-5857-4685-be1f-d57550cc96cc" xsi:nil="true"/>
+    <LocMarketGroupTiers2 xmlns="4873beb7-5857-4685-be1f-d57550cc96cc" xsi:nil="true"/>
+  </documentManagement>
+</p:properties>
 </file>
 
-<file path=customXml/itemProps2.xml><?xml version="1.0" encoding="utf-8"?>
+<file path=customXml/itemProps1.xml><?xml version="1.0" encoding="utf-8"?>
 <ds:datastoreItem xmlns:ds="http://schemas.openxmlformats.org/officeDocument/2006/customXml" ds:itemID="{3836F65B-1B07-41EE-A0E8-BC6EF3855225}">
   <ds:schemaRefs>
     <ds:schemaRef ds:uri="http://schemas.microsoft.com/sharepoint/v3/contenttype/forms"/>
@@ -18069,7 +18679,7 @@
 </ds:datastoreItem>
 </file>
 
-<file path=customXml/itemProps3.xml><?xml version="1.0" encoding="utf-8"?>
+<file path=customXml/itemProps2.xml><?xml version="1.0" encoding="utf-8"?>
 <ds:datastoreItem xmlns:ds="http://schemas.openxmlformats.org/officeDocument/2006/customXml" ds:itemID="{A09BF4D4-EF60-4196-BFC3-9462D607978C}">
   <ds:schemaRefs>
     <ds:schemaRef ds:uri="http://schemas.microsoft.com/office/2006/metadata/contentType"/>
@@ -18085,4 +18695,20 @@
     <ds:schemaRef ds:uri="http://schemas.microsoft.com/internal/obd"/>
   </ds:schemaRefs>
 </ds:datastoreItem>
+</file>
+
+<file path=customXml/itemProps3.xml><?xml version="1.0" encoding="utf-8"?>
+<ds:datastoreItem xmlns:ds="http://schemas.openxmlformats.org/officeDocument/2006/customXml" ds:itemID="{60C67BEE-D13F-4BD2-98A5-34D8A0977F68}">
+  <ds:schemaRefs>
+    <ds:schemaRef ds:uri="http://schemas.openxmlformats.org/package/2006/metadata/core-properties"/>
+    <ds:schemaRef ds:uri="http://schemas.microsoft.com/office/2006/metadata/properties"/>
+    <ds:schemaRef ds:uri="http://schemas.microsoft.com/office/2006/documentManagement/types"/>
+    <ds:schemaRef ds:uri="http://purl.org/dc/dcmitype/"/>
+    <ds:schemaRef ds:uri="http://purl.org/dc/elements/1.1/"/>
+    <ds:schemaRef ds:uri="4873beb7-5857-4685-be1f-d57550cc96cc"/>
+    <ds:schemaRef ds:uri="http://purl.org/dc/terms/"/>
+    <ds:schemaRef ds:uri="http://www.w3.org/XML/1998/namespace"/>
+    <ds:schemaRef ds:uri="http://schemas.microsoft.com/office/infopath/2007/PartnerControls"/>
+  </ds:schemaRefs>
+</ds:datastoreItem>
 </file>
</xml_diff>

<commit_message>
Backend personas y paises
</commit_message>
<xml_diff>
--- a/Angular.pptx
+++ b/Angular.pptx
@@ -5,10 +5,10 @@
     <p:sldMasterId id="2147483660" r:id="rId4"/>
   </p:sldMasterIdLst>
   <p:notesMasterIdLst>
-    <p:notesMasterId r:id="rId54"/>
+    <p:notesMasterId r:id="rId56"/>
   </p:notesMasterIdLst>
   <p:handoutMasterIdLst>
-    <p:handoutMasterId r:id="rId55"/>
+    <p:handoutMasterId r:id="rId57"/>
   </p:handoutMasterIdLst>
   <p:sldIdLst>
     <p:sldId id="257" r:id="rId5"/>
@@ -60,6 +60,8 @@
     <p:sldId id="322" r:id="rId51"/>
     <p:sldId id="323" r:id="rId52"/>
     <p:sldId id="324" r:id="rId53"/>
+    <p:sldId id="326" r:id="rId54"/>
+    <p:sldId id="325" r:id="rId55"/>
   </p:sldIdLst>
   <p:sldSz cx="12188825" cy="6858000"/>
   <p:notesSz cx="6858000" cy="9144000"/>
@@ -3430,7 +3432,7 @@
             <a:pPr algn="r" rtl="0"/>
             <a:fld id="{C8F1D84B-F747-4821-8617-FBD61E8F4308}" type="datetime1">
               <a:rPr lang="es-ES" smtClean="0"/>
-              <a:t>21/12/2018</a:t>
+              <a:t>22/12/2018</a:t>
             </a:fld>
             <a:endParaRPr lang="es-ES" dirty="0"/>
           </a:p>
@@ -3600,7 +3602,7 @@
             <a:fld id="{DA87C823-BB9F-45DA-99AB-416A32E1B948}" type="datetime1">
               <a:rPr lang="es-ES" noProof="0" smtClean="0"/>
               <a:pPr/>
-              <a:t>21/12/2018</a:t>
+              <a:t>22/12/2018</a:t>
             </a:fld>
             <a:endParaRPr lang="es-ES" noProof="0" dirty="0"/>
           </a:p>
@@ -5228,7 +5230,7 @@
             <a:fld id="{A042E67D-14C0-4ED9-A218-9C14494A6A84}" type="datetime1">
               <a:rPr lang="es-ES" noProof="0" smtClean="0"/>
               <a:pPr/>
-              <a:t>21/12/2018</a:t>
+              <a:t>22/12/2018</a:t>
             </a:fld>
             <a:endParaRPr lang="es-ES" noProof="0" dirty="0"/>
           </a:p>
@@ -5438,7 +5440,7 @@
             <a:fld id="{40A1DB83-C382-4684-8887-65A03EA4FFF0}" type="datetime1">
               <a:rPr lang="es-ES" noProof="0" smtClean="0"/>
               <a:pPr/>
-              <a:t>21/12/2018</a:t>
+              <a:t>22/12/2018</a:t>
             </a:fld>
             <a:endParaRPr lang="es-ES" noProof="0" dirty="0"/>
           </a:p>
@@ -5654,7 +5656,7 @@
             <a:fld id="{C60E81D3-9B82-44CA-B1F9-FCEFDC87935B}" type="datetime1">
               <a:rPr lang="es-ES" noProof="0" smtClean="0"/>
               <a:pPr/>
-              <a:t>21/12/2018</a:t>
+              <a:t>22/12/2018</a:t>
             </a:fld>
             <a:endParaRPr lang="es-ES" noProof="0" dirty="0"/>
           </a:p>
@@ -5860,7 +5862,7 @@
             <a:fld id="{82E48AAE-5AE8-418A-A225-B506C222F2F9}" type="datetime1">
               <a:rPr lang="es-ES" noProof="0" smtClean="0"/>
               <a:pPr/>
-              <a:t>21/12/2018</a:t>
+              <a:t>22/12/2018</a:t>
             </a:fld>
             <a:endParaRPr lang="es-ES" noProof="0" dirty="0"/>
           </a:p>
@@ -6300,7 +6302,7 @@
             <a:fld id="{AA1D35CA-82F5-4AD4-B9EC-66E805B73542}" type="datetime1">
               <a:rPr lang="es-ES" noProof="0" smtClean="0"/>
               <a:pPr/>
-              <a:t>21/12/2018</a:t>
+              <a:t>22/12/2018</a:t>
             </a:fld>
             <a:endParaRPr lang="es-ES" noProof="0" dirty="0"/>
           </a:p>
@@ -6612,7 +6614,7 @@
             <a:fld id="{834CCE92-710B-4678-B1B1-EFCAA5CDF075}" type="datetime1">
               <a:rPr lang="es-ES" noProof="0" smtClean="0"/>
               <a:pPr/>
-              <a:t>21/12/2018</a:t>
+              <a:t>22/12/2018</a:t>
             </a:fld>
             <a:endParaRPr lang="es-ES" noProof="0" dirty="0"/>
           </a:p>
@@ -7076,7 +7078,7 @@
             <a:fld id="{83FB0F2C-25D9-4D7E-B43A-29A2E16C960D}" type="datetime1">
               <a:rPr lang="es-ES" noProof="0" smtClean="0"/>
               <a:pPr/>
-              <a:t>21/12/2018</a:t>
+              <a:t>22/12/2018</a:t>
             </a:fld>
             <a:endParaRPr lang="es-ES" noProof="0" dirty="0"/>
           </a:p>
@@ -7214,7 +7216,7 @@
             <a:fld id="{FD34687D-B11B-47A5-95F6-B79DA932A6DF}" type="datetime1">
               <a:rPr lang="es-ES" noProof="0" smtClean="0"/>
               <a:pPr/>
-              <a:t>21/12/2018</a:t>
+              <a:t>22/12/2018</a:t>
             </a:fld>
             <a:endParaRPr lang="es-ES" noProof="0" dirty="0"/>
           </a:p>
@@ -7328,7 +7330,7 @@
             <a:fld id="{93C656DE-1E46-4450-9484-A739B4FADFBC}" type="datetime1">
               <a:rPr lang="es-ES" noProof="0" smtClean="0"/>
               <a:pPr/>
-              <a:t>21/12/2018</a:t>
+              <a:t>22/12/2018</a:t>
             </a:fld>
             <a:endParaRPr lang="es-ES" noProof="0" dirty="0"/>
           </a:p>
@@ -7635,7 +7637,7 @@
             <a:fld id="{EEA77F8B-D469-4ECD-B91E-3B01AD692331}" type="datetime1">
               <a:rPr lang="es-ES" noProof="0" smtClean="0"/>
               <a:pPr/>
-              <a:t>21/12/2018</a:t>
+              <a:t>22/12/2018</a:t>
             </a:fld>
             <a:endParaRPr lang="es-ES" noProof="0" dirty="0"/>
           </a:p>
@@ -7932,7 +7934,7 @@
             <a:fld id="{49BA7B1C-709E-4257-93A5-EC2F0807D42F}" type="datetime1">
               <a:rPr lang="es-ES" noProof="0" smtClean="0"/>
               <a:pPr/>
-              <a:t>21/12/2018</a:t>
+              <a:t>22/12/2018</a:t>
             </a:fld>
             <a:endParaRPr lang="es-ES" noProof="0" dirty="0"/>
           </a:p>
@@ -8556,7 +8558,7 @@
             <a:fld id="{35C83AD5-F5AF-4BDC-901E-85A05CCFFAAA}" type="datetime1">
               <a:rPr lang="es-ES" noProof="0" smtClean="0"/>
               <a:pPr/>
-              <a:t>21/12/2018</a:t>
+              <a:t>22/12/2018</a:t>
             </a:fld>
             <a:endParaRPr lang="es-ES" noProof="0" dirty="0"/>
           </a:p>
@@ -15658,6 +15660,247 @@
     <p:extLst>
       <p:ext uri="{BB962C8B-B14F-4D97-AF65-F5344CB8AC3E}">
         <p14:creationId xmlns:p14="http://schemas.microsoft.com/office/powerpoint/2010/main" val="205426097"/>
+      </p:ext>
+    </p:extLst>
+  </p:cSld>
+  <p:clrMapOvr>
+    <a:masterClrMapping/>
+  </p:clrMapOvr>
+  <mc:AlternateContent xmlns:mc="http://schemas.openxmlformats.org/markup-compatibility/2006" xmlns:p14="http://schemas.microsoft.com/office/powerpoint/2010/main">
+    <mc:Choice Requires="p14">
+      <p:transition spd="med" p14:dur="700">
+        <p:fade/>
+      </p:transition>
+    </mc:Choice>
+    <mc:Fallback xmlns="">
+      <p:transition spd="med">
+        <p:fade/>
+      </p:transition>
+    </mc:Fallback>
+  </mc:AlternateContent>
+</p:sld>
+</file>
+
+<file path=ppt/slides/slide50.xml><?xml version="1.0" encoding="utf-8"?>
+<p:sld xmlns:a="http://schemas.openxmlformats.org/drawingml/2006/main" xmlns:r="http://schemas.openxmlformats.org/officeDocument/2006/relationships" xmlns:p="http://schemas.openxmlformats.org/presentationml/2006/main">
+  <p:cSld>
+    <p:spTree>
+      <p:nvGrpSpPr>
+        <p:cNvPr id="1" name=""/>
+        <p:cNvGrpSpPr/>
+        <p:nvPr/>
+      </p:nvGrpSpPr>
+      <p:grpSpPr>
+        <a:xfrm>
+          <a:off x="0" y="0"/>
+          <a:ext cx="0" cy="0"/>
+          <a:chOff x="0" y="0"/>
+          <a:chExt cx="0" cy="0"/>
+        </a:xfrm>
+      </p:grpSpPr>
+      <p:sp>
+        <p:nvSpPr>
+          <p:cNvPr id="2" name="Título 1">
+            <a:extLst>
+              <a:ext uri="{FF2B5EF4-FFF2-40B4-BE49-F238E27FC236}">
+                <a16:creationId xmlns:a16="http://schemas.microsoft.com/office/drawing/2014/main" id="{E1DD56AC-F369-400B-AC94-996C4ADC36CB}"/>
+              </a:ext>
+            </a:extLst>
+          </p:cNvPr>
+          <p:cNvSpPr>
+            <a:spLocks noGrp="1"/>
+          </p:cNvSpPr>
+          <p:nvPr>
+            <p:ph type="title"/>
+          </p:nvPr>
+        </p:nvSpPr>
+        <p:spPr/>
+        <p:txBody>
+          <a:bodyPr>
+            <a:normAutofit/>
+          </a:bodyPr>
+          <a:lstStyle/>
+          <a:p>
+            <a:r>
+              <a:rPr lang="es-ES" sz="4400" dirty="0"/>
+              <a:t>Enlaces de ayuda</a:t>
+            </a:r>
+          </a:p>
+        </p:txBody>
+      </p:sp>
+      <p:sp>
+        <p:nvSpPr>
+          <p:cNvPr id="3" name="Marcador de contenido 2">
+            <a:extLst>
+              <a:ext uri="{FF2B5EF4-FFF2-40B4-BE49-F238E27FC236}">
+                <a16:creationId xmlns:a16="http://schemas.microsoft.com/office/drawing/2014/main" id="{2AA45C90-4C39-4377-89F0-EE9757D4C069}"/>
+              </a:ext>
+            </a:extLst>
+          </p:cNvPr>
+          <p:cNvSpPr>
+            <a:spLocks noGrp="1"/>
+          </p:cNvSpPr>
+          <p:nvPr>
+            <p:ph idx="1"/>
+          </p:nvPr>
+        </p:nvSpPr>
+        <p:spPr/>
+        <p:txBody>
+          <a:bodyPr>
+            <a:normAutofit lnSpcReduction="10000"/>
+          </a:bodyPr>
+          <a:lstStyle/>
+          <a:p>
+            <a:r>
+              <a:rPr lang="es-ES" sz="3600" dirty="0">
+                <a:hlinkClick r:id="rId2"/>
+              </a:rPr>
+              <a:t>https://angular.io/docs</a:t>
+            </a:r>
+            <a:endParaRPr lang="es-ES" sz="3600" dirty="0"/>
+          </a:p>
+          <a:p>
+            <a:r>
+              <a:rPr lang="es-ES" sz="3600" dirty="0">
+                <a:hlinkClick r:id="rId3"/>
+              </a:rPr>
+              <a:t>https://material.angular.io/</a:t>
+            </a:r>
+            <a:endParaRPr lang="es-ES" sz="3600" dirty="0"/>
+          </a:p>
+          <a:p>
+            <a:r>
+              <a:rPr lang="es-ES" sz="3600" dirty="0">
+                <a:hlinkClick r:id="rId4"/>
+              </a:rPr>
+              <a:t>https://github.com/angular/flex-layout/wiki</a:t>
+            </a:r>
+            <a:endParaRPr lang="es-ES" sz="3600" dirty="0"/>
+          </a:p>
+          <a:p>
+            <a:r>
+              <a:rPr lang="es-ES" sz="3600" dirty="0">
+                <a:hlinkClick r:id="rId5"/>
+              </a:rPr>
+              <a:t>https://stackoverflow.com/</a:t>
+            </a:r>
+            <a:endParaRPr lang="es-ES" sz="3600" dirty="0"/>
+          </a:p>
+          <a:p>
+            <a:pPr marL="0" indent="0">
+              <a:buNone/>
+            </a:pPr>
+            <a:endParaRPr lang="es-ES" sz="3600" dirty="0"/>
+          </a:p>
+          <a:p>
+            <a:pPr marL="0" indent="0">
+              <a:buNone/>
+            </a:pPr>
+            <a:r>
+              <a:rPr lang="es-ES" sz="3600" dirty="0"/>
+              <a:t>Contacto</a:t>
+            </a:r>
+          </a:p>
+          <a:p>
+            <a:r>
+              <a:rPr lang="es-ES" sz="3600" dirty="0"/>
+              <a:t>0991174688</a:t>
+            </a:r>
+          </a:p>
+          <a:p>
+            <a:endParaRPr lang="es-ES" sz="3600" dirty="0"/>
+          </a:p>
+        </p:txBody>
+      </p:sp>
+    </p:spTree>
+    <p:extLst>
+      <p:ext uri="{BB962C8B-B14F-4D97-AF65-F5344CB8AC3E}">
+        <p14:creationId xmlns:p14="http://schemas.microsoft.com/office/powerpoint/2010/main" val="2088599754"/>
+      </p:ext>
+    </p:extLst>
+  </p:cSld>
+  <p:clrMapOvr>
+    <a:masterClrMapping/>
+  </p:clrMapOvr>
+  <mc:AlternateContent xmlns:mc="http://schemas.openxmlformats.org/markup-compatibility/2006" xmlns:p14="http://schemas.microsoft.com/office/powerpoint/2010/main">
+    <mc:Choice Requires="p14">
+      <p:transition spd="med" p14:dur="700">
+        <p:fade/>
+      </p:transition>
+    </mc:Choice>
+    <mc:Fallback xmlns="">
+      <p:transition spd="med">
+        <p:fade/>
+      </p:transition>
+    </mc:Fallback>
+  </mc:AlternateContent>
+</p:sld>
+</file>
+
+<file path=ppt/slides/slide51.xml><?xml version="1.0" encoding="utf-8"?>
+<p:sld xmlns:a="http://schemas.openxmlformats.org/drawingml/2006/main" xmlns:r="http://schemas.openxmlformats.org/officeDocument/2006/relationships" xmlns:p="http://schemas.openxmlformats.org/presentationml/2006/main">
+  <p:cSld>
+    <p:spTree>
+      <p:nvGrpSpPr>
+        <p:cNvPr id="1" name=""/>
+        <p:cNvGrpSpPr/>
+        <p:nvPr/>
+      </p:nvGrpSpPr>
+      <p:grpSpPr>
+        <a:xfrm>
+          <a:off x="0" y="0"/>
+          <a:ext cx="0" cy="0"/>
+          <a:chOff x="0" y="0"/>
+          <a:chExt cx="0" cy="0"/>
+        </a:xfrm>
+      </p:grpSpPr>
+      <p:sp>
+        <p:nvSpPr>
+          <p:cNvPr id="2" name="Título 1">
+            <a:extLst>
+              <a:ext uri="{FF2B5EF4-FFF2-40B4-BE49-F238E27FC236}">
+                <a16:creationId xmlns:a16="http://schemas.microsoft.com/office/drawing/2014/main" id="{319A57F6-7C14-4A47-9E5D-DA3A7A8F6469}"/>
+              </a:ext>
+            </a:extLst>
+          </p:cNvPr>
+          <p:cNvSpPr>
+            <a:spLocks noGrp="1"/>
+          </p:cNvSpPr>
+          <p:nvPr>
+            <p:ph type="title"/>
+          </p:nvPr>
+        </p:nvSpPr>
+        <p:spPr>
+          <a:xfrm>
+            <a:off x="814957" y="-13658"/>
+            <a:ext cx="10558909" cy="6250970"/>
+          </a:xfrm>
+        </p:spPr>
+        <p:txBody>
+          <a:bodyPr anchor="ctr">
+            <a:normAutofit/>
+          </a:bodyPr>
+          <a:lstStyle/>
+          <a:p>
+            <a:pPr algn="ctr"/>
+            <a:r>
+              <a:rPr lang="es-ES" sz="6000" dirty="0"/>
+              <a:t>Gracias </a:t>
+            </a:r>
+            <a:r>
+              <a:rPr lang="es-ES" sz="6000" dirty="0">
+                <a:sym typeface="Wingdings" panose="05000000000000000000" pitchFamily="2" charset="2"/>
+              </a:rPr>
+              <a:t></a:t>
+            </a:r>
+            <a:endParaRPr lang="es-ES" sz="6000" dirty="0"/>
+          </a:p>
+        </p:txBody>
+      </p:sp>
+    </p:spTree>
+    <p:extLst>
+      <p:ext uri="{BB962C8B-B14F-4D97-AF65-F5344CB8AC3E}">
+        <p14:creationId xmlns:p14="http://schemas.microsoft.com/office/powerpoint/2010/main" val="2031403541"/>
       </p:ext>
     </p:extLst>
   </p:cSld>
@@ -17487,15 +17730,6 @@
 </file>
 
 <file path=customXml/item1.xml><?xml version="1.0" encoding="utf-8"?>
-<?mso-contentType ?>
-<FormTemplates xmlns="http://schemas.microsoft.com/sharepoint/v3/contenttype/forms">
-  <Display>DocumentLibraryForm</Display>
-  <Edit>AssetEditForm</Edit>
-  <New>DocumentLibraryForm</New>
-</FormTemplates>
-</file>
-
-<file path=customXml/item2.xml><?xml version="1.0" encoding="utf-8"?>
 <ct:contentTypeSchema xmlns:ct="http://schemas.microsoft.com/office/2006/metadata/contentType" xmlns:ma="http://schemas.microsoft.com/office/2006/metadata/properties/metaAttributes" ct:_="" ma:_="" ma:contentTypeName="TemplateFile" ma:contentTypeID="0x0101006EDDDB5EE6D98C44930B742096920B300400F5B6D36B3EF94B4E9A635CDF2A18F5B8" ma:contentTypeVersion="72" ma:contentTypeDescription="Create a new document." ma:contentTypeScope="" ma:versionID="a23e56308344d904b51738559c3d67c9">
   <xsd:schema xmlns:xsd="http://www.w3.org/2001/XMLSchema" xmlns:xs="http://www.w3.org/2001/XMLSchema" xmlns:p="http://schemas.microsoft.com/office/2006/metadata/properties" xmlns:ns2="4873beb7-5857-4685-be1f-d57550cc96cc" targetNamespace="http://schemas.microsoft.com/office/2006/metadata/properties" ma:root="true" ma:fieldsID="cd0908cc4600e77bf5da051303e00c8d" ns2:_="">
     <xsd:import namespace="4873beb7-5857-4685-be1f-d57550cc96cc"/>
@@ -18535,7 +18769,7 @@
 </ct:contentTypeSchema>
 </file>
 
-<file path=customXml/item3.xml><?xml version="1.0" encoding="utf-8"?>
+<file path=customXml/item2.xml><?xml version="1.0" encoding="utf-8"?>
 <p:properties xmlns:p="http://schemas.microsoft.com/office/2006/metadata/properties" xmlns:xsi="http://www.w3.org/2001/XMLSchema-instance" xmlns:pc="http://schemas.microsoft.com/office/infopath/2007/PartnerControls">
   <documentManagement>
     <LocPublishedLinkedAssetsLookup xmlns="4873beb7-5857-4685-be1f-d57550cc96cc" xsi:nil="true"/>
@@ -18671,15 +18905,16 @@
 </p:properties>
 </file>
 
-<file path=customXml/itemProps1.xml><?xml version="1.0" encoding="utf-8"?>
-<ds:datastoreItem xmlns:ds="http://schemas.openxmlformats.org/officeDocument/2006/customXml" ds:itemID="{3836F65B-1B07-41EE-A0E8-BC6EF3855225}">
-  <ds:schemaRefs>
-    <ds:schemaRef ds:uri="http://schemas.microsoft.com/sharepoint/v3/contenttype/forms"/>
-  </ds:schemaRefs>
-</ds:datastoreItem>
+<file path=customXml/item3.xml><?xml version="1.0" encoding="utf-8"?>
+<?mso-contentType ?>
+<FormTemplates xmlns="http://schemas.microsoft.com/sharepoint/v3/contenttype/forms">
+  <Display>DocumentLibraryForm</Display>
+  <Edit>AssetEditForm</Edit>
+  <New>DocumentLibraryForm</New>
+</FormTemplates>
 </file>
 
-<file path=customXml/itemProps2.xml><?xml version="1.0" encoding="utf-8"?>
+<file path=customXml/itemProps1.xml><?xml version="1.0" encoding="utf-8"?>
 <ds:datastoreItem xmlns:ds="http://schemas.openxmlformats.org/officeDocument/2006/customXml" ds:itemID="{A09BF4D4-EF60-4196-BFC3-9462D607978C}">
   <ds:schemaRefs>
     <ds:schemaRef ds:uri="http://schemas.microsoft.com/office/2006/metadata/contentType"/>
@@ -18697,7 +18932,7 @@
 </ds:datastoreItem>
 </file>
 
-<file path=customXml/itemProps3.xml><?xml version="1.0" encoding="utf-8"?>
+<file path=customXml/itemProps2.xml><?xml version="1.0" encoding="utf-8"?>
 <ds:datastoreItem xmlns:ds="http://schemas.openxmlformats.org/officeDocument/2006/customXml" ds:itemID="{60C67BEE-D13F-4BD2-98A5-34D8A0977F68}">
   <ds:schemaRefs>
     <ds:schemaRef ds:uri="http://schemas.openxmlformats.org/package/2006/metadata/core-properties"/>
@@ -18711,4 +18946,12 @@
     <ds:schemaRef ds:uri="http://schemas.microsoft.com/office/infopath/2007/PartnerControls"/>
   </ds:schemaRefs>
 </ds:datastoreItem>
+</file>
+
+<file path=customXml/itemProps3.xml><?xml version="1.0" encoding="utf-8"?>
+<ds:datastoreItem xmlns:ds="http://schemas.openxmlformats.org/officeDocument/2006/customXml" ds:itemID="{3836F65B-1B07-41EE-A0E8-BC6EF3855225}">
+  <ds:schemaRefs>
+    <ds:schemaRef ds:uri="http://schemas.microsoft.com/sharepoint/v3/contenttype/forms"/>
+  </ds:schemaRefs>
+</ds:datastoreItem>
 </file>
</xml_diff>